<commit_message>
Fixing the size of the bullets
</commit_message>
<xml_diff>
--- a/Courses/Software-Sciences/Module-3-Databases-New/04-Intro-to-SQL/04-Intro-to-SQL.pptx
+++ b/Courses/Software-Sciences/Module-3-Databases-New/04-Intro-to-SQL/04-Intro-to-SQL.pptx
@@ -133,7 +133,7 @@
   </p:defaultTextStyle>
   <p:extLst>
     <p:ext uri="{521415D9-36F7-43E2-AB2F-B90AF26B5E84}">
-      <p14:sectionLst xmlns="" xmlns:p14="http://schemas.microsoft.com/office/powerpoint/2010/main">
+      <p14:sectionLst xmlns:p14="http://schemas.microsoft.com/office/powerpoint/2010/main" xmlns="">
         <p14:section name="Intro" id="{68214D1A-5628-4F9A-98CD-87D12966DB07}">
           <p14:sldIdLst>
             <p14:sldId id="1176"/>
@@ -203,7 +203,7 @@
       </p14:sectionLst>
     </p:ext>
     <p:ext uri="{EFAFB233-063F-42B5-8137-9DF3F51BA10A}">
-      <p15:sldGuideLst xmlns="" xmlns:p15="http://schemas.microsoft.com/office/powerpoint/2012/main">
+      <p15:sldGuideLst xmlns:p15="http://schemas.microsoft.com/office/powerpoint/2012/main" xmlns="">
         <p15:guide id="1" orient="horz" pos="2184" userDrawn="1">
           <p15:clr>
             <a:srgbClr val="A4A3A4"/>
@@ -217,7 +217,7 @@
       </p15:sldGuideLst>
     </p:ext>
     <p:ext uri="{2D200454-40CA-4A62-9FC3-DE9A4176ACB9}">
-      <p15:notesGuideLst xmlns="" xmlns:p15="http://schemas.microsoft.com/office/powerpoint/2012/main"/>
+      <p15:notesGuideLst xmlns:p15="http://schemas.microsoft.com/office/powerpoint/2012/main" xmlns=""/>
     </p:ext>
   </p:extLst>
 </p:presentation>
@@ -322,7 +322,7 @@
           <p:cNvPr id="2" name="Header Placeholder 1">
             <a:extLst>
               <a:ext uri="{FF2B5EF4-FFF2-40B4-BE49-F238E27FC236}">
-                <a16:creationId xmlns="" xmlns:a16="http://schemas.microsoft.com/office/drawing/2014/main" id="{56F20103-83CC-4A54-8FDE-9D37FC2629C0}"/>
+                <a16:creationId xmlns:a16="http://schemas.microsoft.com/office/drawing/2014/main" xmlns="" id="{56F20103-83CC-4A54-8FDE-9D37FC2629C0}"/>
               </a:ext>
             </a:extLst>
           </p:cNvPr>
@@ -359,7 +359,7 @@
           <p:cNvPr id="3" name="Date Placeholder 2">
             <a:extLst>
               <a:ext uri="{FF2B5EF4-FFF2-40B4-BE49-F238E27FC236}">
-                <a16:creationId xmlns="" xmlns:a16="http://schemas.microsoft.com/office/drawing/2014/main" id="{27A53962-26EF-44E4-9E69-61B1727AB1C2}"/>
+                <a16:creationId xmlns:a16="http://schemas.microsoft.com/office/drawing/2014/main" xmlns="" id="{27A53962-26EF-44E4-9E69-61B1727AB1C2}"/>
               </a:ext>
             </a:extLst>
           </p:cNvPr>
@@ -390,7 +390,7 @@
             <a:fld id="{4E087215-0C8F-4762-A664-737A353EC9A4}" type="datetimeFigureOut">
               <a:rPr lang="bg-BG" smtClean="0"/>
               <a:pPr/>
-              <a:t>1.8.2023 г.</a:t>
+              <a:t>14.8.2023 г.</a:t>
             </a:fld>
             <a:endParaRPr lang="bg-BG"/>
           </a:p>
@@ -401,7 +401,7 @@
           <p:cNvPr id="4" name="Footer Placeholder 3">
             <a:extLst>
               <a:ext uri="{FF2B5EF4-FFF2-40B4-BE49-F238E27FC236}">
-                <a16:creationId xmlns="" xmlns:a16="http://schemas.microsoft.com/office/drawing/2014/main" id="{28A6967E-448F-4887-8FCB-34482EFBCC74}"/>
+                <a16:creationId xmlns:a16="http://schemas.microsoft.com/office/drawing/2014/main" xmlns="" id="{28A6967E-448F-4887-8FCB-34482EFBCC74}"/>
               </a:ext>
             </a:extLst>
           </p:cNvPr>
@@ -451,7 +451,7 @@
           <p:cNvPr id="5" name="Slide Number Placeholder 4">
             <a:extLst>
               <a:ext uri="{FF2B5EF4-FFF2-40B4-BE49-F238E27FC236}">
-                <a16:creationId xmlns="" xmlns:a16="http://schemas.microsoft.com/office/drawing/2014/main" id="{8B6554C2-DDBA-40E2-9536-53A07EC50274}"/>
+                <a16:creationId xmlns:a16="http://schemas.microsoft.com/office/drawing/2014/main" xmlns="" id="{8B6554C2-DDBA-40E2-9536-53A07EC50274}"/>
               </a:ext>
             </a:extLst>
           </p:cNvPr>
@@ -491,7 +491,7 @@
     </p:spTree>
     <p:extLst>
       <p:ext uri="{BB962C8B-B14F-4D97-AF65-F5344CB8AC3E}">
-        <p14:creationId xmlns="" xmlns:p14="http://schemas.microsoft.com/office/powerpoint/2010/main" val="4150602968"/>
+        <p14:creationId xmlns:p14="http://schemas.microsoft.com/office/powerpoint/2010/main" xmlns="" val="4150602968"/>
       </p:ext>
     </p:extLst>
   </p:cSld>
@@ -583,7 +583,7 @@
             <a:fld id="{72D84649-876A-46C9-8472-14CB09C070D8}" type="datetimeFigureOut">
               <a:rPr lang="en-US" smtClean="0"/>
               <a:pPr/>
-              <a:t>8/1/2023</a:t>
+              <a:t>8/14/2023</a:t>
             </a:fld>
             <a:endParaRPr lang="en-US"/>
           </a:p>
@@ -722,7 +722,7 @@
           <p:cNvPr id="8" name="Footer Placeholder 7">
             <a:extLst>
               <a:ext uri="{FF2B5EF4-FFF2-40B4-BE49-F238E27FC236}">
-                <a16:creationId xmlns="" xmlns:a16="http://schemas.microsoft.com/office/drawing/2014/main" id="{CAC3A49B-3196-44DF-AC28-085C72EFBFF0}"/>
+                <a16:creationId xmlns:a16="http://schemas.microsoft.com/office/drawing/2014/main" xmlns="" id="{CAC3A49B-3196-44DF-AC28-085C72EFBFF0}"/>
               </a:ext>
             </a:extLst>
           </p:cNvPr>
@@ -770,7 +770,7 @@
     </p:spTree>
     <p:extLst>
       <p:ext uri="{BB962C8B-B14F-4D97-AF65-F5344CB8AC3E}">
-        <p14:creationId xmlns="" xmlns:p14="http://schemas.microsoft.com/office/powerpoint/2010/main" val="1530847692"/>
+        <p14:creationId xmlns:p14="http://schemas.microsoft.com/office/powerpoint/2010/main" xmlns="" val="1530847692"/>
       </p:ext>
     </p:extLst>
   </p:cSld>
@@ -948,7 +948,7 @@
           <p:cNvPr id="7" name="Footer Placeholder 7">
             <a:extLst>
               <a:ext uri="{FF2B5EF4-FFF2-40B4-BE49-F238E27FC236}">
-                <a16:creationId xmlns="" xmlns:a16="http://schemas.microsoft.com/office/drawing/2014/main" id="{D6D14794-F06A-4611-8F78-8DFF4B7B281D}"/>
+                <a16:creationId xmlns:a16="http://schemas.microsoft.com/office/drawing/2014/main" xmlns="" id="{D6D14794-F06A-4611-8F78-8DFF4B7B281D}"/>
               </a:ext>
             </a:extLst>
           </p:cNvPr>
@@ -996,7 +996,7 @@
     </p:spTree>
     <p:extLst>
       <p:ext uri="{BB962C8B-B14F-4D97-AF65-F5344CB8AC3E}">
-        <p14:creationId xmlns="" xmlns:p14="http://schemas.microsoft.com/office/powerpoint/2010/main" val="3017256844"/>
+        <p14:creationId xmlns:p14="http://schemas.microsoft.com/office/powerpoint/2010/main" xmlns="" val="3017256844"/>
       </p:ext>
     </p:extLst>
   </p:cSld>
@@ -1085,7 +1085,7 @@
           <p:cNvPr id="6" name="Footer Placeholder 7">
             <a:extLst>
               <a:ext uri="{FF2B5EF4-FFF2-40B4-BE49-F238E27FC236}">
-                <a16:creationId xmlns="" xmlns:a16="http://schemas.microsoft.com/office/drawing/2014/main" id="{C16FB4C5-7FC9-4A20-9F90-120D35515436}"/>
+                <a16:creationId xmlns:a16="http://schemas.microsoft.com/office/drawing/2014/main" xmlns="" id="{C16FB4C5-7FC9-4A20-9F90-120D35515436}"/>
               </a:ext>
             </a:extLst>
           </p:cNvPr>
@@ -1133,7 +1133,7 @@
     </p:spTree>
     <p:extLst>
       <p:ext uri="{BB962C8B-B14F-4D97-AF65-F5344CB8AC3E}">
-        <p14:creationId xmlns="" xmlns:p14="http://schemas.microsoft.com/office/powerpoint/2010/main" val="3363101878"/>
+        <p14:creationId xmlns:p14="http://schemas.microsoft.com/office/powerpoint/2010/main" xmlns="" val="3363101878"/>
       </p:ext>
     </p:extLst>
   </p:cSld>
@@ -1672,7 +1672,7 @@
           <p:cNvPr id="7" name="Footer Placeholder 7">
             <a:extLst>
               <a:ext uri="{FF2B5EF4-FFF2-40B4-BE49-F238E27FC236}">
-                <a16:creationId xmlns:a16="http://schemas.microsoft.com/office/drawing/2014/main" xmlns="" id="{6B36F9BF-AF23-4CDD-9B29-E2D7D56F83F4}"/>
+                <a16:creationId xmlns="" xmlns:a16="http://schemas.microsoft.com/office/drawing/2014/main" id="{6B36F9BF-AF23-4CDD-9B29-E2D7D56F83F4}"/>
               </a:ext>
             </a:extLst>
           </p:cNvPr>
@@ -1720,7 +1720,7 @@
     </p:spTree>
     <p:extLst>
       <p:ext uri="{BB962C8B-B14F-4D97-AF65-F5344CB8AC3E}">
-        <p14:creationId xmlns:p14="http://schemas.microsoft.com/office/powerpoint/2010/main" xmlns="" val="2610364576"/>
+        <p14:creationId xmlns="" xmlns:p14="http://schemas.microsoft.com/office/powerpoint/2010/main" val="2610364576"/>
       </p:ext>
     </p:extLst>
   </p:cSld>
@@ -2096,7 +2096,7 @@
           <p:cNvPr id="6" name="Footer Placeholder 7">
             <a:extLst>
               <a:ext uri="{FF2B5EF4-FFF2-40B4-BE49-F238E27FC236}">
-                <a16:creationId xmlns="" xmlns:a16="http://schemas.microsoft.com/office/drawing/2014/main" id="{26905AE6-D8A3-45B6-928E-F3E2E637ADB7}"/>
+                <a16:creationId xmlns:a16="http://schemas.microsoft.com/office/drawing/2014/main" xmlns="" id="{26905AE6-D8A3-45B6-928E-F3E2E637ADB7}"/>
               </a:ext>
             </a:extLst>
           </p:cNvPr>
@@ -2144,7 +2144,7 @@
     </p:spTree>
     <p:extLst>
       <p:ext uri="{BB962C8B-B14F-4D97-AF65-F5344CB8AC3E}">
-        <p14:creationId xmlns="" xmlns:p14="http://schemas.microsoft.com/office/powerpoint/2010/main" val="2285141229"/>
+        <p14:creationId xmlns:p14="http://schemas.microsoft.com/office/powerpoint/2010/main" xmlns="" val="2285141229"/>
       </p:ext>
     </p:extLst>
   </p:cSld>
@@ -2207,7 +2207,7 @@
           <p:cNvPr id="7" name="Slide Number Placeholder 5">
             <a:extLst>
               <a:ext uri="{FF2B5EF4-FFF2-40B4-BE49-F238E27FC236}">
-                <a16:creationId xmlns:a16="http://schemas.microsoft.com/office/drawing/2014/main" xmlns="" id="{5049B984-F964-47FF-8179-0A3007CE21CD}"/>
+                <a16:creationId xmlns="" xmlns:a16="http://schemas.microsoft.com/office/drawing/2014/main" id="{5049B984-F964-47FF-8179-0A3007CE21CD}"/>
               </a:ext>
             </a:extLst>
           </p:cNvPr>
@@ -2337,7 +2337,7 @@
           <p:cNvPr id="6" name="Footer Placeholder 7">
             <a:extLst>
               <a:ext uri="{FF2B5EF4-FFF2-40B4-BE49-F238E27FC236}">
-                <a16:creationId xmlns:a16="http://schemas.microsoft.com/office/drawing/2014/main" xmlns="" id="{416ADEDD-4350-4E19-A49B-53FE4B1FF764}"/>
+                <a16:creationId xmlns="" xmlns:a16="http://schemas.microsoft.com/office/drawing/2014/main" id="{416ADEDD-4350-4E19-A49B-53FE4B1FF764}"/>
               </a:ext>
             </a:extLst>
           </p:cNvPr>
@@ -2385,7 +2385,7 @@
     </p:spTree>
     <p:extLst>
       <p:ext uri="{BB962C8B-B14F-4D97-AF65-F5344CB8AC3E}">
-        <p14:creationId xmlns:p14="http://schemas.microsoft.com/office/powerpoint/2010/main" xmlns="" val="535779941"/>
+        <p14:creationId xmlns="" xmlns:p14="http://schemas.microsoft.com/office/powerpoint/2010/main" val="535779941"/>
       </p:ext>
     </p:extLst>
   </p:cSld>
@@ -2448,7 +2448,7 @@
           <p:cNvPr id="6" name="Slide Number Placeholder 5">
             <a:extLst>
               <a:ext uri="{FF2B5EF4-FFF2-40B4-BE49-F238E27FC236}">
-                <a16:creationId xmlns="" xmlns:a16="http://schemas.microsoft.com/office/drawing/2014/main" id="{6627548A-4D3C-449B-81A5-FA4BE4628490}"/>
+                <a16:creationId xmlns:a16="http://schemas.microsoft.com/office/drawing/2014/main" xmlns="" id="{6627548A-4D3C-449B-81A5-FA4BE4628490}"/>
               </a:ext>
             </a:extLst>
           </p:cNvPr>
@@ -2578,7 +2578,7 @@
           <p:cNvPr id="4" name="Footer Placeholder 3">
             <a:extLst>
               <a:ext uri="{FF2B5EF4-FFF2-40B4-BE49-F238E27FC236}">
-                <a16:creationId xmlns="" xmlns:a16="http://schemas.microsoft.com/office/drawing/2014/main" id="{D2472CE7-61C1-4B7B-B0C8-5A45F0178717}"/>
+                <a16:creationId xmlns:a16="http://schemas.microsoft.com/office/drawing/2014/main" xmlns="" id="{D2472CE7-61C1-4B7B-B0C8-5A45F0178717}"/>
               </a:ext>
             </a:extLst>
           </p:cNvPr>
@@ -2614,7 +2614,7 @@
     </p:spTree>
     <p:extLst>
       <p:ext uri="{BB962C8B-B14F-4D97-AF65-F5344CB8AC3E}">
-        <p14:creationId xmlns="" xmlns:p14="http://schemas.microsoft.com/office/powerpoint/2010/main" val="729041308"/>
+        <p14:creationId xmlns:p14="http://schemas.microsoft.com/office/powerpoint/2010/main" xmlns="" val="729041308"/>
       </p:ext>
     </p:extLst>
   </p:cSld>
@@ -2646,7 +2646,7 @@
           <p:cNvPr id="16" name="Rectangle Bottom">
             <a:extLst>
               <a:ext uri="{FF2B5EF4-FFF2-40B4-BE49-F238E27FC236}">
-                <a16:creationId xmlns="" xmlns:a16="http://schemas.microsoft.com/office/drawing/2014/main" id="{6854D183-0374-4B3E-B2CE-32F308A81591}"/>
+                <a16:creationId xmlns:a16="http://schemas.microsoft.com/office/drawing/2014/main" xmlns="" id="{6854D183-0374-4B3E-B2CE-32F308A81591}"/>
               </a:ext>
             </a:extLst>
           </p:cNvPr>
@@ -2727,7 +2727,7 @@
           <p:cNvPr id="14" name="Picture Logo SoftUni" descr="SoftUni logo">
             <a:extLst>
               <a:ext uri="{FF2B5EF4-FFF2-40B4-BE49-F238E27FC236}">
-                <a16:creationId xmlns="" xmlns:a16="http://schemas.microsoft.com/office/drawing/2014/main" id="{C4D6B2A2-DFF0-4712-BFEC-6676BEC99FEC}"/>
+                <a16:creationId xmlns:a16="http://schemas.microsoft.com/office/drawing/2014/main" xmlns="" id="{C4D6B2A2-DFF0-4712-BFEC-6676BEC99FEC}"/>
               </a:ext>
             </a:extLst>
           </p:cNvPr>
@@ -2750,7 +2750,7 @@
             </a:clrChange>
             <a:extLst>
               <a:ext uri="{28A0092B-C50C-407E-A947-70E740481C1C}">
-                <a14:useLocalDpi xmlns="" xmlns:a14="http://schemas.microsoft.com/office/drawing/2010/main" val="0"/>
+                <a14:useLocalDpi xmlns:a14="http://schemas.microsoft.com/office/drawing/2010/main" xmlns="" val="0"/>
               </a:ext>
             </a:extLst>
           </a:blip>
@@ -2773,7 +2773,7 @@
           <p:cNvPr id="31" name="Text Placeholder Company Site">
             <a:extLst>
               <a:ext uri="{FF2B5EF4-FFF2-40B4-BE49-F238E27FC236}">
-                <a16:creationId xmlns="" xmlns:a16="http://schemas.microsoft.com/office/drawing/2014/main" id="{3E6B87B7-9D33-4EBB-BD4F-C0436BA3FD72}"/>
+                <a16:creationId xmlns:a16="http://schemas.microsoft.com/office/drawing/2014/main" xmlns="" id="{3E6B87B7-9D33-4EBB-BD4F-C0436BA3FD72}"/>
               </a:ext>
             </a:extLst>
           </p:cNvPr>
@@ -2835,7 +2835,7 @@
           <p:cNvPr id="30" name="Text Placeholder Company Name">
             <a:extLst>
               <a:ext uri="{FF2B5EF4-FFF2-40B4-BE49-F238E27FC236}">
-                <a16:creationId xmlns="" xmlns:a16="http://schemas.microsoft.com/office/drawing/2014/main" id="{2EA92DCA-4DB5-4D03-ACD3-A6A296592D0C}"/>
+                <a16:creationId xmlns:a16="http://schemas.microsoft.com/office/drawing/2014/main" xmlns="" id="{2EA92DCA-4DB5-4D03-ACD3-A6A296592D0C}"/>
               </a:ext>
             </a:extLst>
           </p:cNvPr>
@@ -2897,7 +2897,7 @@
           <p:cNvPr id="35" name="Picture SoftUni Mascot" descr="SoftUni mascot">
             <a:extLst>
               <a:ext uri="{FF2B5EF4-FFF2-40B4-BE49-F238E27FC236}">
-                <a16:creationId xmlns="" xmlns:a16="http://schemas.microsoft.com/office/drawing/2014/main" id="{951E7DA9-C5F0-43D9-B013-3BDF9EEF029D}"/>
+                <a16:creationId xmlns:a16="http://schemas.microsoft.com/office/drawing/2014/main" xmlns="" id="{951E7DA9-C5F0-43D9-B013-3BDF9EEF029D}"/>
               </a:ext>
             </a:extLst>
           </p:cNvPr>
@@ -2910,7 +2910,7 @@
           <a:blip r:embed="rId3" cstate="print">
             <a:extLst>
               <a:ext uri="{28A0092B-C50C-407E-A947-70E740481C1C}">
-                <a14:useLocalDpi xmlns="" xmlns:a14="http://schemas.microsoft.com/office/drawing/2010/main" val="0"/>
+                <a14:useLocalDpi xmlns:a14="http://schemas.microsoft.com/office/drawing/2010/main" xmlns="" val="0"/>
               </a:ext>
             </a:extLst>
           </a:blip>
@@ -2933,7 +2933,7 @@
             <a:hlinkClick r:id="rId4"/>
             <a:extLst>
               <a:ext uri="{FF2B5EF4-FFF2-40B4-BE49-F238E27FC236}">
-                <a16:creationId xmlns="" xmlns:a16="http://schemas.microsoft.com/office/drawing/2014/main" id="{F2315EB3-3FE4-4D3B-921E-5F209CEC13CB}"/>
+                <a16:creationId xmlns:a16="http://schemas.microsoft.com/office/drawing/2014/main" xmlns="" id="{F2315EB3-3FE4-4D3B-921E-5F209CEC13CB}"/>
               </a:ext>
             </a:extLst>
           </p:cNvPr>
@@ -2956,7 +2956,7 @@
             </a:clrChange>
             <a:extLst>
               <a:ext uri="{28A0092B-C50C-407E-A947-70E740481C1C}">
-                <a14:useLocalDpi xmlns="" xmlns:a14="http://schemas.microsoft.com/office/drawing/2010/main" val="0"/>
+                <a14:useLocalDpi xmlns:a14="http://schemas.microsoft.com/office/drawing/2010/main" xmlns="" val="0"/>
               </a:ext>
             </a:extLst>
           </a:blip>
@@ -2979,7 +2979,7 @@
           <p:cNvPr id="40" name="Text Placeholder Author Position">
             <a:extLst>
               <a:ext uri="{FF2B5EF4-FFF2-40B4-BE49-F238E27FC236}">
-                <a16:creationId xmlns="" xmlns:a16="http://schemas.microsoft.com/office/drawing/2014/main" id="{CD940256-851E-46C8-8BFB-A5ECA6C7DA07}"/>
+                <a16:creationId xmlns:a16="http://schemas.microsoft.com/office/drawing/2014/main" xmlns="" id="{CD940256-851E-46C8-8BFB-A5ECA6C7DA07}"/>
               </a:ext>
             </a:extLst>
           </p:cNvPr>
@@ -3039,7 +3039,7 @@
           <p:cNvPr id="36" name="Text Placeholder Author Name">
             <a:extLst>
               <a:ext uri="{FF2B5EF4-FFF2-40B4-BE49-F238E27FC236}">
-                <a16:creationId xmlns="" xmlns:a16="http://schemas.microsoft.com/office/drawing/2014/main" id="{3B21F47B-DE1F-442D-A2B7-6866F8786704}"/>
+                <a16:creationId xmlns:a16="http://schemas.microsoft.com/office/drawing/2014/main" xmlns="" id="{3B21F47B-DE1F-442D-A2B7-6866F8786704}"/>
               </a:ext>
             </a:extLst>
           </p:cNvPr>
@@ -3099,7 +3099,7 @@
           <p:cNvPr id="33" name="Picture Placeholder Title Image">
             <a:extLst>
               <a:ext uri="{FF2B5EF4-FFF2-40B4-BE49-F238E27FC236}">
-                <a16:creationId xmlns="" xmlns:a16="http://schemas.microsoft.com/office/drawing/2014/main" id="{A04D819A-89E2-4714-8C56-1838BF467EF7}"/>
+                <a16:creationId xmlns:a16="http://schemas.microsoft.com/office/drawing/2014/main" xmlns="" id="{A04D819A-89E2-4714-8C56-1838BF467EF7}"/>
               </a:ext>
             </a:extLst>
           </p:cNvPr>
@@ -3141,7 +3141,7 @@
           <p:cNvPr id="43" name="Presentation Subtitle">
             <a:extLst>
               <a:ext uri="{FF2B5EF4-FFF2-40B4-BE49-F238E27FC236}">
-                <a16:creationId xmlns="" xmlns:a16="http://schemas.microsoft.com/office/drawing/2014/main" id="{37BDB812-1395-4B02-ABCF-6A331EEE23E5}"/>
+                <a16:creationId xmlns:a16="http://schemas.microsoft.com/office/drawing/2014/main" xmlns="" id="{37BDB812-1395-4B02-ABCF-6A331EEE23E5}"/>
               </a:ext>
             </a:extLst>
           </p:cNvPr>
@@ -3185,7 +3185,7 @@
           <p:cNvPr id="2" name="Presentation Title">
             <a:extLst>
               <a:ext uri="{FF2B5EF4-FFF2-40B4-BE49-F238E27FC236}">
-                <a16:creationId xmlns="" xmlns:a16="http://schemas.microsoft.com/office/drawing/2014/main" id="{A4DF3AB8-E6E3-4FCE-8A4A-ECD147720A5D}"/>
+                <a16:creationId xmlns:a16="http://schemas.microsoft.com/office/drawing/2014/main" xmlns="" id="{A4DF3AB8-E6E3-4FCE-8A4A-ECD147720A5D}"/>
               </a:ext>
             </a:extLst>
           </p:cNvPr>
@@ -3220,7 +3220,7 @@
     </p:spTree>
     <p:extLst>
       <p:ext uri="{BB962C8B-B14F-4D97-AF65-F5344CB8AC3E}">
-        <p14:creationId xmlns="" xmlns:p14="http://schemas.microsoft.com/office/powerpoint/2010/main" val="970179299"/>
+        <p14:creationId xmlns:p14="http://schemas.microsoft.com/office/powerpoint/2010/main" xmlns="" val="970179299"/>
       </p:ext>
     </p:extLst>
   </p:cSld>
@@ -3228,7 +3228,7 @@
     <a:masterClrMapping/>
   </p:clrMapOvr>
   <mc:AlternateContent xmlns:mc="http://schemas.openxmlformats.org/markup-compatibility/2006">
-    <mc:Choice xmlns="" xmlns:p14="http://schemas.microsoft.com/office/powerpoint/2010/main" Requires="p14">
+    <mc:Choice xmlns:p14="http://schemas.microsoft.com/office/powerpoint/2010/main" xmlns="" Requires="p14">
       <p:transition spd="slow" p14:dur="2000" advClick="0" advTm="5000"/>
     </mc:Choice>
     <mc:Fallback>
@@ -3237,7 +3237,7 @@
   </mc:AlternateContent>
   <p:extLst>
     <p:ext uri="{DCECCB84-F9BA-43D5-87BE-67443E8EF086}">
-      <p15:sldGuideLst xmlns="" xmlns:p15="http://schemas.microsoft.com/office/powerpoint/2012/main">
+      <p15:sldGuideLst xmlns:p15="http://schemas.microsoft.com/office/powerpoint/2012/main" xmlns="">
         <p15:guide id="1" orient="horz" pos="2160">
           <p15:clr>
             <a:srgbClr val="FBAE40"/>
@@ -3276,7 +3276,7 @@
           <p:cNvPr id="15" name="Slide Number">
             <a:extLst>
               <a:ext uri="{FF2B5EF4-FFF2-40B4-BE49-F238E27FC236}">
-                <a16:creationId xmlns="" xmlns:a16="http://schemas.microsoft.com/office/drawing/2014/main" id="{F888EE71-82B3-40F1-A63F-7417422FB4A4}"/>
+                <a16:creationId xmlns:a16="http://schemas.microsoft.com/office/drawing/2014/main" xmlns="" id="{F888EE71-82B3-40F1-A63F-7417422FB4A4}"/>
               </a:ext>
             </a:extLst>
           </p:cNvPr>
@@ -3318,7 +3318,7 @@
           <p:cNvPr id="14" name="Text Placeholder Body">
             <a:extLst>
               <a:ext uri="{FF2B5EF4-FFF2-40B4-BE49-F238E27FC236}">
-                <a16:creationId xmlns="" xmlns:a16="http://schemas.microsoft.com/office/drawing/2014/main" id="{A2ABE920-240F-4CF6-AD45-23ED489FAD6E}"/>
+                <a16:creationId xmlns:a16="http://schemas.microsoft.com/office/drawing/2014/main" xmlns="" id="{A2ABE920-240F-4CF6-AD45-23ED489FAD6E}"/>
               </a:ext>
             </a:extLst>
           </p:cNvPr>
@@ -3624,7 +3624,7 @@
           <p:cNvPr id="10" name="Rectangle Down">
             <a:extLst>
               <a:ext uri="{FF2B5EF4-FFF2-40B4-BE49-F238E27FC236}">
-                <a16:creationId xmlns="" xmlns:a16="http://schemas.microsoft.com/office/drawing/2014/main" id="{E9B994EC-35A8-4A11-98CB-25DC28852F94}"/>
+                <a16:creationId xmlns:a16="http://schemas.microsoft.com/office/drawing/2014/main" xmlns="" id="{E9B994EC-35A8-4A11-98CB-25DC28852F94}"/>
               </a:ext>
             </a:extLst>
           </p:cNvPr>
@@ -3705,7 +3705,7 @@
           <p:cNvPr id="11" name="Rectangle Top">
             <a:extLst>
               <a:ext uri="{FF2B5EF4-FFF2-40B4-BE49-F238E27FC236}">
-                <a16:creationId xmlns="" xmlns:a16="http://schemas.microsoft.com/office/drawing/2014/main" id="{274B8F05-DFCE-47BD-BAFD-DF93E1A63BDD}"/>
+                <a16:creationId xmlns:a16="http://schemas.microsoft.com/office/drawing/2014/main" xmlns="" id="{274B8F05-DFCE-47BD-BAFD-DF93E1A63BDD}"/>
               </a:ext>
             </a:extLst>
           </p:cNvPr>
@@ -3786,7 +3786,7 @@
           <p:cNvPr id="12" name="Logo Software University" descr="Software University logo">
             <a:extLst>
               <a:ext uri="{FF2B5EF4-FFF2-40B4-BE49-F238E27FC236}">
-                <a16:creationId xmlns="" xmlns:a16="http://schemas.microsoft.com/office/drawing/2014/main" id="{233CBB95-791E-4630-B3D9-FADFCE7BCF52}"/>
+                <a16:creationId xmlns:a16="http://schemas.microsoft.com/office/drawing/2014/main" xmlns="" id="{233CBB95-791E-4630-B3D9-FADFCE7BCF52}"/>
               </a:ext>
             </a:extLst>
           </p:cNvPr>
@@ -3799,7 +3799,7 @@
           <a:blip r:embed="rId2" cstate="print">
             <a:extLst>
               <a:ext uri="{28A0092B-C50C-407E-A947-70E740481C1C}">
-                <a14:useLocalDpi xmlns="" xmlns:a14="http://schemas.microsoft.com/office/drawing/2010/main" val="0"/>
+                <a14:useLocalDpi xmlns:a14="http://schemas.microsoft.com/office/drawing/2010/main" xmlns="" val="0"/>
               </a:ext>
             </a:extLst>
           </a:blip>
@@ -3822,7 +3822,7 @@
           <p:cNvPr id="13" name="Slide Title">
             <a:extLst>
               <a:ext uri="{FF2B5EF4-FFF2-40B4-BE49-F238E27FC236}">
-                <a16:creationId xmlns="" xmlns:a16="http://schemas.microsoft.com/office/drawing/2014/main" id="{3F218E34-55D7-4290-BFE4-80F31F941551}"/>
+                <a16:creationId xmlns:a16="http://schemas.microsoft.com/office/drawing/2014/main" xmlns="" id="{3F218E34-55D7-4290-BFE4-80F31F941551}"/>
               </a:ext>
             </a:extLst>
           </p:cNvPr>
@@ -3861,7 +3861,7 @@
     </p:spTree>
     <p:extLst>
       <p:ext uri="{BB962C8B-B14F-4D97-AF65-F5344CB8AC3E}">
-        <p14:creationId xmlns="" xmlns:p14="http://schemas.microsoft.com/office/powerpoint/2010/main" val="3774019400"/>
+        <p14:creationId xmlns:p14="http://schemas.microsoft.com/office/powerpoint/2010/main" xmlns="" val="3774019400"/>
       </p:ext>
     </p:extLst>
   </p:cSld>
@@ -3869,7 +3869,7 @@
     <a:masterClrMapping/>
   </p:clrMapOvr>
   <mc:AlternateContent xmlns:mc="http://schemas.openxmlformats.org/markup-compatibility/2006">
-    <mc:Choice xmlns="" xmlns:p14="http://schemas.microsoft.com/office/powerpoint/2010/main" Requires="p14">
+    <mc:Choice xmlns:p14="http://schemas.microsoft.com/office/powerpoint/2010/main" xmlns="" Requires="p14">
       <p:transition spd="slow" p14:dur="2000" advClick="0" advTm="5000"/>
     </mc:Choice>
     <mc:Fallback>
@@ -3909,7 +3909,7 @@
           <p:cNvPr id="35" name="Rectangle Bottom">
             <a:extLst>
               <a:ext uri="{FF2B5EF4-FFF2-40B4-BE49-F238E27FC236}">
-                <a16:creationId xmlns="" xmlns:a16="http://schemas.microsoft.com/office/drawing/2014/main" id="{550A59F9-9A9D-4956-95B4-F78CC0DB1D59}"/>
+                <a16:creationId xmlns:a16="http://schemas.microsoft.com/office/drawing/2014/main" xmlns="" id="{550A59F9-9A9D-4956-95B4-F78CC0DB1D59}"/>
               </a:ext>
             </a:extLst>
           </p:cNvPr>
@@ -3990,7 +3990,7 @@
           <p:cNvPr id="53" name="Rectangle Bottom Copyright">
             <a:extLst>
               <a:ext uri="{FF2B5EF4-FFF2-40B4-BE49-F238E27FC236}">
-                <a16:creationId xmlns="" xmlns:a16="http://schemas.microsoft.com/office/drawing/2014/main" id="{B07FB7FB-DA6C-4F5D-B068-357F0FCE27D8}"/>
+                <a16:creationId xmlns:a16="http://schemas.microsoft.com/office/drawing/2014/main" xmlns="" id="{B07FB7FB-DA6C-4F5D-B068-357F0FCE27D8}"/>
               </a:ext>
             </a:extLst>
           </p:cNvPr>
@@ -4083,7 +4083,7 @@
           <p:cNvPr id="26" name="Picture SoftUni Mascot" descr="SoftUni mascot with open hand">
             <a:extLst>
               <a:ext uri="{FF2B5EF4-FFF2-40B4-BE49-F238E27FC236}">
-                <a16:creationId xmlns="" xmlns:a16="http://schemas.microsoft.com/office/drawing/2014/main" id="{247CFF3C-C4FA-493D-8505-DF469F4D36A4}"/>
+                <a16:creationId xmlns:a16="http://schemas.microsoft.com/office/drawing/2014/main" xmlns="" id="{247CFF3C-C4FA-493D-8505-DF469F4D36A4}"/>
               </a:ext>
             </a:extLst>
           </p:cNvPr>
@@ -4096,7 +4096,7 @@
           <a:blip r:embed="rId3" cstate="print">
             <a:extLst>
               <a:ext uri="{28A0092B-C50C-407E-A947-70E740481C1C}">
-                <a14:useLocalDpi xmlns="" xmlns:a14="http://schemas.microsoft.com/office/drawing/2010/main" val="0"/>
+                <a14:useLocalDpi xmlns:a14="http://schemas.microsoft.com/office/drawing/2010/main" xmlns="" val="0"/>
               </a:ext>
             </a:extLst>
           </a:blip>
@@ -4119,7 +4119,7 @@
           <p:cNvPr id="2" name="Group SoftUni Brands">
             <a:extLst>
               <a:ext uri="{FF2B5EF4-FFF2-40B4-BE49-F238E27FC236}">
-                <a16:creationId xmlns="" xmlns:a16="http://schemas.microsoft.com/office/drawing/2014/main" id="{418FAE34-C1F8-46C7-A4AE-F270D1E70F25}"/>
+                <a16:creationId xmlns:a16="http://schemas.microsoft.com/office/drawing/2014/main" xmlns="" id="{418FAE34-C1F8-46C7-A4AE-F270D1E70F25}"/>
               </a:ext>
             </a:extLst>
           </p:cNvPr>
@@ -4139,7 +4139,7 @@
             <p:cNvPr id="24" name="Picture SoftUni Kids Logo" descr="SoftUni Kids logo">
               <a:extLst>
                 <a:ext uri="{FF2B5EF4-FFF2-40B4-BE49-F238E27FC236}">
-                  <a16:creationId xmlns="" xmlns:a16="http://schemas.microsoft.com/office/drawing/2014/main" id="{B0812936-74B6-4265-8C08-AEDC8C798702}"/>
+                  <a16:creationId xmlns:a16="http://schemas.microsoft.com/office/drawing/2014/main" xmlns="" id="{B0812936-74B6-4265-8C08-AEDC8C798702}"/>
                 </a:ext>
               </a:extLst>
             </p:cNvPr>
@@ -4152,7 +4152,7 @@
             <a:blip r:embed="rId4" cstate="print">
               <a:extLst>
                 <a:ext uri="{28A0092B-C50C-407E-A947-70E740481C1C}">
-                  <a14:useLocalDpi xmlns="" xmlns:a14="http://schemas.microsoft.com/office/drawing/2010/main" val="0"/>
+                  <a14:useLocalDpi xmlns:a14="http://schemas.microsoft.com/office/drawing/2010/main" xmlns="" val="0"/>
                 </a:ext>
               </a:extLst>
             </a:blip>
@@ -4175,7 +4175,7 @@
             <p:cNvPr id="23" name="Picture SoftUni Foundation Logo" descr="SoftUni Foundation logo">
               <a:extLst>
                 <a:ext uri="{FF2B5EF4-FFF2-40B4-BE49-F238E27FC236}">
-                  <a16:creationId xmlns="" xmlns:a16="http://schemas.microsoft.com/office/drawing/2014/main" id="{6643F71A-2013-433A-8322-FBAAED3162D8}"/>
+                  <a16:creationId xmlns:a16="http://schemas.microsoft.com/office/drawing/2014/main" xmlns="" id="{6643F71A-2013-433A-8322-FBAAED3162D8}"/>
                 </a:ext>
               </a:extLst>
             </p:cNvPr>
@@ -4188,7 +4188,7 @@
             <a:blip r:embed="rId5" cstate="print">
               <a:extLst>
                 <a:ext uri="{28A0092B-C50C-407E-A947-70E740481C1C}">
-                  <a14:useLocalDpi xmlns="" xmlns:a14="http://schemas.microsoft.com/office/drawing/2010/main" val="0"/>
+                  <a14:useLocalDpi xmlns:a14="http://schemas.microsoft.com/office/drawing/2010/main" xmlns="" val="0"/>
                 </a:ext>
               </a:extLst>
             </a:blip>
@@ -4211,7 +4211,7 @@
             <p:cNvPr id="22" name="Picture SoftUni Digital Logo" descr="SoftUni Digital logo">
               <a:extLst>
                 <a:ext uri="{FF2B5EF4-FFF2-40B4-BE49-F238E27FC236}">
-                  <a16:creationId xmlns="" xmlns:a16="http://schemas.microsoft.com/office/drawing/2014/main" id="{0A83D66F-855B-463B-920B-BF239B01A206}"/>
+                  <a16:creationId xmlns:a16="http://schemas.microsoft.com/office/drawing/2014/main" xmlns="" id="{0A83D66F-855B-463B-920B-BF239B01A206}"/>
                 </a:ext>
               </a:extLst>
             </p:cNvPr>
@@ -4224,7 +4224,7 @@
             <a:blip r:embed="rId6" cstate="print">
               <a:extLst>
                 <a:ext uri="{28A0092B-C50C-407E-A947-70E740481C1C}">
-                  <a14:useLocalDpi xmlns="" xmlns:a14="http://schemas.microsoft.com/office/drawing/2010/main" val="0"/>
+                  <a14:useLocalDpi xmlns:a14="http://schemas.microsoft.com/office/drawing/2010/main" xmlns="" val="0"/>
                 </a:ext>
               </a:extLst>
             </a:blip>
@@ -4247,7 +4247,7 @@
             <p:cNvPr id="21" name="Picture SoftUni Creative Logo" descr="SoftUni Creative logo">
               <a:extLst>
                 <a:ext uri="{FF2B5EF4-FFF2-40B4-BE49-F238E27FC236}">
-                  <a16:creationId xmlns="" xmlns:a16="http://schemas.microsoft.com/office/drawing/2014/main" id="{EA755AAE-BA08-481C-9224-0061170EE4B8}"/>
+                  <a16:creationId xmlns:a16="http://schemas.microsoft.com/office/drawing/2014/main" xmlns="" id="{EA755AAE-BA08-481C-9224-0061170EE4B8}"/>
                 </a:ext>
               </a:extLst>
             </p:cNvPr>
@@ -4260,7 +4260,7 @@
             <a:blip r:embed="rId7" cstate="print">
               <a:extLst>
                 <a:ext uri="{28A0092B-C50C-407E-A947-70E740481C1C}">
-                  <a14:useLocalDpi xmlns="" xmlns:a14="http://schemas.microsoft.com/office/drawing/2010/main" val="0"/>
+                  <a14:useLocalDpi xmlns:a14="http://schemas.microsoft.com/office/drawing/2010/main" xmlns="" val="0"/>
                 </a:ext>
               </a:extLst>
             </a:blip>
@@ -4283,7 +4283,7 @@
             <p:cNvPr id="20" name="Picture SoftUni Svetlina Logo" descr="SoftUni Svetlina logo">
               <a:extLst>
                 <a:ext uri="{FF2B5EF4-FFF2-40B4-BE49-F238E27FC236}">
-                  <a16:creationId xmlns="" xmlns:a16="http://schemas.microsoft.com/office/drawing/2014/main" id="{827D15FD-4C66-4B85-98E6-7826AA8F61C6}"/>
+                  <a16:creationId xmlns:a16="http://schemas.microsoft.com/office/drawing/2014/main" xmlns="" id="{827D15FD-4C66-4B85-98E6-7826AA8F61C6}"/>
                 </a:ext>
               </a:extLst>
             </p:cNvPr>
@@ -4296,7 +4296,7 @@
             <a:blip r:embed="rId8" cstate="print">
               <a:extLst>
                 <a:ext uri="{28A0092B-C50C-407E-A947-70E740481C1C}">
-                  <a14:useLocalDpi xmlns="" xmlns:a14="http://schemas.microsoft.com/office/drawing/2010/main" val="0"/>
+                  <a14:useLocalDpi xmlns:a14="http://schemas.microsoft.com/office/drawing/2010/main" xmlns="" val="0"/>
                 </a:ext>
               </a:extLst>
             </a:blip>
@@ -4319,7 +4319,7 @@
             <p:cNvPr id="25" name="Picture Software University Logo" descr="Software University logo">
               <a:extLst>
                 <a:ext uri="{FF2B5EF4-FFF2-40B4-BE49-F238E27FC236}">
-                  <a16:creationId xmlns="" xmlns:a16="http://schemas.microsoft.com/office/drawing/2014/main" id="{C74C190C-5856-41B9-8819-AE8DE0E10980}"/>
+                  <a16:creationId xmlns:a16="http://schemas.microsoft.com/office/drawing/2014/main" xmlns="" id="{C74C190C-5856-41B9-8819-AE8DE0E10980}"/>
                 </a:ext>
               </a:extLst>
             </p:cNvPr>
@@ -4332,7 +4332,7 @@
             <a:blip r:embed="rId9" cstate="print">
               <a:extLst>
                 <a:ext uri="{28A0092B-C50C-407E-A947-70E740481C1C}">
-                  <a14:useLocalDpi xmlns="" xmlns:a14="http://schemas.microsoft.com/office/drawing/2010/main" val="0"/>
+                  <a14:useLocalDpi xmlns:a14="http://schemas.microsoft.com/office/drawing/2010/main" xmlns="" val="0"/>
                 </a:ext>
               </a:extLst>
             </a:blip>
@@ -4355,7 +4355,7 @@
             <p:cNvPr id="33" name="Straight Connector 6">
               <a:extLst>
                 <a:ext uri="{FF2B5EF4-FFF2-40B4-BE49-F238E27FC236}">
-                  <a16:creationId xmlns="" xmlns:a16="http://schemas.microsoft.com/office/drawing/2014/main" id="{5C63D1E8-4A92-4691-8A24-A2FC7E8008E5}"/>
+                  <a16:creationId xmlns:a16="http://schemas.microsoft.com/office/drawing/2014/main" xmlns="" id="{5C63D1E8-4A92-4691-8A24-A2FC7E8008E5}"/>
                 </a:ext>
               </a:extLst>
             </p:cNvPr>
@@ -4394,7 +4394,7 @@
             <p:cNvPr id="32" name="Straight Connector 5">
               <a:extLst>
                 <a:ext uri="{FF2B5EF4-FFF2-40B4-BE49-F238E27FC236}">
-                  <a16:creationId xmlns="" xmlns:a16="http://schemas.microsoft.com/office/drawing/2014/main" id="{6E91D320-3732-40B8-864D-142D0A277ED1}"/>
+                  <a16:creationId xmlns:a16="http://schemas.microsoft.com/office/drawing/2014/main" xmlns="" id="{6E91D320-3732-40B8-864D-142D0A277ED1}"/>
                 </a:ext>
               </a:extLst>
             </p:cNvPr>
@@ -4433,7 +4433,7 @@
             <p:cNvPr id="31" name="Straight Connector 4">
               <a:extLst>
                 <a:ext uri="{FF2B5EF4-FFF2-40B4-BE49-F238E27FC236}">
-                  <a16:creationId xmlns="" xmlns:a16="http://schemas.microsoft.com/office/drawing/2014/main" id="{299ABE09-E33C-46B7-A80D-7BF4A6956211}"/>
+                  <a16:creationId xmlns:a16="http://schemas.microsoft.com/office/drawing/2014/main" xmlns="" id="{299ABE09-E33C-46B7-A80D-7BF4A6956211}"/>
                 </a:ext>
               </a:extLst>
             </p:cNvPr>
@@ -4470,7 +4470,7 @@
             <p:cNvPr id="30" name="Straight Connector 3">
               <a:extLst>
                 <a:ext uri="{FF2B5EF4-FFF2-40B4-BE49-F238E27FC236}">
-                  <a16:creationId xmlns="" xmlns:a16="http://schemas.microsoft.com/office/drawing/2014/main" id="{93DDBF37-0764-47AA-94E3-9A44F3ED8FB5}"/>
+                  <a16:creationId xmlns:a16="http://schemas.microsoft.com/office/drawing/2014/main" xmlns="" id="{93DDBF37-0764-47AA-94E3-9A44F3ED8FB5}"/>
                 </a:ext>
               </a:extLst>
             </p:cNvPr>
@@ -4507,7 +4507,7 @@
             <p:cNvPr id="29" name="Straight Connector 2">
               <a:extLst>
                 <a:ext uri="{FF2B5EF4-FFF2-40B4-BE49-F238E27FC236}">
-                  <a16:creationId xmlns="" xmlns:a16="http://schemas.microsoft.com/office/drawing/2014/main" id="{72BFE2F3-0845-4E5B-9375-E9D4027DD675}"/>
+                  <a16:creationId xmlns:a16="http://schemas.microsoft.com/office/drawing/2014/main" xmlns="" id="{72BFE2F3-0845-4E5B-9375-E9D4027DD675}"/>
                 </a:ext>
               </a:extLst>
             </p:cNvPr>
@@ -4544,7 +4544,7 @@
             <p:cNvPr id="28" name="Straight Connector 1">
               <a:extLst>
                 <a:ext uri="{FF2B5EF4-FFF2-40B4-BE49-F238E27FC236}">
-                  <a16:creationId xmlns="" xmlns:a16="http://schemas.microsoft.com/office/drawing/2014/main" id="{D4E5982E-3110-47E1-A5BB-91B7BECC3093}"/>
+                  <a16:creationId xmlns:a16="http://schemas.microsoft.com/office/drawing/2014/main" xmlns="" id="{D4E5982E-3110-47E1-A5BB-91B7BECC3093}"/>
                 </a:ext>
               </a:extLst>
             </p:cNvPr>
@@ -4581,7 +4581,7 @@
             <p:cNvPr id="27" name="Straight Connector Horizontal">
               <a:extLst>
                 <a:ext uri="{FF2B5EF4-FFF2-40B4-BE49-F238E27FC236}">
-                  <a16:creationId xmlns="" xmlns:a16="http://schemas.microsoft.com/office/drawing/2014/main" id="{5F62FB7C-BD6E-4383-98C1-2CF30F34CAFD}"/>
+                  <a16:creationId xmlns:a16="http://schemas.microsoft.com/office/drawing/2014/main" xmlns="" id="{5F62FB7C-BD6E-4383-98C1-2CF30F34CAFD}"/>
                 </a:ext>
               </a:extLst>
             </p:cNvPr>
@@ -4620,7 +4620,7 @@
             <p:cNvPr id="34" name="Straight Connector 0">
               <a:extLst>
                 <a:ext uri="{FF2B5EF4-FFF2-40B4-BE49-F238E27FC236}">
-                  <a16:creationId xmlns="" xmlns:a16="http://schemas.microsoft.com/office/drawing/2014/main" id="{C84A0FE1-723D-4682-8682-77BAD950EE15}"/>
+                  <a16:creationId xmlns:a16="http://schemas.microsoft.com/office/drawing/2014/main" xmlns="" id="{C84A0FE1-723D-4682-8682-77BAD950EE15}"/>
                 </a:ext>
               </a:extLst>
             </p:cNvPr>
@@ -4657,7 +4657,7 @@
             <p:cNvPr id="18" name="Picture SoftUni Logo" descr="SoftUni logo">
               <a:extLst>
                 <a:ext uri="{FF2B5EF4-FFF2-40B4-BE49-F238E27FC236}">
-                  <a16:creationId xmlns="" xmlns:a16="http://schemas.microsoft.com/office/drawing/2014/main" id="{A0675455-B7FA-4569-A5FD-A3B0F20B2A26}"/>
+                  <a16:creationId xmlns:a16="http://schemas.microsoft.com/office/drawing/2014/main" xmlns="" id="{A0675455-B7FA-4569-A5FD-A3B0F20B2A26}"/>
                 </a:ext>
               </a:extLst>
             </p:cNvPr>
@@ -4670,7 +4670,7 @@
             <a:blip r:embed="rId10" cstate="print">
               <a:extLst>
                 <a:ext uri="{28A0092B-C50C-407E-A947-70E740481C1C}">
-                  <a14:useLocalDpi xmlns="" xmlns:a14="http://schemas.microsoft.com/office/drawing/2010/main" val="0"/>
+                  <a14:useLocalDpi xmlns:a14="http://schemas.microsoft.com/office/drawing/2010/main" xmlns="" val="0"/>
                 </a:ext>
               </a:extLst>
             </a:blip>
@@ -4694,7 +4694,7 @@
           <p:cNvPr id="19" name="Slide Title">
             <a:extLst>
               <a:ext uri="{FF2B5EF4-FFF2-40B4-BE49-F238E27FC236}">
-                <a16:creationId xmlns="" xmlns:a16="http://schemas.microsoft.com/office/drawing/2014/main" id="{7CFDBB16-985C-4CC7-B6DB-B81B36037922}"/>
+                <a16:creationId xmlns:a16="http://schemas.microsoft.com/office/drawing/2014/main" xmlns="" id="{7CFDBB16-985C-4CC7-B6DB-B81B36037922}"/>
               </a:ext>
             </a:extLst>
           </p:cNvPr>
@@ -4797,7 +4797,7 @@
           <p:cNvPr id="36" name="Logo Software University" descr="Software University logo">
             <a:extLst>
               <a:ext uri="{FF2B5EF4-FFF2-40B4-BE49-F238E27FC236}">
-                <a16:creationId xmlns="" xmlns:a16="http://schemas.microsoft.com/office/drawing/2014/main" id="{67FC4D2E-913D-432A-B658-F0D82839FA5E}"/>
+                <a16:creationId xmlns:a16="http://schemas.microsoft.com/office/drawing/2014/main" xmlns="" id="{67FC4D2E-913D-432A-B658-F0D82839FA5E}"/>
               </a:ext>
             </a:extLst>
           </p:cNvPr>
@@ -4820,7 +4820,7 @@
             </a:clrChange>
             <a:extLst>
               <a:ext uri="{28A0092B-C50C-407E-A947-70E740481C1C}">
-                <a14:useLocalDpi xmlns="" xmlns:a14="http://schemas.microsoft.com/office/drawing/2010/main" val="0"/>
+                <a14:useLocalDpi xmlns:a14="http://schemas.microsoft.com/office/drawing/2010/main" xmlns="" val="0"/>
               </a:ext>
             </a:extLst>
           </a:blip>
@@ -4841,7 +4841,7 @@
     </p:spTree>
     <p:extLst>
       <p:ext uri="{BB962C8B-B14F-4D97-AF65-F5344CB8AC3E}">
-        <p14:creationId xmlns="" xmlns:p14="http://schemas.microsoft.com/office/powerpoint/2010/main" val="4192061223"/>
+        <p14:creationId xmlns:p14="http://schemas.microsoft.com/office/powerpoint/2010/main" xmlns="" val="4192061223"/>
       </p:ext>
     </p:extLst>
   </p:cSld>
@@ -4849,7 +4849,7 @@
     <a:masterClrMapping/>
   </p:clrMapOvr>
   <mc:AlternateContent xmlns:mc="http://schemas.openxmlformats.org/markup-compatibility/2006">
-    <mc:Choice xmlns="" xmlns:p14="http://schemas.microsoft.com/office/powerpoint/2010/main" Requires="p14">
+    <mc:Choice xmlns:p14="http://schemas.microsoft.com/office/powerpoint/2010/main" xmlns="" Requires="p14">
       <p:transition spd="slow" p14:dur="2000" advClick="0" advTm="5000"/>
     </mc:Choice>
     <mc:Fallback>
@@ -4858,7 +4858,7 @@
   </mc:AlternateContent>
   <p:extLst>
     <p:ext uri="{DCECCB84-F9BA-43D5-87BE-67443E8EF086}">
-      <p15:sldGuideLst xmlns="" xmlns:p15="http://schemas.microsoft.com/office/powerpoint/2012/main">
+      <p15:sldGuideLst xmlns:p15="http://schemas.microsoft.com/office/powerpoint/2012/main" xmlns="">
         <p15:guide id="1" orient="horz" pos="2160">
           <p15:clr>
             <a:srgbClr val="FBAE40"/>
@@ -4897,7 +4897,7 @@
           <p:cNvPr id="13" name="Slide Number">
             <a:extLst>
               <a:ext uri="{FF2B5EF4-FFF2-40B4-BE49-F238E27FC236}">
-                <a16:creationId xmlns="" xmlns:a16="http://schemas.microsoft.com/office/drawing/2014/main" id="{5B8761D8-B42F-4A70-A0CE-682CEB2AE31B}"/>
+                <a16:creationId xmlns:a16="http://schemas.microsoft.com/office/drawing/2014/main" xmlns="" id="{5B8761D8-B42F-4A70-A0CE-682CEB2AE31B}"/>
               </a:ext>
             </a:extLst>
           </p:cNvPr>
@@ -4940,7 +4940,7 @@
             <a:hlinkClick r:id="rId2" tooltip="Software University Discussion Forum"/>
             <a:extLst>
               <a:ext uri="{FF2B5EF4-FFF2-40B4-BE49-F238E27FC236}">
-                <a16:creationId xmlns="" xmlns:a16="http://schemas.microsoft.com/office/drawing/2014/main" id="{98C579AD-FAF5-4B28-9B52-5457F1E90061}"/>
+                <a16:creationId xmlns:a16="http://schemas.microsoft.com/office/drawing/2014/main" xmlns="" id="{98C579AD-FAF5-4B28-9B52-5457F1E90061}"/>
               </a:ext>
             </a:extLst>
           </p:cNvPr>
@@ -4953,7 +4953,7 @@
           <a:blip r:embed="rId3" cstate="print">
             <a:extLst>
               <a:ext uri="{28A0092B-C50C-407E-A947-70E740481C1C}">
-                <a14:useLocalDpi xmlns="" xmlns:a14="http://schemas.microsoft.com/office/drawing/2010/main"/>
+                <a14:useLocalDpi xmlns:a14="http://schemas.microsoft.com/office/drawing/2010/main" xmlns=""/>
               </a:ext>
             </a:extLst>
           </a:blip>
@@ -4977,7 +4977,7 @@
             <a:hlinkClick r:id="rId4" tooltip="Software University @ Facebook"/>
             <a:extLst>
               <a:ext uri="{FF2B5EF4-FFF2-40B4-BE49-F238E27FC236}">
-                <a16:creationId xmlns="" xmlns:a16="http://schemas.microsoft.com/office/drawing/2014/main" id="{6B2C510E-5EF2-49F6-B926-2BD74CD3C7F8}"/>
+                <a16:creationId xmlns:a16="http://schemas.microsoft.com/office/drawing/2014/main" xmlns="" id="{6B2C510E-5EF2-49F6-B926-2BD74CD3C7F8}"/>
               </a:ext>
             </a:extLst>
           </p:cNvPr>
@@ -4990,7 +4990,7 @@
           <a:blip r:embed="rId5" cstate="print">
             <a:extLst>
               <a:ext uri="{28A0092B-C50C-407E-A947-70E740481C1C}">
-                <a14:useLocalDpi xmlns="" xmlns:a14="http://schemas.microsoft.com/office/drawing/2010/main"/>
+                <a14:useLocalDpi xmlns:a14="http://schemas.microsoft.com/office/drawing/2010/main" xmlns=""/>
               </a:ext>
             </a:extLst>
           </a:blip>
@@ -5008,7 +5008,7 @@
           <a:noFill/>
           <a:extLst>
             <a:ext uri="{909E8E84-426E-40DD-AFC4-6F175D3DCCD1}">
-              <a14:hiddenFill xmlns="" xmlns:a14="http://schemas.microsoft.com/office/drawing/2010/main">
+              <a14:hiddenFill xmlns:a14="http://schemas.microsoft.com/office/drawing/2010/main" xmlns="">
                 <a:solidFill>
                   <a:srgbClr val="FFFFFF"/>
                 </a:solidFill>
@@ -5023,7 +5023,7 @@
             <a:hlinkClick r:id="rId6"/>
             <a:extLst>
               <a:ext uri="{FF2B5EF4-FFF2-40B4-BE49-F238E27FC236}">
-                <a16:creationId xmlns="" xmlns:a16="http://schemas.microsoft.com/office/drawing/2014/main" id="{F4604840-E810-44B7-9FF1-3B28CD68B758}"/>
+                <a16:creationId xmlns:a16="http://schemas.microsoft.com/office/drawing/2014/main" xmlns="" id="{F4604840-E810-44B7-9FF1-3B28CD68B758}"/>
               </a:ext>
             </a:extLst>
           </p:cNvPr>
@@ -5036,7 +5036,7 @@
           <a:blip r:embed="rId7" cstate="print">
             <a:extLst>
               <a:ext uri="{28A0092B-C50C-407E-A947-70E740481C1C}">
-                <a14:useLocalDpi xmlns="" xmlns:a14="http://schemas.microsoft.com/office/drawing/2010/main" val="0"/>
+                <a14:useLocalDpi xmlns:a14="http://schemas.microsoft.com/office/drawing/2010/main" xmlns="" val="0"/>
               </a:ext>
             </a:extLst>
           </a:blip>
@@ -5060,7 +5060,7 @@
             <a:hlinkClick r:id="rId8"/>
             <a:extLst>
               <a:ext uri="{FF2B5EF4-FFF2-40B4-BE49-F238E27FC236}">
-                <a16:creationId xmlns="" xmlns:a16="http://schemas.microsoft.com/office/drawing/2014/main" id="{07C965FA-A87E-4824-AFA8-C67AF548A76A}"/>
+                <a16:creationId xmlns:a16="http://schemas.microsoft.com/office/drawing/2014/main" xmlns="" id="{07C965FA-A87E-4824-AFA8-C67AF548A76A}"/>
               </a:ext>
             </a:extLst>
           </p:cNvPr>
@@ -5073,7 +5073,7 @@
           <a:blip r:embed="rId9" cstate="print">
             <a:extLst>
               <a:ext uri="{28A0092B-C50C-407E-A947-70E740481C1C}">
-                <a14:useLocalDpi xmlns="" xmlns:a14="http://schemas.microsoft.com/office/drawing/2010/main" val="0"/>
+                <a14:useLocalDpi xmlns:a14="http://schemas.microsoft.com/office/drawing/2010/main" xmlns="" val="0"/>
               </a:ext>
             </a:extLst>
           </a:blip>
@@ -5095,7 +5095,7 @@
           <p:cNvPr id="12" name="Slide Body Text">
             <a:extLst>
               <a:ext uri="{FF2B5EF4-FFF2-40B4-BE49-F238E27FC236}">
-                <a16:creationId xmlns="" xmlns:a16="http://schemas.microsoft.com/office/drawing/2014/main" id="{0C1F9416-8B6E-46DE-973C-777785E27A26}"/>
+                <a16:creationId xmlns:a16="http://schemas.microsoft.com/office/drawing/2014/main" xmlns="" id="{0C1F9416-8B6E-46DE-973C-777785E27A26}"/>
               </a:ext>
             </a:extLst>
           </p:cNvPr>
@@ -5223,7 +5223,7 @@
           <p:cNvPr id="10" name="Rectangle Top">
             <a:extLst>
               <a:ext uri="{FF2B5EF4-FFF2-40B4-BE49-F238E27FC236}">
-                <a16:creationId xmlns="" xmlns:a16="http://schemas.microsoft.com/office/drawing/2014/main" id="{86646B95-5E3B-4DE8-9118-031C2C296D8C}"/>
+                <a16:creationId xmlns:a16="http://schemas.microsoft.com/office/drawing/2014/main" xmlns="" id="{86646B95-5E3B-4DE8-9118-031C2C296D8C}"/>
               </a:ext>
             </a:extLst>
           </p:cNvPr>
@@ -5304,7 +5304,7 @@
           <p:cNvPr id="11" name="Logo Software University" descr="Software University logo">
             <a:extLst>
               <a:ext uri="{FF2B5EF4-FFF2-40B4-BE49-F238E27FC236}">
-                <a16:creationId xmlns="" xmlns:a16="http://schemas.microsoft.com/office/drawing/2014/main" id="{58AB1944-B146-4E89-B2D9-426EB610F319}"/>
+                <a16:creationId xmlns:a16="http://schemas.microsoft.com/office/drawing/2014/main" xmlns="" id="{58AB1944-B146-4E89-B2D9-426EB610F319}"/>
               </a:ext>
             </a:extLst>
           </p:cNvPr>
@@ -5317,7 +5317,7 @@
           <a:blip r:embed="rId11" cstate="print">
             <a:extLst>
               <a:ext uri="{28A0092B-C50C-407E-A947-70E740481C1C}">
-                <a14:useLocalDpi xmlns="" xmlns:a14="http://schemas.microsoft.com/office/drawing/2010/main" val="0"/>
+                <a14:useLocalDpi xmlns:a14="http://schemas.microsoft.com/office/drawing/2010/main" xmlns="" val="0"/>
               </a:ext>
             </a:extLst>
           </a:blip>
@@ -5340,7 +5340,7 @@
           <p:cNvPr id="18" name="Slide Title">
             <a:extLst>
               <a:ext uri="{FF2B5EF4-FFF2-40B4-BE49-F238E27FC236}">
-                <a16:creationId xmlns="" xmlns:a16="http://schemas.microsoft.com/office/drawing/2014/main" id="{AE87ED9C-76E1-4D85-9B06-3AF44AABB668}"/>
+                <a16:creationId xmlns:a16="http://schemas.microsoft.com/office/drawing/2014/main" xmlns="" id="{AE87ED9C-76E1-4D85-9B06-3AF44AABB668}"/>
               </a:ext>
             </a:extLst>
           </p:cNvPr>
@@ -5379,7 +5379,7 @@
     </p:spTree>
     <p:extLst>
       <p:ext uri="{BB962C8B-B14F-4D97-AF65-F5344CB8AC3E}">
-        <p14:creationId xmlns="" xmlns:p14="http://schemas.microsoft.com/office/powerpoint/2010/main" val="2196466322"/>
+        <p14:creationId xmlns:p14="http://schemas.microsoft.com/office/powerpoint/2010/main" xmlns="" val="2196466322"/>
       </p:ext>
     </p:extLst>
   </p:cSld>
@@ -5387,7 +5387,7 @@
     <a:masterClrMapping/>
   </p:clrMapOvr>
   <mc:AlternateContent xmlns:mc="http://schemas.openxmlformats.org/markup-compatibility/2006">
-    <mc:Choice xmlns="" xmlns:p14="http://schemas.microsoft.com/office/powerpoint/2010/main" Requires="p14">
+    <mc:Choice xmlns:p14="http://schemas.microsoft.com/office/powerpoint/2010/main" xmlns="" Requires="p14">
       <p:transition spd="slow" p14:dur="2000" advClick="0" advTm="5000"/>
     </mc:Choice>
     <mc:Fallback>
@@ -5583,7 +5583,7 @@
     </p:spTree>
     <p:extLst>
       <p:ext uri="{BB962C8B-B14F-4D97-AF65-F5344CB8AC3E}">
-        <p14:creationId xmlns="" xmlns:p14="http://schemas.microsoft.com/office/powerpoint/2010/main" val="3529216409"/>
+        <p14:creationId xmlns:p14="http://schemas.microsoft.com/office/powerpoint/2010/main" xmlns="" val="3529216409"/>
       </p:ext>
     </p:extLst>
   </p:cSld>
@@ -5591,7 +5591,7 @@
     <a:masterClrMapping/>
   </p:clrMapOvr>
   <mc:AlternateContent xmlns:mc="http://schemas.openxmlformats.org/markup-compatibility/2006">
-    <mc:Choice xmlns="" xmlns:p14="http://schemas.microsoft.com/office/powerpoint/2010/main" Requires="p14">
+    <mc:Choice xmlns:p14="http://schemas.microsoft.com/office/powerpoint/2010/main" xmlns="" Requires="p14">
       <p:transition spd="slow" p14:dur="2000" advClick="0" advTm="5000"/>
     </mc:Choice>
     <mc:Fallback>
@@ -5623,7 +5623,7 @@
           <p:cNvPr id="7" name="Slide Number">
             <a:extLst>
               <a:ext uri="{FF2B5EF4-FFF2-40B4-BE49-F238E27FC236}">
-                <a16:creationId xmlns="" xmlns:a16="http://schemas.microsoft.com/office/drawing/2014/main" id="{C1780DB1-0AF0-4108-AFE1-9DA99F0DBCB8}"/>
+                <a16:creationId xmlns:a16="http://schemas.microsoft.com/office/drawing/2014/main" xmlns="" id="{C1780DB1-0AF0-4108-AFE1-9DA99F0DBCB8}"/>
               </a:ext>
             </a:extLst>
           </p:cNvPr>
@@ -5665,7 +5665,7 @@
           <p:cNvPr id="3" name="Slide Body Text">
             <a:extLst>
               <a:ext uri="{FF2B5EF4-FFF2-40B4-BE49-F238E27FC236}">
-                <a16:creationId xmlns="" xmlns:a16="http://schemas.microsoft.com/office/drawing/2014/main" id="{5A9D2960-6D42-439F-82E8-812822013A10}"/>
+                <a16:creationId xmlns:a16="http://schemas.microsoft.com/office/drawing/2014/main" xmlns="" id="{5A9D2960-6D42-439F-82E8-812822013A10}"/>
               </a:ext>
             </a:extLst>
           </p:cNvPr>
@@ -5743,7 +5743,7 @@
           <p:cNvPr id="13" name="Rectangle Top">
             <a:extLst>
               <a:ext uri="{FF2B5EF4-FFF2-40B4-BE49-F238E27FC236}">
-                <a16:creationId xmlns="" xmlns:a16="http://schemas.microsoft.com/office/drawing/2014/main" id="{391AFA4E-7870-4561-A1B8-AC956B0C8931}"/>
+                <a16:creationId xmlns:a16="http://schemas.microsoft.com/office/drawing/2014/main" xmlns="" id="{391AFA4E-7870-4561-A1B8-AC956B0C8931}"/>
               </a:ext>
             </a:extLst>
           </p:cNvPr>
@@ -5824,7 +5824,7 @@
           <p:cNvPr id="12" name="Logo Software University" descr="Software University logo">
             <a:extLst>
               <a:ext uri="{FF2B5EF4-FFF2-40B4-BE49-F238E27FC236}">
-                <a16:creationId xmlns="" xmlns:a16="http://schemas.microsoft.com/office/drawing/2014/main" id="{B1D3B425-B9BF-43ED-9DEC-C05002FBA22F}"/>
+                <a16:creationId xmlns:a16="http://schemas.microsoft.com/office/drawing/2014/main" xmlns="" id="{B1D3B425-B9BF-43ED-9DEC-C05002FBA22F}"/>
               </a:ext>
             </a:extLst>
           </p:cNvPr>
@@ -5837,7 +5837,7 @@
           <a:blip r:embed="rId2" cstate="print">
             <a:extLst>
               <a:ext uri="{28A0092B-C50C-407E-A947-70E740481C1C}">
-                <a14:useLocalDpi xmlns="" xmlns:a14="http://schemas.microsoft.com/office/drawing/2010/main" val="0"/>
+                <a14:useLocalDpi xmlns:a14="http://schemas.microsoft.com/office/drawing/2010/main" xmlns="" val="0"/>
               </a:ext>
             </a:extLst>
           </a:blip>
@@ -5860,7 +5860,7 @@
           <p:cNvPr id="6" name="Slide Title">
             <a:extLst>
               <a:ext uri="{FF2B5EF4-FFF2-40B4-BE49-F238E27FC236}">
-                <a16:creationId xmlns="" xmlns:a16="http://schemas.microsoft.com/office/drawing/2014/main" id="{19B5B676-7892-440F-8191-7109B2C59885}"/>
+                <a16:creationId xmlns:a16="http://schemas.microsoft.com/office/drawing/2014/main" xmlns="" id="{19B5B676-7892-440F-8191-7109B2C59885}"/>
               </a:ext>
             </a:extLst>
           </p:cNvPr>
@@ -5899,7 +5899,7 @@
     </p:spTree>
     <p:extLst>
       <p:ext uri="{BB962C8B-B14F-4D97-AF65-F5344CB8AC3E}">
-        <p14:creationId xmlns="" xmlns:p14="http://schemas.microsoft.com/office/powerpoint/2010/main" val="1102970716"/>
+        <p14:creationId xmlns:p14="http://schemas.microsoft.com/office/powerpoint/2010/main" xmlns="" val="1102970716"/>
       </p:ext>
     </p:extLst>
   </p:cSld>
@@ -5907,7 +5907,7 @@
     <a:masterClrMapping/>
   </p:clrMapOvr>
   <mc:AlternateContent xmlns:mc="http://schemas.openxmlformats.org/markup-compatibility/2006">
-    <mc:Choice xmlns="" xmlns:p14="http://schemas.microsoft.com/office/powerpoint/2010/main" Requires="p14">
+    <mc:Choice xmlns:p14="http://schemas.microsoft.com/office/powerpoint/2010/main" xmlns="" Requires="p14">
       <p:transition spd="slow" p14:dur="2000" advClick="0" advTm="5000"/>
     </mc:Choice>
     <mc:Fallback>
@@ -5939,7 +5939,7 @@
           <p:cNvPr id="9" name="Slide Number">
             <a:extLst>
               <a:ext uri="{FF2B5EF4-FFF2-40B4-BE49-F238E27FC236}">
-                <a16:creationId xmlns="" xmlns:a16="http://schemas.microsoft.com/office/drawing/2014/main" id="{0020EB61-2079-41A3-B356-B1D8D48D786E}"/>
+                <a16:creationId xmlns:a16="http://schemas.microsoft.com/office/drawing/2014/main" xmlns="" id="{0020EB61-2079-41A3-B356-B1D8D48D786E}"/>
               </a:ext>
             </a:extLst>
           </p:cNvPr>
@@ -6056,7 +6056,7 @@
           <p:cNvPr id="7" name="Slide Body Text">
             <a:extLst>
               <a:ext uri="{FF2B5EF4-FFF2-40B4-BE49-F238E27FC236}">
-                <a16:creationId xmlns="" xmlns:a16="http://schemas.microsoft.com/office/drawing/2014/main" id="{CB4CB13C-66A1-466B-A6C1-B0BABF5CFEC1}"/>
+                <a16:creationId xmlns:a16="http://schemas.microsoft.com/office/drawing/2014/main" xmlns="" id="{CB4CB13C-66A1-466B-A6C1-B0BABF5CFEC1}"/>
               </a:ext>
             </a:extLst>
           </p:cNvPr>
@@ -6154,7 +6154,7 @@
           <p:cNvPr id="3" name="Logo Software University" descr="Software University logo">
             <a:extLst>
               <a:ext uri="{FF2B5EF4-FFF2-40B4-BE49-F238E27FC236}">
-                <a16:creationId xmlns="" xmlns:a16="http://schemas.microsoft.com/office/drawing/2014/main" id="{5573C101-930B-47AC-967A-A64513DFFDEE}"/>
+                <a16:creationId xmlns:a16="http://schemas.microsoft.com/office/drawing/2014/main" xmlns="" id="{5573C101-930B-47AC-967A-A64513DFFDEE}"/>
               </a:ext>
             </a:extLst>
           </p:cNvPr>
@@ -6177,7 +6177,7 @@
             </a:clrChange>
             <a:extLst>
               <a:ext uri="{28A0092B-C50C-407E-A947-70E740481C1C}">
-                <a14:useLocalDpi xmlns="" xmlns:a14="http://schemas.microsoft.com/office/drawing/2010/main" val="0"/>
+                <a14:useLocalDpi xmlns:a14="http://schemas.microsoft.com/office/drawing/2010/main" xmlns="" val="0"/>
               </a:ext>
             </a:extLst>
           </a:blip>
@@ -6200,7 +6200,7 @@
           <p:cNvPr id="8" name="Slide Title">
             <a:extLst>
               <a:ext uri="{FF2B5EF4-FFF2-40B4-BE49-F238E27FC236}">
-                <a16:creationId xmlns="" xmlns:a16="http://schemas.microsoft.com/office/drawing/2014/main" id="{E2DA9691-CDF5-499C-94BB-AAA61DAC1BFB}"/>
+                <a16:creationId xmlns:a16="http://schemas.microsoft.com/office/drawing/2014/main" xmlns="" id="{E2DA9691-CDF5-499C-94BB-AAA61DAC1BFB}"/>
               </a:ext>
             </a:extLst>
           </p:cNvPr>
@@ -6237,7 +6237,7 @@
           <p:cNvPr id="10" name="Group 9">
             <a:extLst>
               <a:ext uri="{FF2B5EF4-FFF2-40B4-BE49-F238E27FC236}">
-                <a16:creationId xmlns="" xmlns:a16="http://schemas.microsoft.com/office/drawing/2014/main" id="{43CDBCC2-1C96-44BC-B992-7B0C49C34904}"/>
+                <a16:creationId xmlns:a16="http://schemas.microsoft.com/office/drawing/2014/main" xmlns="" id="{43CDBCC2-1C96-44BC-B992-7B0C49C34904}"/>
               </a:ext>
             </a:extLst>
           </p:cNvPr>
@@ -6257,7 +6257,7 @@
             <p:cNvPr id="11" name="Group 10">
               <a:extLst>
                 <a:ext uri="{FF2B5EF4-FFF2-40B4-BE49-F238E27FC236}">
-                  <a16:creationId xmlns="" xmlns:a16="http://schemas.microsoft.com/office/drawing/2014/main" id="{7D71B3A8-4D39-42CF-9255-81EA3A622DD6}"/>
+                  <a16:creationId xmlns:a16="http://schemas.microsoft.com/office/drawing/2014/main" xmlns="" id="{7D71B3A8-4D39-42CF-9255-81EA3A622DD6}"/>
                 </a:ext>
               </a:extLst>
             </p:cNvPr>
@@ -6277,7 +6277,7 @@
               <p:cNvPr id="25" name="Oval 24">
                 <a:extLst>
                   <a:ext uri="{FF2B5EF4-FFF2-40B4-BE49-F238E27FC236}">
-                    <a16:creationId xmlns="" xmlns:a16="http://schemas.microsoft.com/office/drawing/2014/main" id="{B98059F9-1874-426D-8AF7-A12C21F37DD9}"/>
+                    <a16:creationId xmlns:a16="http://schemas.microsoft.com/office/drawing/2014/main" xmlns="" id="{B98059F9-1874-426D-8AF7-A12C21F37DD9}"/>
                   </a:ext>
                 </a:extLst>
               </p:cNvPr>
@@ -6329,7 +6329,7 @@
               <p:cNvPr id="26" name="Rectangle 5">
                 <a:extLst>
                   <a:ext uri="{FF2B5EF4-FFF2-40B4-BE49-F238E27FC236}">
-                    <a16:creationId xmlns="" xmlns:a16="http://schemas.microsoft.com/office/drawing/2014/main" id="{A3A1E077-DBDF-48F0-A924-604984B940A2}"/>
+                    <a16:creationId xmlns:a16="http://schemas.microsoft.com/office/drawing/2014/main" xmlns="" id="{A3A1E077-DBDF-48F0-A924-604984B940A2}"/>
                   </a:ext>
                 </a:extLst>
               </p:cNvPr>
@@ -6474,7 +6474,7 @@
               <p:cNvPr id="27" name="Rectangle 5">
                 <a:extLst>
                   <a:ext uri="{FF2B5EF4-FFF2-40B4-BE49-F238E27FC236}">
-                    <a16:creationId xmlns="" xmlns:a16="http://schemas.microsoft.com/office/drawing/2014/main" id="{798B1F51-1FA4-4199-81C7-62356C936CC9}"/>
+                    <a16:creationId xmlns:a16="http://schemas.microsoft.com/office/drawing/2014/main" xmlns="" id="{798B1F51-1FA4-4199-81C7-62356C936CC9}"/>
                   </a:ext>
                 </a:extLst>
               </p:cNvPr>
@@ -6619,7 +6619,7 @@
               <p:cNvPr id="28" name="Arc 27">
                 <a:extLst>
                   <a:ext uri="{FF2B5EF4-FFF2-40B4-BE49-F238E27FC236}">
-                    <a16:creationId xmlns="" xmlns:a16="http://schemas.microsoft.com/office/drawing/2014/main" id="{40A224C8-1233-40F7-96AB-BFF79AF6CDCB}"/>
+                    <a16:creationId xmlns:a16="http://schemas.microsoft.com/office/drawing/2014/main" xmlns="" id="{40A224C8-1233-40F7-96AB-BFF79AF6CDCB}"/>
                   </a:ext>
                 </a:extLst>
               </p:cNvPr>
@@ -6678,7 +6678,7 @@
               <p:cNvPr id="29" name="Arc 28">
                 <a:extLst>
                   <a:ext uri="{FF2B5EF4-FFF2-40B4-BE49-F238E27FC236}">
-                    <a16:creationId xmlns="" xmlns:a16="http://schemas.microsoft.com/office/drawing/2014/main" id="{B57C7CCC-E218-4321-8C7B-3F0C5753C7A1}"/>
+                    <a16:creationId xmlns:a16="http://schemas.microsoft.com/office/drawing/2014/main" xmlns="" id="{B57C7CCC-E218-4321-8C7B-3F0C5753C7A1}"/>
                   </a:ext>
                 </a:extLst>
               </p:cNvPr>
@@ -6738,7 +6738,7 @@
             <p:cNvPr id="13" name="Rectangle: Rounded Corners 12">
               <a:extLst>
                 <a:ext uri="{FF2B5EF4-FFF2-40B4-BE49-F238E27FC236}">
-                  <a16:creationId xmlns="" xmlns:a16="http://schemas.microsoft.com/office/drawing/2014/main" id="{6AF309CA-A56C-4ABC-B293-420F4EB1A9B4}"/>
+                  <a16:creationId xmlns:a16="http://schemas.microsoft.com/office/drawing/2014/main" xmlns="" id="{6AF309CA-A56C-4ABC-B293-420F4EB1A9B4}"/>
                 </a:ext>
               </a:extLst>
             </p:cNvPr>
@@ -6792,7 +6792,7 @@
             <p:cNvPr id="14" name="Rectangle: Rounded Corners 13">
               <a:extLst>
                 <a:ext uri="{FF2B5EF4-FFF2-40B4-BE49-F238E27FC236}">
-                  <a16:creationId xmlns="" xmlns:a16="http://schemas.microsoft.com/office/drawing/2014/main" id="{07955808-2AC7-44EB-8B6D-82B974E53A3C}"/>
+                  <a16:creationId xmlns:a16="http://schemas.microsoft.com/office/drawing/2014/main" xmlns="" id="{07955808-2AC7-44EB-8B6D-82B974E53A3C}"/>
                 </a:ext>
               </a:extLst>
             </p:cNvPr>
@@ -6853,7 +6853,7 @@
             <p:cNvPr id="15" name="Straight Connector 14">
               <a:extLst>
                 <a:ext uri="{FF2B5EF4-FFF2-40B4-BE49-F238E27FC236}">
-                  <a16:creationId xmlns="" xmlns:a16="http://schemas.microsoft.com/office/drawing/2014/main" id="{AC6420D7-AEAB-45EF-8D46-11EB06E4AFEA}"/>
+                  <a16:creationId xmlns:a16="http://schemas.microsoft.com/office/drawing/2014/main" xmlns="" id="{AC6420D7-AEAB-45EF-8D46-11EB06E4AFEA}"/>
                 </a:ext>
               </a:extLst>
             </p:cNvPr>
@@ -6899,7 +6899,7 @@
             <p:cNvPr id="16" name="Straight Connector 15">
               <a:extLst>
                 <a:ext uri="{FF2B5EF4-FFF2-40B4-BE49-F238E27FC236}">
-                  <a16:creationId xmlns="" xmlns:a16="http://schemas.microsoft.com/office/drawing/2014/main" id="{76C7FABC-6773-44F6-990B-3EB082BE9B35}"/>
+                  <a16:creationId xmlns:a16="http://schemas.microsoft.com/office/drawing/2014/main" xmlns="" id="{76C7FABC-6773-44F6-990B-3EB082BE9B35}"/>
                 </a:ext>
               </a:extLst>
             </p:cNvPr>
@@ -6945,7 +6945,7 @@
             <p:cNvPr id="17" name="Group 16">
               <a:extLst>
                 <a:ext uri="{FF2B5EF4-FFF2-40B4-BE49-F238E27FC236}">
-                  <a16:creationId xmlns="" xmlns:a16="http://schemas.microsoft.com/office/drawing/2014/main" id="{1FAD48E1-DC45-4B3D-9CE5-613250708496}"/>
+                  <a16:creationId xmlns:a16="http://schemas.microsoft.com/office/drawing/2014/main" xmlns="" id="{1FAD48E1-DC45-4B3D-9CE5-613250708496}"/>
                 </a:ext>
               </a:extLst>
             </p:cNvPr>
@@ -6968,7 +6968,7 @@
               <p:cNvPr id="23" name="Straight Connector 22">
                 <a:extLst>
                   <a:ext uri="{FF2B5EF4-FFF2-40B4-BE49-F238E27FC236}">
-                    <a16:creationId xmlns="" xmlns:a16="http://schemas.microsoft.com/office/drawing/2014/main" id="{B01FD1D1-046F-457B-AB63-2702CE3E906E}"/>
+                    <a16:creationId xmlns:a16="http://schemas.microsoft.com/office/drawing/2014/main" xmlns="" id="{B01FD1D1-046F-457B-AB63-2702CE3E906E}"/>
                   </a:ext>
                 </a:extLst>
               </p:cNvPr>
@@ -7012,7 +7012,7 @@
               <p:cNvPr id="24" name="Straight Connector 23">
                 <a:extLst>
                   <a:ext uri="{FF2B5EF4-FFF2-40B4-BE49-F238E27FC236}">
-                    <a16:creationId xmlns="" xmlns:a16="http://schemas.microsoft.com/office/drawing/2014/main" id="{895660C3-C72C-43EE-9C4A-170F85E5BE08}"/>
+                    <a16:creationId xmlns:a16="http://schemas.microsoft.com/office/drawing/2014/main" xmlns="" id="{895660C3-C72C-43EE-9C4A-170F85E5BE08}"/>
                   </a:ext>
                 </a:extLst>
               </p:cNvPr>
@@ -7057,7 +7057,7 @@
             <p:cNvPr id="19" name="Straight Connector 18">
               <a:extLst>
                 <a:ext uri="{FF2B5EF4-FFF2-40B4-BE49-F238E27FC236}">
-                  <a16:creationId xmlns="" xmlns:a16="http://schemas.microsoft.com/office/drawing/2014/main" id="{A74EE503-8FC0-42A6-8860-CA4EE42272E4}"/>
+                  <a16:creationId xmlns:a16="http://schemas.microsoft.com/office/drawing/2014/main" xmlns="" id="{A74EE503-8FC0-42A6-8860-CA4EE42272E4}"/>
                 </a:ext>
               </a:extLst>
             </p:cNvPr>
@@ -7103,7 +7103,7 @@
             <p:cNvPr id="12" name="Rectangle: Rounded Corners 11">
               <a:extLst>
                 <a:ext uri="{FF2B5EF4-FFF2-40B4-BE49-F238E27FC236}">
-                  <a16:creationId xmlns="" xmlns:a16="http://schemas.microsoft.com/office/drawing/2014/main" id="{F4189FDA-9FE8-490B-8A70-2E941811021F}"/>
+                  <a16:creationId xmlns:a16="http://schemas.microsoft.com/office/drawing/2014/main" xmlns="" id="{F4189FDA-9FE8-490B-8A70-2E941811021F}"/>
                 </a:ext>
               </a:extLst>
             </p:cNvPr>
@@ -7157,7 +7157,7 @@
             <p:cNvPr id="18" name="Group 17">
               <a:extLst>
                 <a:ext uri="{FF2B5EF4-FFF2-40B4-BE49-F238E27FC236}">
-                  <a16:creationId xmlns="" xmlns:a16="http://schemas.microsoft.com/office/drawing/2014/main" id="{FDA3EFCD-0DF8-419D-8533-D781521E597E}"/>
+                  <a16:creationId xmlns:a16="http://schemas.microsoft.com/office/drawing/2014/main" xmlns="" id="{FDA3EFCD-0DF8-419D-8533-D781521E597E}"/>
                 </a:ext>
               </a:extLst>
             </p:cNvPr>
@@ -7180,7 +7180,7 @@
               <p:cNvPr id="21" name="Straight Connector 20">
                 <a:extLst>
                   <a:ext uri="{FF2B5EF4-FFF2-40B4-BE49-F238E27FC236}">
-                    <a16:creationId xmlns="" xmlns:a16="http://schemas.microsoft.com/office/drawing/2014/main" id="{C3CC6A5A-182E-4A09-9C04-EB191881D789}"/>
+                    <a16:creationId xmlns:a16="http://schemas.microsoft.com/office/drawing/2014/main" xmlns="" id="{C3CC6A5A-182E-4A09-9C04-EB191881D789}"/>
                   </a:ext>
                 </a:extLst>
               </p:cNvPr>
@@ -7224,7 +7224,7 @@
               <p:cNvPr id="22" name="Straight Connector 21">
                 <a:extLst>
                   <a:ext uri="{FF2B5EF4-FFF2-40B4-BE49-F238E27FC236}">
-                    <a16:creationId xmlns="" xmlns:a16="http://schemas.microsoft.com/office/drawing/2014/main" id="{440C8953-0555-48CC-8255-78F17E053EE7}"/>
+                    <a16:creationId xmlns:a16="http://schemas.microsoft.com/office/drawing/2014/main" xmlns="" id="{440C8953-0555-48CC-8255-78F17E053EE7}"/>
                   </a:ext>
                 </a:extLst>
               </p:cNvPr>
@@ -7270,7 +7270,7 @@
           <p:cNvPr id="34" name="Straight Connector 33">
             <a:extLst>
               <a:ext uri="{FF2B5EF4-FFF2-40B4-BE49-F238E27FC236}">
-                <a16:creationId xmlns="" xmlns:a16="http://schemas.microsoft.com/office/drawing/2014/main" id="{29B538CA-8CCB-43FB-B5E5-5FC04EBC1F54}"/>
+                <a16:creationId xmlns:a16="http://schemas.microsoft.com/office/drawing/2014/main" xmlns="" id="{29B538CA-8CCB-43FB-B5E5-5FC04EBC1F54}"/>
               </a:ext>
             </a:extLst>
           </p:cNvPr>
@@ -7315,7 +7315,7 @@
     </p:spTree>
     <p:extLst>
       <p:ext uri="{BB962C8B-B14F-4D97-AF65-F5344CB8AC3E}">
-        <p14:creationId xmlns="" xmlns:p14="http://schemas.microsoft.com/office/powerpoint/2010/main" val="743545348"/>
+        <p14:creationId xmlns:p14="http://schemas.microsoft.com/office/powerpoint/2010/main" xmlns="" val="743545348"/>
       </p:ext>
     </p:extLst>
   </p:cSld>
@@ -7323,7 +7323,7 @@
     <a:masterClrMapping/>
   </p:clrMapOvr>
   <mc:AlternateContent xmlns:mc="http://schemas.openxmlformats.org/markup-compatibility/2006">
-    <mc:Choice xmlns="" xmlns:p14="http://schemas.microsoft.com/office/powerpoint/2010/main" Requires="p14">
+    <mc:Choice xmlns:p14="http://schemas.microsoft.com/office/powerpoint/2010/main" xmlns="" Requires="p14">
       <p:transition spd="slow" p14:dur="2000" advClick="0" advTm="5000"/>
     </mc:Choice>
     <mc:Fallback>
@@ -7355,7 +7355,7 @@
           <p:cNvPr id="9" name="Slide Number">
             <a:extLst>
               <a:ext uri="{FF2B5EF4-FFF2-40B4-BE49-F238E27FC236}">
-                <a16:creationId xmlns="" xmlns:a16="http://schemas.microsoft.com/office/drawing/2014/main" id="{1865BF6B-7F07-4E9C-879F-80E36EEB3405}"/>
+                <a16:creationId xmlns:a16="http://schemas.microsoft.com/office/drawing/2014/main" xmlns="" id="{1865BF6B-7F07-4E9C-879F-80E36EEB3405}"/>
               </a:ext>
             </a:extLst>
           </p:cNvPr>
@@ -7397,7 +7397,7 @@
           <p:cNvPr id="12" name="Rectangle Left">
             <a:extLst>
               <a:ext uri="{FF2B5EF4-FFF2-40B4-BE49-F238E27FC236}">
-                <a16:creationId xmlns="" xmlns:a16="http://schemas.microsoft.com/office/drawing/2014/main" id="{345FB1C8-7F66-4D5C-ACCE-AE919936BCFD}"/>
+                <a16:creationId xmlns:a16="http://schemas.microsoft.com/office/drawing/2014/main" xmlns="" id="{345FB1C8-7F66-4D5C-ACCE-AE919936BCFD}"/>
               </a:ext>
             </a:extLst>
           </p:cNvPr>
@@ -7478,7 +7478,7 @@
           <p:cNvPr id="15" name="Slide Body Text">
             <a:extLst>
               <a:ext uri="{FF2B5EF4-FFF2-40B4-BE49-F238E27FC236}">
-                <a16:creationId xmlns="" xmlns:a16="http://schemas.microsoft.com/office/drawing/2014/main" id="{6157C8DE-E0AF-422B-BBB1-F0AF1264B5E9}"/>
+                <a16:creationId xmlns:a16="http://schemas.microsoft.com/office/drawing/2014/main" xmlns="" id="{6157C8DE-E0AF-422B-BBB1-F0AF1264B5E9}"/>
               </a:ext>
             </a:extLst>
           </p:cNvPr>
@@ -7576,7 +7576,7 @@
           <p:cNvPr id="16" name="Logo Software University" descr="Software University logo">
             <a:extLst>
               <a:ext uri="{FF2B5EF4-FFF2-40B4-BE49-F238E27FC236}">
-                <a16:creationId xmlns="" xmlns:a16="http://schemas.microsoft.com/office/drawing/2014/main" id="{EFEBB553-EACE-4B4F-8B4F-7629FDD910A4}"/>
+                <a16:creationId xmlns:a16="http://schemas.microsoft.com/office/drawing/2014/main" xmlns="" id="{EFEBB553-EACE-4B4F-8B4F-7629FDD910A4}"/>
               </a:ext>
             </a:extLst>
           </p:cNvPr>
@@ -7599,7 +7599,7 @@
             </a:clrChange>
             <a:extLst>
               <a:ext uri="{28A0092B-C50C-407E-A947-70E740481C1C}">
-                <a14:useLocalDpi xmlns="" xmlns:a14="http://schemas.microsoft.com/office/drawing/2010/main" val="0"/>
+                <a14:useLocalDpi xmlns:a14="http://schemas.microsoft.com/office/drawing/2010/main" xmlns="" val="0"/>
               </a:ext>
             </a:extLst>
           </a:blip>
@@ -7622,7 +7622,7 @@
           <p:cNvPr id="13" name="Slide Title">
             <a:extLst>
               <a:ext uri="{FF2B5EF4-FFF2-40B4-BE49-F238E27FC236}">
-                <a16:creationId xmlns="" xmlns:a16="http://schemas.microsoft.com/office/drawing/2014/main" id="{0D5CC956-5C4A-44BE-8F8B-327FAFA51E97}"/>
+                <a16:creationId xmlns:a16="http://schemas.microsoft.com/office/drawing/2014/main" xmlns="" id="{0D5CC956-5C4A-44BE-8F8B-327FAFA51E97}"/>
               </a:ext>
             </a:extLst>
           </p:cNvPr>
@@ -7659,7 +7659,7 @@
           <p:cNvPr id="33" name="Group 32">
             <a:extLst>
               <a:ext uri="{FF2B5EF4-FFF2-40B4-BE49-F238E27FC236}">
-                <a16:creationId xmlns="" xmlns:a16="http://schemas.microsoft.com/office/drawing/2014/main" id="{7CF60135-47AA-48F0-96BA-0E795668ABDB}"/>
+                <a16:creationId xmlns:a16="http://schemas.microsoft.com/office/drawing/2014/main" xmlns="" id="{7CF60135-47AA-48F0-96BA-0E795668ABDB}"/>
               </a:ext>
             </a:extLst>
           </p:cNvPr>
@@ -7679,7 +7679,7 @@
             <p:cNvPr id="34" name="Group 33">
               <a:extLst>
                 <a:ext uri="{FF2B5EF4-FFF2-40B4-BE49-F238E27FC236}">
-                  <a16:creationId xmlns="" xmlns:a16="http://schemas.microsoft.com/office/drawing/2014/main" id="{2823380E-3936-41AF-BDF7-DA54D75BBF6B}"/>
+                  <a16:creationId xmlns:a16="http://schemas.microsoft.com/office/drawing/2014/main" xmlns="" id="{2823380E-3936-41AF-BDF7-DA54D75BBF6B}"/>
                 </a:ext>
               </a:extLst>
             </p:cNvPr>
@@ -7699,7 +7699,7 @@
               <p:cNvPr id="47" name="Oval 46">
                 <a:extLst>
                   <a:ext uri="{FF2B5EF4-FFF2-40B4-BE49-F238E27FC236}">
-                    <a16:creationId xmlns="" xmlns:a16="http://schemas.microsoft.com/office/drawing/2014/main" id="{52B047D9-D8DD-45C7-9BC8-6D4F682F5182}"/>
+                    <a16:creationId xmlns:a16="http://schemas.microsoft.com/office/drawing/2014/main" xmlns="" id="{52B047D9-D8DD-45C7-9BC8-6D4F682F5182}"/>
                   </a:ext>
                 </a:extLst>
               </p:cNvPr>
@@ -7751,7 +7751,7 @@
               <p:cNvPr id="48" name="Rectangle 5">
                 <a:extLst>
                   <a:ext uri="{FF2B5EF4-FFF2-40B4-BE49-F238E27FC236}">
-                    <a16:creationId xmlns="" xmlns:a16="http://schemas.microsoft.com/office/drawing/2014/main" id="{4D84FE51-BD8E-47EA-9463-CE02FEA31766}"/>
+                    <a16:creationId xmlns:a16="http://schemas.microsoft.com/office/drawing/2014/main" xmlns="" id="{4D84FE51-BD8E-47EA-9463-CE02FEA31766}"/>
                   </a:ext>
                 </a:extLst>
               </p:cNvPr>
@@ -7896,7 +7896,7 @@
               <p:cNvPr id="49" name="Rectangle 5">
                 <a:extLst>
                   <a:ext uri="{FF2B5EF4-FFF2-40B4-BE49-F238E27FC236}">
-                    <a16:creationId xmlns="" xmlns:a16="http://schemas.microsoft.com/office/drawing/2014/main" id="{F5C8F037-C197-4219-AC87-3A81763512BC}"/>
+                    <a16:creationId xmlns:a16="http://schemas.microsoft.com/office/drawing/2014/main" xmlns="" id="{F5C8F037-C197-4219-AC87-3A81763512BC}"/>
                   </a:ext>
                 </a:extLst>
               </p:cNvPr>
@@ -8041,7 +8041,7 @@
               <p:cNvPr id="50" name="Arc 49">
                 <a:extLst>
                   <a:ext uri="{FF2B5EF4-FFF2-40B4-BE49-F238E27FC236}">
-                    <a16:creationId xmlns="" xmlns:a16="http://schemas.microsoft.com/office/drawing/2014/main" id="{786EE401-CF8E-439B-94A0-EE6F3A7D5798}"/>
+                    <a16:creationId xmlns:a16="http://schemas.microsoft.com/office/drawing/2014/main" xmlns="" id="{786EE401-CF8E-439B-94A0-EE6F3A7D5798}"/>
                   </a:ext>
                 </a:extLst>
               </p:cNvPr>
@@ -8100,7 +8100,7 @@
               <p:cNvPr id="51" name="Arc 50">
                 <a:extLst>
                   <a:ext uri="{FF2B5EF4-FFF2-40B4-BE49-F238E27FC236}">
-                    <a16:creationId xmlns="" xmlns:a16="http://schemas.microsoft.com/office/drawing/2014/main" id="{8D9ACD38-B3EB-4A63-9730-CBF0501BF235}"/>
+                    <a16:creationId xmlns:a16="http://schemas.microsoft.com/office/drawing/2014/main" xmlns="" id="{8D9ACD38-B3EB-4A63-9730-CBF0501BF235}"/>
                   </a:ext>
                 </a:extLst>
               </p:cNvPr>
@@ -8160,7 +8160,7 @@
             <p:cNvPr id="35" name="Rectangle: Rounded Corners 34">
               <a:extLst>
                 <a:ext uri="{FF2B5EF4-FFF2-40B4-BE49-F238E27FC236}">
-                  <a16:creationId xmlns="" xmlns:a16="http://schemas.microsoft.com/office/drawing/2014/main" id="{64EE493E-A353-4C75-A3B9-D48ABA2C57CC}"/>
+                  <a16:creationId xmlns:a16="http://schemas.microsoft.com/office/drawing/2014/main" xmlns="" id="{64EE493E-A353-4C75-A3B9-D48ABA2C57CC}"/>
                 </a:ext>
               </a:extLst>
             </p:cNvPr>
@@ -8214,7 +8214,7 @@
             <p:cNvPr id="36" name="Rectangle: Rounded Corners 35">
               <a:extLst>
                 <a:ext uri="{FF2B5EF4-FFF2-40B4-BE49-F238E27FC236}">
-                  <a16:creationId xmlns="" xmlns:a16="http://schemas.microsoft.com/office/drawing/2014/main" id="{718408B9-204E-42E3-9E79-33E047E869BC}"/>
+                  <a16:creationId xmlns:a16="http://schemas.microsoft.com/office/drawing/2014/main" xmlns="" id="{718408B9-204E-42E3-9E79-33E047E869BC}"/>
                 </a:ext>
               </a:extLst>
             </p:cNvPr>
@@ -8275,7 +8275,7 @@
             <p:cNvPr id="37" name="Straight Connector 36">
               <a:extLst>
                 <a:ext uri="{FF2B5EF4-FFF2-40B4-BE49-F238E27FC236}">
-                  <a16:creationId xmlns="" xmlns:a16="http://schemas.microsoft.com/office/drawing/2014/main" id="{0AB66D97-DF6F-4CD2-AF13-42B5C852F673}"/>
+                  <a16:creationId xmlns:a16="http://schemas.microsoft.com/office/drawing/2014/main" xmlns="" id="{0AB66D97-DF6F-4CD2-AF13-42B5C852F673}"/>
                 </a:ext>
               </a:extLst>
             </p:cNvPr>
@@ -8321,7 +8321,7 @@
             <p:cNvPr id="38" name="Straight Connector 37">
               <a:extLst>
                 <a:ext uri="{FF2B5EF4-FFF2-40B4-BE49-F238E27FC236}">
-                  <a16:creationId xmlns="" xmlns:a16="http://schemas.microsoft.com/office/drawing/2014/main" id="{F2AFBA69-C196-4703-8AAB-5F72A8EDCEB5}"/>
+                  <a16:creationId xmlns:a16="http://schemas.microsoft.com/office/drawing/2014/main" xmlns="" id="{F2AFBA69-C196-4703-8AAB-5F72A8EDCEB5}"/>
                 </a:ext>
               </a:extLst>
             </p:cNvPr>
@@ -8367,7 +8367,7 @@
             <p:cNvPr id="39" name="Group 38">
               <a:extLst>
                 <a:ext uri="{FF2B5EF4-FFF2-40B4-BE49-F238E27FC236}">
-                  <a16:creationId xmlns="" xmlns:a16="http://schemas.microsoft.com/office/drawing/2014/main" id="{9AFC66C1-0C1C-4332-9C4E-782574C896B8}"/>
+                  <a16:creationId xmlns:a16="http://schemas.microsoft.com/office/drawing/2014/main" xmlns="" id="{9AFC66C1-0C1C-4332-9C4E-782574C896B8}"/>
                 </a:ext>
               </a:extLst>
             </p:cNvPr>
@@ -8390,7 +8390,7 @@
               <p:cNvPr id="45" name="Straight Connector 44">
                 <a:extLst>
                   <a:ext uri="{FF2B5EF4-FFF2-40B4-BE49-F238E27FC236}">
-                    <a16:creationId xmlns="" xmlns:a16="http://schemas.microsoft.com/office/drawing/2014/main" id="{872CA8AD-EAF6-40BE-9DDE-ECDB4A980CA5}"/>
+                    <a16:creationId xmlns:a16="http://schemas.microsoft.com/office/drawing/2014/main" xmlns="" id="{872CA8AD-EAF6-40BE-9DDE-ECDB4A980CA5}"/>
                   </a:ext>
                 </a:extLst>
               </p:cNvPr>
@@ -8434,7 +8434,7 @@
               <p:cNvPr id="46" name="Straight Connector 45">
                 <a:extLst>
                   <a:ext uri="{FF2B5EF4-FFF2-40B4-BE49-F238E27FC236}">
-                    <a16:creationId xmlns="" xmlns:a16="http://schemas.microsoft.com/office/drawing/2014/main" id="{57DD3EC7-1A13-4AFE-BD6F-DA12C281FAFB}"/>
+                    <a16:creationId xmlns:a16="http://schemas.microsoft.com/office/drawing/2014/main" xmlns="" id="{57DD3EC7-1A13-4AFE-BD6F-DA12C281FAFB}"/>
                   </a:ext>
                 </a:extLst>
               </p:cNvPr>
@@ -8479,7 +8479,7 @@
             <p:cNvPr id="40" name="Straight Connector 39">
               <a:extLst>
                 <a:ext uri="{FF2B5EF4-FFF2-40B4-BE49-F238E27FC236}">
-                  <a16:creationId xmlns="" xmlns:a16="http://schemas.microsoft.com/office/drawing/2014/main" id="{E46151FA-19E9-4E84-A082-EDAC6F76EA9D}"/>
+                  <a16:creationId xmlns:a16="http://schemas.microsoft.com/office/drawing/2014/main" xmlns="" id="{E46151FA-19E9-4E84-A082-EDAC6F76EA9D}"/>
                 </a:ext>
               </a:extLst>
             </p:cNvPr>
@@ -8525,7 +8525,7 @@
             <p:cNvPr id="41" name="Rectangle: Rounded Corners 40">
               <a:extLst>
                 <a:ext uri="{FF2B5EF4-FFF2-40B4-BE49-F238E27FC236}">
-                  <a16:creationId xmlns="" xmlns:a16="http://schemas.microsoft.com/office/drawing/2014/main" id="{3423EEF0-5B70-4091-B2DA-0740D2609643}"/>
+                  <a16:creationId xmlns:a16="http://schemas.microsoft.com/office/drawing/2014/main" xmlns="" id="{3423EEF0-5B70-4091-B2DA-0740D2609643}"/>
                 </a:ext>
               </a:extLst>
             </p:cNvPr>
@@ -8579,7 +8579,7 @@
             <p:cNvPr id="42" name="Group 41">
               <a:extLst>
                 <a:ext uri="{FF2B5EF4-FFF2-40B4-BE49-F238E27FC236}">
-                  <a16:creationId xmlns="" xmlns:a16="http://schemas.microsoft.com/office/drawing/2014/main" id="{49A8AAA7-98E7-4224-B027-830FFCC285A3}"/>
+                  <a16:creationId xmlns:a16="http://schemas.microsoft.com/office/drawing/2014/main" xmlns="" id="{49A8AAA7-98E7-4224-B027-830FFCC285A3}"/>
                 </a:ext>
               </a:extLst>
             </p:cNvPr>
@@ -8602,7 +8602,7 @@
               <p:cNvPr id="43" name="Straight Connector 42">
                 <a:extLst>
                   <a:ext uri="{FF2B5EF4-FFF2-40B4-BE49-F238E27FC236}">
-                    <a16:creationId xmlns="" xmlns:a16="http://schemas.microsoft.com/office/drawing/2014/main" id="{2129EC38-471E-4685-973E-BA7A7F567C42}"/>
+                    <a16:creationId xmlns:a16="http://schemas.microsoft.com/office/drawing/2014/main" xmlns="" id="{2129EC38-471E-4685-973E-BA7A7F567C42}"/>
                   </a:ext>
                 </a:extLst>
               </p:cNvPr>
@@ -8646,7 +8646,7 @@
               <p:cNvPr id="44" name="Straight Connector 43">
                 <a:extLst>
                   <a:ext uri="{FF2B5EF4-FFF2-40B4-BE49-F238E27FC236}">
-                    <a16:creationId xmlns="" xmlns:a16="http://schemas.microsoft.com/office/drawing/2014/main" id="{678142BE-84C9-4834-B6CC-6623E401661C}"/>
+                    <a16:creationId xmlns:a16="http://schemas.microsoft.com/office/drawing/2014/main" xmlns="" id="{678142BE-84C9-4834-B6CC-6623E401661C}"/>
                   </a:ext>
                 </a:extLst>
               </p:cNvPr>
@@ -8690,7 +8690,7 @@
     </p:spTree>
     <p:extLst>
       <p:ext uri="{BB962C8B-B14F-4D97-AF65-F5344CB8AC3E}">
-        <p14:creationId xmlns="" xmlns:p14="http://schemas.microsoft.com/office/powerpoint/2010/main" val="1679651758"/>
+        <p14:creationId xmlns:p14="http://schemas.microsoft.com/office/powerpoint/2010/main" xmlns="" val="1679651758"/>
       </p:ext>
     </p:extLst>
   </p:cSld>
@@ -8698,7 +8698,7 @@
     <a:masterClrMapping/>
   </p:clrMapOvr>
   <mc:AlternateContent xmlns:mc="http://schemas.openxmlformats.org/markup-compatibility/2006">
-    <mc:Choice xmlns="" xmlns:p14="http://schemas.microsoft.com/office/powerpoint/2010/main" Requires="p14">
+    <mc:Choice xmlns:p14="http://schemas.microsoft.com/office/powerpoint/2010/main" xmlns="" Requires="p14">
       <p:transition spd="slow" p14:dur="2000" advClick="0" advTm="5000"/>
     </mc:Choice>
     <mc:Fallback>
@@ -8730,7 +8730,7 @@
           <p:cNvPr id="5" name="Slide Number">
             <a:extLst>
               <a:ext uri="{FF2B5EF4-FFF2-40B4-BE49-F238E27FC236}">
-                <a16:creationId xmlns="" xmlns:a16="http://schemas.microsoft.com/office/drawing/2014/main" id="{F0B8C963-1813-4B69-AD27-6D02EBBBB569}"/>
+                <a16:creationId xmlns:a16="http://schemas.microsoft.com/office/drawing/2014/main" xmlns="" id="{F0B8C963-1813-4B69-AD27-6D02EBBBB569}"/>
               </a:ext>
             </a:extLst>
           </p:cNvPr>
@@ -8772,7 +8772,7 @@
           <p:cNvPr id="3" name="Rectangle Left">
             <a:extLst>
               <a:ext uri="{FF2B5EF4-FFF2-40B4-BE49-F238E27FC236}">
-                <a16:creationId xmlns="" xmlns:a16="http://schemas.microsoft.com/office/drawing/2014/main" id="{345FB1C8-7F66-4D5C-ACCE-AE919936BCFD}"/>
+                <a16:creationId xmlns:a16="http://schemas.microsoft.com/office/drawing/2014/main" xmlns="" id="{345FB1C8-7F66-4D5C-ACCE-AE919936BCFD}"/>
               </a:ext>
             </a:extLst>
           </p:cNvPr>
@@ -8853,7 +8853,7 @@
           <p:cNvPr id="7" name="Slide Body Text">
             <a:extLst>
               <a:ext uri="{FF2B5EF4-FFF2-40B4-BE49-F238E27FC236}">
-                <a16:creationId xmlns="" xmlns:a16="http://schemas.microsoft.com/office/drawing/2014/main" id="{7296EDA7-D37D-4B31-A888-371F0804124F}"/>
+                <a16:creationId xmlns:a16="http://schemas.microsoft.com/office/drawing/2014/main" xmlns="" id="{7296EDA7-D37D-4B31-A888-371F0804124F}"/>
               </a:ext>
             </a:extLst>
           </p:cNvPr>
@@ -8951,7 +8951,7 @@
           <p:cNvPr id="6" name="Slide Title">
             <a:extLst>
               <a:ext uri="{FF2B5EF4-FFF2-40B4-BE49-F238E27FC236}">
-                <a16:creationId xmlns="" xmlns:a16="http://schemas.microsoft.com/office/drawing/2014/main" id="{55A88B09-3557-48A3-BF27-42699C269215}"/>
+                <a16:creationId xmlns:a16="http://schemas.microsoft.com/office/drawing/2014/main" xmlns="" id="{55A88B09-3557-48A3-BF27-42699C269215}"/>
               </a:ext>
             </a:extLst>
           </p:cNvPr>
@@ -8988,7 +8988,7 @@
           <p:cNvPr id="28" name="Group 27">
             <a:extLst>
               <a:ext uri="{FF2B5EF4-FFF2-40B4-BE49-F238E27FC236}">
-                <a16:creationId xmlns="" xmlns:a16="http://schemas.microsoft.com/office/drawing/2014/main" id="{C4248838-4E67-439E-AE0A-0043D2CB04D6}"/>
+                <a16:creationId xmlns:a16="http://schemas.microsoft.com/office/drawing/2014/main" xmlns="" id="{C4248838-4E67-439E-AE0A-0043D2CB04D6}"/>
               </a:ext>
             </a:extLst>
           </p:cNvPr>
@@ -9008,7 +9008,7 @@
             <p:cNvPr id="29" name="Group 28">
               <a:extLst>
                 <a:ext uri="{FF2B5EF4-FFF2-40B4-BE49-F238E27FC236}">
-                  <a16:creationId xmlns="" xmlns:a16="http://schemas.microsoft.com/office/drawing/2014/main" id="{810CFD6A-2427-49D5-846A-5F93601D4184}"/>
+                  <a16:creationId xmlns:a16="http://schemas.microsoft.com/office/drawing/2014/main" xmlns="" id="{810CFD6A-2427-49D5-846A-5F93601D4184}"/>
                 </a:ext>
               </a:extLst>
             </p:cNvPr>
@@ -9028,7 +9028,7 @@
               <p:cNvPr id="42" name="Oval 41">
                 <a:extLst>
                   <a:ext uri="{FF2B5EF4-FFF2-40B4-BE49-F238E27FC236}">
-                    <a16:creationId xmlns="" xmlns:a16="http://schemas.microsoft.com/office/drawing/2014/main" id="{017B1AE5-5C36-4839-BA1F-B404EA44E701}"/>
+                    <a16:creationId xmlns:a16="http://schemas.microsoft.com/office/drawing/2014/main" xmlns="" id="{017B1AE5-5C36-4839-BA1F-B404EA44E701}"/>
                   </a:ext>
                 </a:extLst>
               </p:cNvPr>
@@ -9080,7 +9080,7 @@
               <p:cNvPr id="43" name="Rectangle 5">
                 <a:extLst>
                   <a:ext uri="{FF2B5EF4-FFF2-40B4-BE49-F238E27FC236}">
-                    <a16:creationId xmlns="" xmlns:a16="http://schemas.microsoft.com/office/drawing/2014/main" id="{FB963D79-BB49-4A1D-BA66-EA0670C79BAE}"/>
+                    <a16:creationId xmlns:a16="http://schemas.microsoft.com/office/drawing/2014/main" xmlns="" id="{FB963D79-BB49-4A1D-BA66-EA0670C79BAE}"/>
                   </a:ext>
                 </a:extLst>
               </p:cNvPr>
@@ -9225,7 +9225,7 @@
               <p:cNvPr id="44" name="Rectangle 5">
                 <a:extLst>
                   <a:ext uri="{FF2B5EF4-FFF2-40B4-BE49-F238E27FC236}">
-                    <a16:creationId xmlns="" xmlns:a16="http://schemas.microsoft.com/office/drawing/2014/main" id="{6D7746D8-B913-493B-AAE9-25BC6893D40E}"/>
+                    <a16:creationId xmlns:a16="http://schemas.microsoft.com/office/drawing/2014/main" xmlns="" id="{6D7746D8-B913-493B-AAE9-25BC6893D40E}"/>
                   </a:ext>
                 </a:extLst>
               </p:cNvPr>
@@ -9370,7 +9370,7 @@
               <p:cNvPr id="45" name="Arc 44">
                 <a:extLst>
                   <a:ext uri="{FF2B5EF4-FFF2-40B4-BE49-F238E27FC236}">
-                    <a16:creationId xmlns="" xmlns:a16="http://schemas.microsoft.com/office/drawing/2014/main" id="{29031C02-E965-417B-8799-96061B14F30D}"/>
+                    <a16:creationId xmlns:a16="http://schemas.microsoft.com/office/drawing/2014/main" xmlns="" id="{29031C02-E965-417B-8799-96061B14F30D}"/>
                   </a:ext>
                 </a:extLst>
               </p:cNvPr>
@@ -9429,7 +9429,7 @@
               <p:cNvPr id="46" name="Arc 45">
                 <a:extLst>
                   <a:ext uri="{FF2B5EF4-FFF2-40B4-BE49-F238E27FC236}">
-                    <a16:creationId xmlns="" xmlns:a16="http://schemas.microsoft.com/office/drawing/2014/main" id="{26BFD8A6-BC99-4B16-BA10-08A9E5C681C0}"/>
+                    <a16:creationId xmlns:a16="http://schemas.microsoft.com/office/drawing/2014/main" xmlns="" id="{26BFD8A6-BC99-4B16-BA10-08A9E5C681C0}"/>
                   </a:ext>
                 </a:extLst>
               </p:cNvPr>
@@ -9489,7 +9489,7 @@
             <p:cNvPr id="30" name="Rectangle: Rounded Corners 29">
               <a:extLst>
                 <a:ext uri="{FF2B5EF4-FFF2-40B4-BE49-F238E27FC236}">
-                  <a16:creationId xmlns="" xmlns:a16="http://schemas.microsoft.com/office/drawing/2014/main" id="{B310277F-A78E-4FB9-9EA9-88BE4F1D585B}"/>
+                  <a16:creationId xmlns:a16="http://schemas.microsoft.com/office/drawing/2014/main" xmlns="" id="{B310277F-A78E-4FB9-9EA9-88BE4F1D585B}"/>
                 </a:ext>
               </a:extLst>
             </p:cNvPr>
@@ -9543,7 +9543,7 @@
             <p:cNvPr id="31" name="Rectangle: Rounded Corners 30">
               <a:extLst>
                 <a:ext uri="{FF2B5EF4-FFF2-40B4-BE49-F238E27FC236}">
-                  <a16:creationId xmlns="" xmlns:a16="http://schemas.microsoft.com/office/drawing/2014/main" id="{A92CF92B-C212-4542-83AE-A0058B5BB5EA}"/>
+                  <a16:creationId xmlns:a16="http://schemas.microsoft.com/office/drawing/2014/main" xmlns="" id="{A92CF92B-C212-4542-83AE-A0058B5BB5EA}"/>
                 </a:ext>
               </a:extLst>
             </p:cNvPr>
@@ -9604,7 +9604,7 @@
             <p:cNvPr id="32" name="Straight Connector 31">
               <a:extLst>
                 <a:ext uri="{FF2B5EF4-FFF2-40B4-BE49-F238E27FC236}">
-                  <a16:creationId xmlns="" xmlns:a16="http://schemas.microsoft.com/office/drawing/2014/main" id="{563B4374-5C0D-461F-B3BD-78D99614D365}"/>
+                  <a16:creationId xmlns:a16="http://schemas.microsoft.com/office/drawing/2014/main" xmlns="" id="{563B4374-5C0D-461F-B3BD-78D99614D365}"/>
                 </a:ext>
               </a:extLst>
             </p:cNvPr>
@@ -9650,7 +9650,7 @@
             <p:cNvPr id="33" name="Straight Connector 32">
               <a:extLst>
                 <a:ext uri="{FF2B5EF4-FFF2-40B4-BE49-F238E27FC236}">
-                  <a16:creationId xmlns="" xmlns:a16="http://schemas.microsoft.com/office/drawing/2014/main" id="{FBC6FDE7-AEA1-4230-8433-4C088A0FF5F9}"/>
+                  <a16:creationId xmlns:a16="http://schemas.microsoft.com/office/drawing/2014/main" xmlns="" id="{FBC6FDE7-AEA1-4230-8433-4C088A0FF5F9}"/>
                 </a:ext>
               </a:extLst>
             </p:cNvPr>
@@ -9696,7 +9696,7 @@
             <p:cNvPr id="34" name="Group 33">
               <a:extLst>
                 <a:ext uri="{FF2B5EF4-FFF2-40B4-BE49-F238E27FC236}">
-                  <a16:creationId xmlns="" xmlns:a16="http://schemas.microsoft.com/office/drawing/2014/main" id="{C4D1021D-07C7-4331-8FF6-36980A30978B}"/>
+                  <a16:creationId xmlns:a16="http://schemas.microsoft.com/office/drawing/2014/main" xmlns="" id="{C4D1021D-07C7-4331-8FF6-36980A30978B}"/>
                 </a:ext>
               </a:extLst>
             </p:cNvPr>
@@ -9719,7 +9719,7 @@
               <p:cNvPr id="40" name="Straight Connector 39">
                 <a:extLst>
                   <a:ext uri="{FF2B5EF4-FFF2-40B4-BE49-F238E27FC236}">
-                    <a16:creationId xmlns="" xmlns:a16="http://schemas.microsoft.com/office/drawing/2014/main" id="{13B7FE99-95CF-45D5-966B-87A979B93431}"/>
+                    <a16:creationId xmlns:a16="http://schemas.microsoft.com/office/drawing/2014/main" xmlns="" id="{13B7FE99-95CF-45D5-966B-87A979B93431}"/>
                   </a:ext>
                 </a:extLst>
               </p:cNvPr>
@@ -9763,7 +9763,7 @@
               <p:cNvPr id="41" name="Straight Connector 40">
                 <a:extLst>
                   <a:ext uri="{FF2B5EF4-FFF2-40B4-BE49-F238E27FC236}">
-                    <a16:creationId xmlns="" xmlns:a16="http://schemas.microsoft.com/office/drawing/2014/main" id="{71BBA69B-19FF-4ADB-A739-AD8136A5F0A6}"/>
+                    <a16:creationId xmlns:a16="http://schemas.microsoft.com/office/drawing/2014/main" xmlns="" id="{71BBA69B-19FF-4ADB-A739-AD8136A5F0A6}"/>
                   </a:ext>
                 </a:extLst>
               </p:cNvPr>
@@ -9808,7 +9808,7 @@
             <p:cNvPr id="35" name="Straight Connector 34">
               <a:extLst>
                 <a:ext uri="{FF2B5EF4-FFF2-40B4-BE49-F238E27FC236}">
-                  <a16:creationId xmlns="" xmlns:a16="http://schemas.microsoft.com/office/drawing/2014/main" id="{BFD1D86B-562B-40B2-8E46-34233EFEE7FC}"/>
+                  <a16:creationId xmlns:a16="http://schemas.microsoft.com/office/drawing/2014/main" xmlns="" id="{BFD1D86B-562B-40B2-8E46-34233EFEE7FC}"/>
                 </a:ext>
               </a:extLst>
             </p:cNvPr>
@@ -9854,7 +9854,7 @@
             <p:cNvPr id="36" name="Rectangle: Rounded Corners 35">
               <a:extLst>
                 <a:ext uri="{FF2B5EF4-FFF2-40B4-BE49-F238E27FC236}">
-                  <a16:creationId xmlns="" xmlns:a16="http://schemas.microsoft.com/office/drawing/2014/main" id="{388C17BD-16A1-43C5-BFFA-2FF9174719E1}"/>
+                  <a16:creationId xmlns:a16="http://schemas.microsoft.com/office/drawing/2014/main" xmlns="" id="{388C17BD-16A1-43C5-BFFA-2FF9174719E1}"/>
                 </a:ext>
               </a:extLst>
             </p:cNvPr>
@@ -9908,7 +9908,7 @@
             <p:cNvPr id="37" name="Group 36">
               <a:extLst>
                 <a:ext uri="{FF2B5EF4-FFF2-40B4-BE49-F238E27FC236}">
-                  <a16:creationId xmlns="" xmlns:a16="http://schemas.microsoft.com/office/drawing/2014/main" id="{1B3B910E-ACFC-4F28-8E28-F02E1588B87E}"/>
+                  <a16:creationId xmlns:a16="http://schemas.microsoft.com/office/drawing/2014/main" xmlns="" id="{1B3B910E-ACFC-4F28-8E28-F02E1588B87E}"/>
                 </a:ext>
               </a:extLst>
             </p:cNvPr>
@@ -9931,7 +9931,7 @@
               <p:cNvPr id="38" name="Straight Connector 37">
                 <a:extLst>
                   <a:ext uri="{FF2B5EF4-FFF2-40B4-BE49-F238E27FC236}">
-                    <a16:creationId xmlns="" xmlns:a16="http://schemas.microsoft.com/office/drawing/2014/main" id="{F57772B6-06C0-4F54-AA94-D3F92DA4716A}"/>
+                    <a16:creationId xmlns:a16="http://schemas.microsoft.com/office/drawing/2014/main" xmlns="" id="{F57772B6-06C0-4F54-AA94-D3F92DA4716A}"/>
                   </a:ext>
                 </a:extLst>
               </p:cNvPr>
@@ -9975,7 +9975,7 @@
               <p:cNvPr id="39" name="Straight Connector 38">
                 <a:extLst>
                   <a:ext uri="{FF2B5EF4-FFF2-40B4-BE49-F238E27FC236}">
-                    <a16:creationId xmlns="" xmlns:a16="http://schemas.microsoft.com/office/drawing/2014/main" id="{23370C1F-7876-4278-AB20-78F6CAA385E2}"/>
+                    <a16:creationId xmlns:a16="http://schemas.microsoft.com/office/drawing/2014/main" xmlns="" id="{23370C1F-7876-4278-AB20-78F6CAA385E2}"/>
                   </a:ext>
                 </a:extLst>
               </p:cNvPr>
@@ -10019,7 +10019,7 @@
     </p:spTree>
     <p:extLst>
       <p:ext uri="{BB962C8B-B14F-4D97-AF65-F5344CB8AC3E}">
-        <p14:creationId xmlns="" xmlns:p14="http://schemas.microsoft.com/office/powerpoint/2010/main" val="3284562556"/>
+        <p14:creationId xmlns:p14="http://schemas.microsoft.com/office/powerpoint/2010/main" xmlns="" val="3284562556"/>
       </p:ext>
     </p:extLst>
   </p:cSld>
@@ -10027,7 +10027,7 @@
     <a:masterClrMapping/>
   </p:clrMapOvr>
   <mc:AlternateContent xmlns:mc="http://schemas.openxmlformats.org/markup-compatibility/2006">
-    <mc:Choice xmlns="" xmlns:p14="http://schemas.microsoft.com/office/powerpoint/2010/main" Requires="p14">
+    <mc:Choice xmlns:p14="http://schemas.microsoft.com/office/powerpoint/2010/main" xmlns="" Requires="p14">
       <p:transition spd="slow" p14:dur="2000" advClick="0" advTm="5000"/>
     </mc:Choice>
     <mc:Fallback>
@@ -10059,7 +10059,7 @@
           <p:cNvPr id="8" name="Slide Number">
             <a:extLst>
               <a:ext uri="{FF2B5EF4-FFF2-40B4-BE49-F238E27FC236}">
-                <a16:creationId xmlns="" xmlns:a16="http://schemas.microsoft.com/office/drawing/2014/main" id="{509D954E-A844-4072-A556-DE584BEB9321}"/>
+                <a16:creationId xmlns:a16="http://schemas.microsoft.com/office/drawing/2014/main" xmlns="" id="{509D954E-A844-4072-A556-DE584BEB9321}"/>
               </a:ext>
             </a:extLst>
           </p:cNvPr>
@@ -10101,7 +10101,7 @@
           <p:cNvPr id="6" name="Code Box">
             <a:extLst>
               <a:ext uri="{FF2B5EF4-FFF2-40B4-BE49-F238E27FC236}">
-                <a16:creationId xmlns="" xmlns:a16="http://schemas.microsoft.com/office/drawing/2014/main" id="{3278A82F-5546-4977-9F75-2A933B415945}"/>
+                <a16:creationId xmlns:a16="http://schemas.microsoft.com/office/drawing/2014/main" xmlns="" id="{3278A82F-5546-4977-9F75-2A933B415945}"/>
               </a:ext>
             </a:extLst>
           </p:cNvPr>
@@ -10188,7 +10188,7 @@
           <p:cNvPr id="21" name="Slide Body Text">
             <a:extLst>
               <a:ext uri="{FF2B5EF4-FFF2-40B4-BE49-F238E27FC236}">
-                <a16:creationId xmlns="" xmlns:a16="http://schemas.microsoft.com/office/drawing/2014/main" id="{04F318BE-2BAD-4677-871C-D78A4BF0CBA6}"/>
+                <a16:creationId xmlns:a16="http://schemas.microsoft.com/office/drawing/2014/main" xmlns="" id="{04F318BE-2BAD-4677-871C-D78A4BF0CBA6}"/>
               </a:ext>
             </a:extLst>
           </p:cNvPr>
@@ -10235,7 +10235,7 @@
           <p:cNvPr id="9" name="Rectangle Top">
             <a:extLst>
               <a:ext uri="{FF2B5EF4-FFF2-40B4-BE49-F238E27FC236}">
-                <a16:creationId xmlns="" xmlns:a16="http://schemas.microsoft.com/office/drawing/2014/main" id="{A15CE03A-0933-4E5D-9EA1-718D4F802FFC}"/>
+                <a16:creationId xmlns:a16="http://schemas.microsoft.com/office/drawing/2014/main" xmlns="" id="{A15CE03A-0933-4E5D-9EA1-718D4F802FFC}"/>
               </a:ext>
             </a:extLst>
           </p:cNvPr>
@@ -10316,7 +10316,7 @@
           <p:cNvPr id="10" name="Logo Software University" descr="Software University logo">
             <a:extLst>
               <a:ext uri="{FF2B5EF4-FFF2-40B4-BE49-F238E27FC236}">
-                <a16:creationId xmlns="" xmlns:a16="http://schemas.microsoft.com/office/drawing/2014/main" id="{8C01D7AF-7CBD-46E1-99F3-8EB60E838D91}"/>
+                <a16:creationId xmlns:a16="http://schemas.microsoft.com/office/drawing/2014/main" xmlns="" id="{8C01D7AF-7CBD-46E1-99F3-8EB60E838D91}"/>
               </a:ext>
             </a:extLst>
           </p:cNvPr>
@@ -10329,7 +10329,7 @@
           <a:blip r:embed="rId2" cstate="print">
             <a:extLst>
               <a:ext uri="{28A0092B-C50C-407E-A947-70E740481C1C}">
-                <a14:useLocalDpi xmlns="" xmlns:a14="http://schemas.microsoft.com/office/drawing/2010/main" val="0"/>
+                <a14:useLocalDpi xmlns:a14="http://schemas.microsoft.com/office/drawing/2010/main" xmlns="" val="0"/>
               </a:ext>
             </a:extLst>
           </a:blip>
@@ -10352,7 +10352,7 @@
           <p:cNvPr id="11" name="Slide Title">
             <a:extLst>
               <a:ext uri="{FF2B5EF4-FFF2-40B4-BE49-F238E27FC236}">
-                <a16:creationId xmlns="" xmlns:a16="http://schemas.microsoft.com/office/drawing/2014/main" id="{47D60833-F0A9-4F29-8C06-A963A7C8BE93}"/>
+                <a16:creationId xmlns:a16="http://schemas.microsoft.com/office/drawing/2014/main" xmlns="" id="{47D60833-F0A9-4F29-8C06-A963A7C8BE93}"/>
               </a:ext>
             </a:extLst>
           </p:cNvPr>
@@ -10391,7 +10391,7 @@
     </p:spTree>
     <p:extLst>
       <p:ext uri="{BB962C8B-B14F-4D97-AF65-F5344CB8AC3E}">
-        <p14:creationId xmlns="" xmlns:p14="http://schemas.microsoft.com/office/powerpoint/2010/main" val="1000829826"/>
+        <p14:creationId xmlns:p14="http://schemas.microsoft.com/office/powerpoint/2010/main" xmlns="" val="1000829826"/>
       </p:ext>
     </p:extLst>
   </p:cSld>
@@ -10399,7 +10399,7 @@
     <a:masterClrMapping/>
   </p:clrMapOvr>
   <mc:AlternateContent xmlns:mc="http://schemas.openxmlformats.org/markup-compatibility/2006">
-    <mc:Choice xmlns="" xmlns:p14="http://schemas.microsoft.com/office/powerpoint/2010/main" Requires="p14">
+    <mc:Choice xmlns:p14="http://schemas.microsoft.com/office/powerpoint/2010/main" xmlns="" Requires="p14">
       <p:transition spd="slow" p14:dur="2000" advClick="0" advTm="5000"/>
     </mc:Choice>
     <mc:Fallback>
@@ -10431,7 +10431,7 @@
           <p:cNvPr id="10" name="Slide Number">
             <a:extLst>
               <a:ext uri="{FF2B5EF4-FFF2-40B4-BE49-F238E27FC236}">
-                <a16:creationId xmlns="" xmlns:a16="http://schemas.microsoft.com/office/drawing/2014/main" id="{39DDE17E-5472-41F3-AF5F-54DFF10DC63C}"/>
+                <a16:creationId xmlns:a16="http://schemas.microsoft.com/office/drawing/2014/main" xmlns="" id="{39DDE17E-5472-41F3-AF5F-54DFF10DC63C}"/>
               </a:ext>
             </a:extLst>
           </p:cNvPr>
@@ -10473,7 +10473,7 @@
           <p:cNvPr id="9" name="Picture SoftUni Mascot" descr="SoftUni mascot with laptop">
             <a:extLst>
               <a:ext uri="{FF2B5EF4-FFF2-40B4-BE49-F238E27FC236}">
-                <a16:creationId xmlns="" xmlns:a16="http://schemas.microsoft.com/office/drawing/2014/main" id="{DC4365F6-D2C1-47B4-8477-38FD2C7711AA}"/>
+                <a16:creationId xmlns:a16="http://schemas.microsoft.com/office/drawing/2014/main" xmlns="" id="{DC4365F6-D2C1-47B4-8477-38FD2C7711AA}"/>
               </a:ext>
             </a:extLst>
           </p:cNvPr>
@@ -10486,7 +10486,7 @@
           <a:blip r:embed="rId2" cstate="print">
             <a:extLst>
               <a:ext uri="{28A0092B-C50C-407E-A947-70E740481C1C}">
-                <a14:useLocalDpi xmlns="" xmlns:a14="http://schemas.microsoft.com/office/drawing/2010/main" val="0"/>
+                <a14:useLocalDpi xmlns:a14="http://schemas.microsoft.com/office/drawing/2010/main" xmlns="" val="0"/>
               </a:ext>
             </a:extLst>
           </a:blip>
@@ -10509,7 +10509,7 @@
           <p:cNvPr id="23" name="Slide Body Text">
             <a:extLst>
               <a:ext uri="{FF2B5EF4-FFF2-40B4-BE49-F238E27FC236}">
-                <a16:creationId xmlns="" xmlns:a16="http://schemas.microsoft.com/office/drawing/2014/main" id="{889D93F4-ABFA-46BF-8E5D-FE6562ACB20F}"/>
+                <a16:creationId xmlns:a16="http://schemas.microsoft.com/office/drawing/2014/main" xmlns="" id="{889D93F4-ABFA-46BF-8E5D-FE6562ACB20F}"/>
               </a:ext>
             </a:extLst>
           </p:cNvPr>
@@ -10600,7 +10600,7 @@
           <p:cNvPr id="8" name="Rectangle Top">
             <a:extLst>
               <a:ext uri="{FF2B5EF4-FFF2-40B4-BE49-F238E27FC236}">
-                <a16:creationId xmlns="" xmlns:a16="http://schemas.microsoft.com/office/drawing/2014/main" id="{930E0800-9260-4369-8330-8264DD33C5CE}"/>
+                <a16:creationId xmlns:a16="http://schemas.microsoft.com/office/drawing/2014/main" xmlns="" id="{930E0800-9260-4369-8330-8264DD33C5CE}"/>
               </a:ext>
             </a:extLst>
           </p:cNvPr>
@@ -10681,7 +10681,7 @@
           <p:cNvPr id="11" name="Logo Software University" descr="Software University logo">
             <a:extLst>
               <a:ext uri="{FF2B5EF4-FFF2-40B4-BE49-F238E27FC236}">
-                <a16:creationId xmlns="" xmlns:a16="http://schemas.microsoft.com/office/drawing/2014/main" id="{14F779A7-4A91-448B-BEFA-956C70A1C22F}"/>
+                <a16:creationId xmlns:a16="http://schemas.microsoft.com/office/drawing/2014/main" xmlns="" id="{14F779A7-4A91-448B-BEFA-956C70A1C22F}"/>
               </a:ext>
             </a:extLst>
           </p:cNvPr>
@@ -10694,7 +10694,7 @@
           <a:blip r:embed="rId3" cstate="print">
             <a:extLst>
               <a:ext uri="{28A0092B-C50C-407E-A947-70E740481C1C}">
-                <a14:useLocalDpi xmlns="" xmlns:a14="http://schemas.microsoft.com/office/drawing/2010/main" val="0"/>
+                <a14:useLocalDpi xmlns:a14="http://schemas.microsoft.com/office/drawing/2010/main" xmlns="" val="0"/>
               </a:ext>
             </a:extLst>
           </a:blip>
@@ -10717,7 +10717,7 @@
           <p:cNvPr id="13" name="Slide Title">
             <a:extLst>
               <a:ext uri="{FF2B5EF4-FFF2-40B4-BE49-F238E27FC236}">
-                <a16:creationId xmlns="" xmlns:a16="http://schemas.microsoft.com/office/drawing/2014/main" id="{357D7BE1-6358-42CC-94F3-7BCDD91DCB6D}"/>
+                <a16:creationId xmlns:a16="http://schemas.microsoft.com/office/drawing/2014/main" xmlns="" id="{357D7BE1-6358-42CC-94F3-7BCDD91DCB6D}"/>
               </a:ext>
             </a:extLst>
           </p:cNvPr>
@@ -10756,7 +10756,7 @@
     </p:spTree>
     <p:extLst>
       <p:ext uri="{BB962C8B-B14F-4D97-AF65-F5344CB8AC3E}">
-        <p14:creationId xmlns="" xmlns:p14="http://schemas.microsoft.com/office/powerpoint/2010/main" val="1028724482"/>
+        <p14:creationId xmlns:p14="http://schemas.microsoft.com/office/powerpoint/2010/main" xmlns="" val="1028724482"/>
       </p:ext>
     </p:extLst>
   </p:cSld>
@@ -10764,7 +10764,7 @@
     <a:masterClrMapping/>
   </p:clrMapOvr>
   <mc:AlternateContent xmlns:mc="http://schemas.openxmlformats.org/markup-compatibility/2006">
-    <mc:Choice xmlns="" xmlns:p14="http://schemas.microsoft.com/office/powerpoint/2010/main" Requires="p14">
+    <mc:Choice xmlns:p14="http://schemas.microsoft.com/office/powerpoint/2010/main" xmlns="" Requires="p14">
       <p:transition spd="slow" p14:dur="2000" advClick="0" advTm="5000"/>
     </mc:Choice>
     <mc:Fallback>
@@ -10876,7 +10876,7 @@
           <p:cNvPr id="11" name="Slide Number">
             <a:extLst>
               <a:ext uri="{FF2B5EF4-FFF2-40B4-BE49-F238E27FC236}">
-                <a16:creationId xmlns="" xmlns:a16="http://schemas.microsoft.com/office/drawing/2014/main" id="{6750ECE4-94E0-469B-B8E4-562792823B0F}"/>
+                <a16:creationId xmlns:a16="http://schemas.microsoft.com/office/drawing/2014/main" xmlns="" id="{6750ECE4-94E0-469B-B8E4-562792823B0F}"/>
               </a:ext>
             </a:extLst>
           </p:cNvPr>
@@ -10999,7 +10999,7 @@
           <p:cNvPr id="12" name="Logo Software University Down" descr="Software University logo">
             <a:extLst>
               <a:ext uri="{FF2B5EF4-FFF2-40B4-BE49-F238E27FC236}">
-                <a16:creationId xmlns="" xmlns:a16="http://schemas.microsoft.com/office/drawing/2014/main" id="{7028D2F0-1E67-414B-A93D-D3F8F131A132}"/>
+                <a16:creationId xmlns:a16="http://schemas.microsoft.com/office/drawing/2014/main" xmlns="" id="{7028D2F0-1E67-414B-A93D-D3F8F131A132}"/>
               </a:ext>
             </a:extLst>
           </p:cNvPr>
@@ -11012,7 +11012,7 @@
           <a:blip r:embed="rId2" cstate="print">
             <a:extLst>
               <a:ext uri="{28A0092B-C50C-407E-A947-70E740481C1C}">
-                <a14:useLocalDpi xmlns="" xmlns:a14="http://schemas.microsoft.com/office/drawing/2010/main" val="0"/>
+                <a14:useLocalDpi xmlns:a14="http://schemas.microsoft.com/office/drawing/2010/main" xmlns="" val="0"/>
               </a:ext>
             </a:extLst>
           </a:blip>
@@ -11035,7 +11035,7 @@
           <p:cNvPr id="10" name="Text Placeholder Right">
             <a:extLst>
               <a:ext uri="{FF2B5EF4-FFF2-40B4-BE49-F238E27FC236}">
-                <a16:creationId xmlns="" xmlns:a16="http://schemas.microsoft.com/office/drawing/2014/main" id="{AF69A59F-C564-4A04-B1CC-31C261499991}"/>
+                <a16:creationId xmlns:a16="http://schemas.microsoft.com/office/drawing/2014/main" xmlns="" id="{AF69A59F-C564-4A04-B1CC-31C261499991}"/>
               </a:ext>
             </a:extLst>
           </p:cNvPr>
@@ -11113,7 +11113,7 @@
           <p:cNvPr id="9" name="Text Placeholder Left">
             <a:extLst>
               <a:ext uri="{FF2B5EF4-FFF2-40B4-BE49-F238E27FC236}">
-                <a16:creationId xmlns="" xmlns:a16="http://schemas.microsoft.com/office/drawing/2014/main" id="{C8A626D2-456B-41EF-9818-EA8DD7E314DA}"/>
+                <a16:creationId xmlns:a16="http://schemas.microsoft.com/office/drawing/2014/main" xmlns="" id="{C8A626D2-456B-41EF-9818-EA8DD7E314DA}"/>
               </a:ext>
             </a:extLst>
           </p:cNvPr>
@@ -11191,7 +11191,7 @@
           <p:cNvPr id="13" name="Rectangle Top">
             <a:extLst>
               <a:ext uri="{FF2B5EF4-FFF2-40B4-BE49-F238E27FC236}">
-                <a16:creationId xmlns="" xmlns:a16="http://schemas.microsoft.com/office/drawing/2014/main" id="{E03301DA-D0AF-46FD-8740-2F761250203A}"/>
+                <a16:creationId xmlns:a16="http://schemas.microsoft.com/office/drawing/2014/main" xmlns="" id="{E03301DA-D0AF-46FD-8740-2F761250203A}"/>
               </a:ext>
             </a:extLst>
           </p:cNvPr>
@@ -11272,7 +11272,7 @@
           <p:cNvPr id="14" name="Logo Software University" descr="Software University logo">
             <a:extLst>
               <a:ext uri="{FF2B5EF4-FFF2-40B4-BE49-F238E27FC236}">
-                <a16:creationId xmlns="" xmlns:a16="http://schemas.microsoft.com/office/drawing/2014/main" id="{19A67BB9-D880-4EAD-B90E-89C4219BFC0B}"/>
+                <a16:creationId xmlns:a16="http://schemas.microsoft.com/office/drawing/2014/main" xmlns="" id="{19A67BB9-D880-4EAD-B90E-89C4219BFC0B}"/>
               </a:ext>
             </a:extLst>
           </p:cNvPr>
@@ -11285,7 +11285,7 @@
           <a:blip r:embed="rId3" cstate="print">
             <a:extLst>
               <a:ext uri="{28A0092B-C50C-407E-A947-70E740481C1C}">
-                <a14:useLocalDpi xmlns="" xmlns:a14="http://schemas.microsoft.com/office/drawing/2010/main" val="0"/>
+                <a14:useLocalDpi xmlns:a14="http://schemas.microsoft.com/office/drawing/2010/main" xmlns="" val="0"/>
               </a:ext>
             </a:extLst>
           </a:blip>
@@ -11308,7 +11308,7 @@
           <p:cNvPr id="15" name="Slide Title">
             <a:extLst>
               <a:ext uri="{FF2B5EF4-FFF2-40B4-BE49-F238E27FC236}">
-                <a16:creationId xmlns="" xmlns:a16="http://schemas.microsoft.com/office/drawing/2014/main" id="{EA9A94D1-F9F6-4D7B-85E3-896A987B6A4D}"/>
+                <a16:creationId xmlns:a16="http://schemas.microsoft.com/office/drawing/2014/main" xmlns="" id="{EA9A94D1-F9F6-4D7B-85E3-896A987B6A4D}"/>
               </a:ext>
             </a:extLst>
           </p:cNvPr>
@@ -11347,7 +11347,7 @@
     </p:spTree>
     <p:extLst>
       <p:ext uri="{BB962C8B-B14F-4D97-AF65-F5344CB8AC3E}">
-        <p14:creationId xmlns="" xmlns:p14="http://schemas.microsoft.com/office/powerpoint/2010/main" val="3044033461"/>
+        <p14:creationId xmlns:p14="http://schemas.microsoft.com/office/powerpoint/2010/main" xmlns="" val="3044033461"/>
       </p:ext>
     </p:extLst>
   </p:cSld>
@@ -11355,7 +11355,7 @@
     <a:masterClrMapping/>
   </p:clrMapOvr>
   <mc:AlternateContent xmlns:mc="http://schemas.openxmlformats.org/markup-compatibility/2006">
-    <mc:Choice xmlns="" xmlns:p14="http://schemas.microsoft.com/office/powerpoint/2010/main" Requires="p14">
+    <mc:Choice xmlns:p14="http://schemas.microsoft.com/office/powerpoint/2010/main" xmlns="" Requires="p14">
       <p:transition spd="slow" p14:dur="2000" advClick="0" advTm="5000"/>
     </mc:Choice>
     <mc:Fallback>
@@ -11364,7 +11364,7 @@
   </mc:AlternateContent>
   <p:extLst>
     <p:ext uri="{DCECCB84-F9BA-43D5-87BE-67443E8EF086}">
-      <p15:sldGuideLst xmlns="" xmlns:p15="http://schemas.microsoft.com/office/powerpoint/2012/main">
+      <p15:sldGuideLst xmlns:p15="http://schemas.microsoft.com/office/powerpoint/2012/main" xmlns="">
         <p15:guide id="1" orient="horz" pos="2160">
           <p15:clr>
             <a:srgbClr val="FBAE40"/>
@@ -11411,7 +11411,7 @@
           <p:cNvPr id="4" name="Picture Background" descr="SoftUni Background">
             <a:extLst>
               <a:ext uri="{FF2B5EF4-FFF2-40B4-BE49-F238E27FC236}">
-                <a16:creationId xmlns="" xmlns:a16="http://schemas.microsoft.com/office/drawing/2014/main" id="{5BE90A63-DDD9-4B3B-A234-DF69B9BC812F}"/>
+                <a16:creationId xmlns:a16="http://schemas.microsoft.com/office/drawing/2014/main" xmlns="" id="{5BE90A63-DDD9-4B3B-A234-DF69B9BC812F}"/>
               </a:ext>
             </a:extLst>
           </p:cNvPr>
@@ -11440,7 +11440,7 @@
           <p:cNvPr id="11" name="Slide Body Text">
             <a:extLst>
               <a:ext uri="{FF2B5EF4-FFF2-40B4-BE49-F238E27FC236}">
-                <a16:creationId xmlns="" xmlns:a16="http://schemas.microsoft.com/office/drawing/2014/main" id="{90CBFB32-9F46-4F2F-8A54-9EE8BED27855}"/>
+                <a16:creationId xmlns:a16="http://schemas.microsoft.com/office/drawing/2014/main" xmlns="" id="{90CBFB32-9F46-4F2F-8A54-9EE8BED27855}"/>
               </a:ext>
             </a:extLst>
           </p:cNvPr>
@@ -11508,7 +11508,7 @@
           <p:cNvPr id="10" name="Slide Title">
             <a:extLst>
               <a:ext uri="{FF2B5EF4-FFF2-40B4-BE49-F238E27FC236}">
-                <a16:creationId xmlns="" xmlns:a16="http://schemas.microsoft.com/office/drawing/2014/main" id="{B770C392-3003-4C35-9625-BB041F8257BA}"/>
+                <a16:creationId xmlns:a16="http://schemas.microsoft.com/office/drawing/2014/main" xmlns="" id="{B770C392-3003-4C35-9625-BB041F8257BA}"/>
               </a:ext>
             </a:extLst>
           </p:cNvPr>
@@ -11545,7 +11545,7 @@
     </p:spTree>
     <p:extLst>
       <p:ext uri="{BB962C8B-B14F-4D97-AF65-F5344CB8AC3E}">
-        <p14:creationId xmlns="" xmlns:p14="http://schemas.microsoft.com/office/powerpoint/2010/main" val="156789181"/>
+        <p14:creationId xmlns:p14="http://schemas.microsoft.com/office/powerpoint/2010/main" xmlns="" val="156789181"/>
       </p:ext>
     </p:extLst>
   </p:cSld>
@@ -11565,7 +11565,7 @@
     <p:sldLayoutId id="2147483687" r:id="rId12"/>
   </p:sldLayoutIdLst>
   <mc:AlternateContent xmlns:mc="http://schemas.openxmlformats.org/markup-compatibility/2006">
-    <mc:Choice xmlns="" xmlns:p14="http://schemas.microsoft.com/office/powerpoint/2010/main" Requires="p14">
+    <mc:Choice xmlns:p14="http://schemas.microsoft.com/office/powerpoint/2010/main" xmlns="" Requires="p14">
       <p:transition spd="slow" p14:dur="2000" advClick="0" advTm="5000"/>
     </mc:Choice>
     <mc:Fallback>
@@ -11855,7 +11855,7 @@
   </p:txStyles>
   <p:extLst>
     <p:ext uri="{27BBF7A9-308A-43DC-89C8-2F10F3537804}">
-      <p15:sldGuideLst xmlns="" xmlns:p15="http://schemas.microsoft.com/office/powerpoint/2012/main">
+      <p15:sldGuideLst xmlns:p15="http://schemas.microsoft.com/office/powerpoint/2012/main" xmlns="">
         <p15:guide id="1" orient="horz" pos="2160">
           <p15:clr>
             <a:srgbClr val="F26B43"/>
@@ -12099,7 +12099,7 @@
     </p:spTree>
     <p:extLst>
       <p:ext uri="{BB962C8B-B14F-4D97-AF65-F5344CB8AC3E}">
-        <p14:creationId xmlns="" xmlns:p14="http://schemas.microsoft.com/office/powerpoint/2010/main" val="1251141439"/>
+        <p14:creationId xmlns:p14="http://schemas.microsoft.com/office/powerpoint/2010/main" xmlns="" val="1251141439"/>
       </p:ext>
     </p:extLst>
   </p:cSld>
@@ -12107,7 +12107,7 @@
     <a:masterClrMapping/>
   </p:clrMapOvr>
   <mc:AlternateContent xmlns:mc="http://schemas.openxmlformats.org/markup-compatibility/2006">
-    <mc:Choice xmlns="" xmlns:p14="http://schemas.microsoft.com/office/powerpoint/2010/main" Requires="p14">
+    <mc:Choice xmlns:p14="http://schemas.microsoft.com/office/powerpoint/2010/main" xmlns="" Requires="p14">
       <p:transition spd="slow" p14:dur="2000" advClick="0" advTm="5000"/>
     </mc:Choice>
     <mc:Fallback>
@@ -12422,7 +12422,7 @@
     <a:masterClrMapping/>
   </p:clrMapOvr>
   <mc:AlternateContent xmlns:mc="http://schemas.openxmlformats.org/markup-compatibility/2006">
-    <mc:Choice xmlns="" xmlns:p14="http://schemas.microsoft.com/office/powerpoint/2010/main" Requires="p14">
+    <mc:Choice xmlns:p14="http://schemas.microsoft.com/office/powerpoint/2010/main" xmlns="" Requires="p14">
       <p:transition spd="slow" p14:dur="2000" advClick="0" advTm="5000"/>
     </mc:Choice>
     <mc:Fallback>
@@ -12736,7 +12736,7 @@
     <a:masterClrMapping/>
   </p:clrMapOvr>
   <mc:AlternateContent xmlns:mc="http://schemas.openxmlformats.org/markup-compatibility/2006">
-    <mc:Choice xmlns="" xmlns:p14="http://schemas.microsoft.com/office/powerpoint/2010/main" Requires="p14">
+    <mc:Choice xmlns:p14="http://schemas.microsoft.com/office/powerpoint/2010/main" xmlns="" Requires="p14">
       <p:transition spd="slow" p14:dur="2000" advClick="0" advTm="5000"/>
     </mc:Choice>
     <mc:Fallback>
@@ -13195,7 +13195,7 @@
     <a:masterClrMapping/>
   </p:clrMapOvr>
   <mc:AlternateContent xmlns:mc="http://schemas.openxmlformats.org/markup-compatibility/2006">
-    <mc:Choice xmlns="" xmlns:p14="http://schemas.microsoft.com/office/powerpoint/2010/main" Requires="p14">
+    <mc:Choice xmlns:p14="http://schemas.microsoft.com/office/powerpoint/2010/main" xmlns="" Requires="p14">
       <p:transition spd="slow" p14:dur="2000" advClick="0" advTm="5000"/>
     </mc:Choice>
     <mc:Fallback>
@@ -13397,10 +13397,10 @@
               </a:buClr>
             </a:pPr>
             <a:r>
-              <a:rPr lang="ru-RU" sz="3600" dirty="0" smtClean="0"/>
+              <a:rPr lang="ru-RU" sz="3400" dirty="0" smtClean="0"/>
               <a:t>търсене на стойности, съдържащи определен низ (шаблон).</a:t>
             </a:r>
-            <a:endParaRPr lang="en-US" sz="3600" dirty="0" smtClean="0"/>
+            <a:endParaRPr lang="en-US" sz="3400" dirty="0" smtClean="0"/>
           </a:p>
           <a:p>
             <a:pPr lvl="1">
@@ -13409,11 +13409,11 @@
               </a:buClr>
             </a:pPr>
             <a:r>
-              <a:rPr lang="bg-BG" sz="3600" dirty="0" smtClean="0"/>
+              <a:rPr lang="bg-BG" sz="3400" dirty="0" smtClean="0"/>
               <a:t>обикновено се използва със специални символи (</a:t>
             </a:r>
             <a:r>
-              <a:rPr lang="bg-BG" sz="3600" b="1" dirty="0" smtClean="0">
+              <a:rPr lang="bg-BG" sz="3400" b="1" dirty="0" smtClean="0">
                 <a:solidFill>
                   <a:schemeClr val="bg1"/>
                 </a:solidFill>
@@ -13421,10 +13421,10 @@
               <a:t>% </a:t>
             </a:r>
             <a:r>
-              <a:rPr lang="bg-BG" sz="3600" dirty="0" smtClean="0"/>
+              <a:rPr lang="bg-BG" sz="3400" dirty="0" smtClean="0"/>
               <a:t>- нула или повече символи)</a:t>
             </a:r>
-            <a:endParaRPr lang="en-US" sz="3600" dirty="0" smtClean="0"/>
+            <a:endParaRPr lang="en-US" sz="3400" dirty="0" smtClean="0"/>
           </a:p>
           <a:p>
             <a:pPr>
@@ -13501,7 +13501,7 @@
         </p:nvSpPr>
         <p:spPr bwMode="auto">
           <a:xfrm>
-            <a:off x="2518500" y="4779000"/>
+            <a:off x="2496000" y="4734000"/>
             <a:ext cx="7155000" cy="1384995"/>
           </a:xfrm>
           <a:prstGeom prst="rect">
@@ -13638,7 +13638,7 @@
     <a:masterClrMapping/>
   </p:clrMapOvr>
   <mc:AlternateContent xmlns:mc="http://schemas.openxmlformats.org/markup-compatibility/2006">
-    <mc:Choice xmlns="" xmlns:p14="http://schemas.microsoft.com/office/powerpoint/2010/main" Requires="p14">
+    <mc:Choice xmlns:p14="http://schemas.microsoft.com/office/powerpoint/2010/main" xmlns="" Requires="p14">
       <p:transition spd="slow" p14:dur="2000" advClick="0" advTm="5000"/>
     </mc:Choice>
     <mc:Fallback>
@@ -13841,11 +13841,11 @@
               </a:buClr>
             </a:pPr>
             <a:r>
-              <a:rPr lang="bg-BG" sz="3600" dirty="0" smtClean="0"/>
+              <a:rPr lang="bg-BG" sz="3400" dirty="0" smtClean="0"/>
               <a:t>филтриране на редове, чиито стойности в определената колона не са </a:t>
             </a:r>
             <a:r>
-              <a:rPr lang="en-US" sz="3600" b="1" dirty="0" smtClean="0">
+              <a:rPr lang="en-US" sz="3400" b="1" dirty="0" smtClean="0">
                 <a:solidFill>
                   <a:schemeClr val="bg1"/>
                 </a:solidFill>
@@ -13916,8 +13916,8 @@
         </p:nvSpPr>
         <p:spPr bwMode="auto">
           <a:xfrm>
-            <a:off x="2541000" y="4014000"/>
-            <a:ext cx="7155000" cy="1384995"/>
+            <a:off x="2586000" y="3879000"/>
+            <a:ext cx="7020000" cy="1384995"/>
           </a:xfrm>
           <a:prstGeom prst="rect">
             <a:avLst/>
@@ -14049,7 +14049,7 @@
     <a:masterClrMapping/>
   </p:clrMapOvr>
   <mc:AlternateContent xmlns:mc="http://schemas.openxmlformats.org/markup-compatibility/2006">
-    <mc:Choice xmlns="" xmlns:p14="http://schemas.microsoft.com/office/powerpoint/2010/main" Requires="p14">
+    <mc:Choice xmlns:p14="http://schemas.microsoft.com/office/powerpoint/2010/main" xmlns="" Requires="p14">
       <p:transition spd="slow" p14:dur="2000" advClick="0" advTm="5000"/>
     </mc:Choice>
     <mc:Fallback>
@@ -14240,7 +14240,7 @@
     <a:masterClrMapping/>
   </p:clrMapOvr>
   <mc:AlternateContent xmlns:mc="http://schemas.openxmlformats.org/markup-compatibility/2006">
-    <mc:Choice xmlns="" xmlns:p14="http://schemas.microsoft.com/office/powerpoint/2010/main" Requires="p14">
+    <mc:Choice xmlns:p14="http://schemas.microsoft.com/office/powerpoint/2010/main" xmlns="" Requires="p14">
       <p:transition spd="slow" p14:dur="2000" advClick="0" advTm="5000"/>
     </mc:Choice>
     <mc:Fallback>
@@ -14398,7 +14398,7 @@
     <a:masterClrMapping/>
   </p:clrMapOvr>
   <mc:AlternateContent xmlns:mc="http://schemas.openxmlformats.org/markup-compatibility/2006">
-    <mc:Choice xmlns="" xmlns:p14="http://schemas.microsoft.com/office/powerpoint/2010/main" Requires="p14">
+    <mc:Choice xmlns:p14="http://schemas.microsoft.com/office/powerpoint/2010/main" xmlns="" Requires="p14">
       <p:transition spd="slow" p14:dur="2000" advClick="0" advTm="5000"/>
     </mc:Choice>
     <mc:Fallback>
@@ -14562,11 +14562,11 @@
           <a:p>
             <a:pPr lvl="1"/>
             <a:r>
-              <a:rPr lang="bg-BG" sz="3600" dirty="0" smtClean="0"/>
+              <a:rPr lang="bg-BG" sz="3400" dirty="0" smtClean="0"/>
               <a:t>Функцията връща </a:t>
             </a:r>
             <a:r>
-              <a:rPr lang="bg-BG" sz="3600" b="1" dirty="0" smtClean="0">
+              <a:rPr lang="bg-BG" sz="3400" b="1" dirty="0" smtClean="0">
                 <a:solidFill>
                   <a:schemeClr val="bg1"/>
                 </a:solidFill>
@@ -14574,10 +14574,10 @@
               <a:t>името </a:t>
             </a:r>
             <a:r>
-              <a:rPr lang="bg-BG" sz="3600" dirty="0" smtClean="0"/>
+              <a:rPr lang="bg-BG" sz="3400" dirty="0" smtClean="0"/>
               <a:t>на месеца за дадена дата</a:t>
             </a:r>
-            <a:endParaRPr lang="ru-RU" sz="3600" dirty="0" smtClean="0"/>
+            <a:endParaRPr lang="ru-RU" sz="3400" dirty="0" smtClean="0"/>
           </a:p>
         </p:txBody>
       </p:sp>
@@ -14614,7 +14614,7 @@
         </p:nvSpPr>
         <p:spPr bwMode="auto">
           <a:xfrm>
-            <a:off x="2496000" y="4104000"/>
+            <a:off x="2518500" y="3924000"/>
             <a:ext cx="7155000" cy="1384995"/>
           </a:xfrm>
           <a:prstGeom prst="rect">
@@ -14723,7 +14723,7 @@
     <a:masterClrMapping/>
   </p:clrMapOvr>
   <mc:AlternateContent xmlns:mc="http://schemas.openxmlformats.org/markup-compatibility/2006">
-    <mc:Choice xmlns="" xmlns:p14="http://schemas.microsoft.com/office/powerpoint/2010/main" Requires="p14">
+    <mc:Choice xmlns:p14="http://schemas.microsoft.com/office/powerpoint/2010/main" xmlns="" Requires="p14">
       <p:transition spd="slow" p14:dur="2000" advClick="0" advTm="5000"/>
     </mc:Choice>
     <mc:Fallback>
@@ -14965,7 +14965,7 @@
     <a:masterClrMapping/>
   </p:clrMapOvr>
   <mc:AlternateContent xmlns:mc="http://schemas.openxmlformats.org/markup-compatibility/2006">
-    <mc:Choice xmlns="" xmlns:p14="http://schemas.microsoft.com/office/powerpoint/2010/main" Requires="p14">
+    <mc:Choice xmlns:p14="http://schemas.microsoft.com/office/powerpoint/2010/main" xmlns="" Requires="p14">
       <p:transition spd="slow" p14:dur="2000" advClick="0" advTm="5000"/>
     </mc:Choice>
     <mc:Fallback>
@@ -15165,17 +15165,7 @@
                 <a:latin typeface="Consolas" pitchFamily="49" charset="0"/>
                 <a:cs typeface="Consolas" pitchFamily="49" charset="0"/>
               </a:rPr>
-              <a:t>SELECT </a:t>
-            </a:r>
-            <a:r>
-              <a:rPr lang="en-US" sz="2800" b="1" noProof="1" smtClean="0">
-                <a:solidFill>
-                  <a:schemeClr val="bg1"/>
-                </a:solidFill>
-                <a:latin typeface="Consolas" pitchFamily="49" charset="0"/>
-                <a:cs typeface="Consolas" pitchFamily="49" charset="0"/>
-              </a:rPr>
-              <a:t>CONCAT</a:t>
+              <a:t>SELECT CONCAT</a:t>
             </a:r>
             <a:r>
               <a:rPr lang="en-US" sz="2800" b="1" noProof="1" smtClean="0">
@@ -15290,14 +15280,7 @@
                 <a:latin typeface="Consolas" pitchFamily="49" charset="0"/>
                 <a:cs typeface="Consolas" pitchFamily="49" charset="0"/>
               </a:rPr>
-              <a:t> </a:t>
-            </a:r>
-            <a:r>
-              <a:rPr lang="en-US" sz="2800" b="1" noProof="1" smtClean="0">
-                <a:latin typeface="Consolas" pitchFamily="49" charset="0"/>
-                <a:cs typeface="Consolas" pitchFamily="49" charset="0"/>
-              </a:rPr>
-              <a:t>Employees</a:t>
+              <a:t> Employees</a:t>
             </a:r>
             <a:endParaRPr lang="en-US" sz="2800" b="1" noProof="1">
               <a:latin typeface="Consolas" pitchFamily="49" charset="0"/>
@@ -15312,7 +15295,7 @@
     <a:masterClrMapping/>
   </p:clrMapOvr>
   <mc:AlternateContent xmlns:mc="http://schemas.openxmlformats.org/markup-compatibility/2006">
-    <mc:Choice xmlns="" xmlns:p14="http://schemas.microsoft.com/office/powerpoint/2010/main" Requires="p14">
+    <mc:Choice xmlns:p14="http://schemas.microsoft.com/office/powerpoint/2010/main" xmlns="" Requires="p14">
       <p:transition spd="slow" p14:dur="2000" advClick="0" advTm="5000"/>
     </mc:Choice>
     <mc:Fallback>
@@ -15497,7 +15480,7 @@
           <p:cNvPr id="5" name="Slide Number">
             <a:extLst>
               <a:ext uri="{FF2B5EF4-FFF2-40B4-BE49-F238E27FC236}">
-                <a16:creationId xmlns="" xmlns:a16="http://schemas.microsoft.com/office/drawing/2014/main" id="{FF1E3A17-8C5A-4422-AF5B-95FA4E4E5574}"/>
+                <a16:creationId xmlns:a16="http://schemas.microsoft.com/office/drawing/2014/main" xmlns="" id="{FF1E3A17-8C5A-4422-AF5B-95FA4E4E5574}"/>
               </a:ext>
             </a:extLst>
           </p:cNvPr>
@@ -15625,7 +15608,7 @@
     </p:spTree>
     <p:extLst>
       <p:ext uri="{BB962C8B-B14F-4D97-AF65-F5344CB8AC3E}">
-        <p14:creationId xmlns="" xmlns:p14="http://schemas.microsoft.com/office/powerpoint/2010/main" val="3598650340"/>
+        <p14:creationId xmlns:p14="http://schemas.microsoft.com/office/powerpoint/2010/main" xmlns="" val="3598650340"/>
       </p:ext>
     </p:extLst>
   </p:cSld>
@@ -15633,7 +15616,7 @@
     <a:masterClrMapping/>
   </p:clrMapOvr>
   <mc:AlternateContent xmlns:mc="http://schemas.openxmlformats.org/markup-compatibility/2006">
-    <mc:Choice xmlns="" xmlns:p14="http://schemas.microsoft.com/office/powerpoint/2010/main" Requires="p14">
+    <mc:Choice xmlns:p14="http://schemas.microsoft.com/office/powerpoint/2010/main" xmlns="" Requires="p14">
       <p:transition spd="slow" p14:dur="2000" advClick="0" advTm="5000"/>
     </mc:Choice>
     <mc:Fallback>
@@ -15793,7 +15776,7 @@
           <p:cNvPr id="14" name="Text Placeholder 4">
             <a:extLst>
               <a:ext uri="{FF2B5EF4-FFF2-40B4-BE49-F238E27FC236}">
-                <a16:creationId xmlns="" xmlns:a16="http://schemas.microsoft.com/office/drawing/2014/main" id="{0E49D336-45B6-44D3-97C4-E28F8DEA2022}"/>
+                <a16:creationId xmlns:a16="http://schemas.microsoft.com/office/drawing/2014/main" xmlns="" id="{0E49D336-45B6-44D3-97C4-E28F8DEA2022}"/>
               </a:ext>
             </a:extLst>
           </p:cNvPr>
@@ -15917,7 +15900,7 @@
           <p:cNvPr id="9" name="Group 8">
             <a:extLst>
               <a:ext uri="{FF2B5EF4-FFF2-40B4-BE49-F238E27FC236}">
-                <a16:creationId xmlns="" xmlns:a16="http://schemas.microsoft.com/office/drawing/2014/main" id="{EBAFE522-EB7D-4931-A015-9A7E8A98517D}"/>
+                <a16:creationId xmlns:a16="http://schemas.microsoft.com/office/drawing/2014/main" xmlns="" id="{EBAFE522-EB7D-4931-A015-9A7E8A98517D}"/>
               </a:ext>
             </a:extLst>
           </p:cNvPr>
@@ -15937,7 +15920,7 @@
             <p:cNvPr id="10" name="Rounded Rectangle 10">
               <a:extLst>
                 <a:ext uri="{FF2B5EF4-FFF2-40B4-BE49-F238E27FC236}">
-                  <a16:creationId xmlns="" xmlns:a16="http://schemas.microsoft.com/office/drawing/2014/main" id="{18F78F23-3D09-4B63-8DF9-D49CFBB145EE}"/>
+                  <a16:creationId xmlns:a16="http://schemas.microsoft.com/office/drawing/2014/main" xmlns="" id="{18F78F23-3D09-4B63-8DF9-D49CFBB145EE}"/>
                 </a:ext>
               </a:extLst>
             </p:cNvPr>
@@ -16020,7 +16003,7 @@
             <p:cNvPr id="11" name="Rounded Rectangle 16">
               <a:extLst>
                 <a:ext uri="{FF2B5EF4-FFF2-40B4-BE49-F238E27FC236}">
-                  <a16:creationId xmlns="" xmlns:a16="http://schemas.microsoft.com/office/drawing/2014/main" id="{F12C06CE-2BBE-46C2-B718-813794C58DF9}"/>
+                  <a16:creationId xmlns:a16="http://schemas.microsoft.com/office/drawing/2014/main" xmlns="" id="{F12C06CE-2BBE-46C2-B718-813794C58DF9}"/>
                 </a:ext>
               </a:extLst>
             </p:cNvPr>
@@ -16105,7 +16088,7 @@
             <p:cNvPr id="12" name="Half Frame 11">
               <a:extLst>
                 <a:ext uri="{FF2B5EF4-FFF2-40B4-BE49-F238E27FC236}">
-                  <a16:creationId xmlns="" xmlns:a16="http://schemas.microsoft.com/office/drawing/2014/main" id="{66CDBB1E-AF3C-43FC-9F34-2DD691F81726}"/>
+                  <a16:creationId xmlns:a16="http://schemas.microsoft.com/office/drawing/2014/main" xmlns="" id="{66CDBB1E-AF3C-43FC-9F34-2DD691F81726}"/>
                 </a:ext>
               </a:extLst>
             </p:cNvPr>
@@ -16192,7 +16175,7 @@
           <p:cNvPr id="13" name="Picture 12">
             <a:extLst>
               <a:ext uri="{FF2B5EF4-FFF2-40B4-BE49-F238E27FC236}">
-                <a16:creationId xmlns="" xmlns:a16="http://schemas.microsoft.com/office/drawing/2014/main" id="{CCC3A316-993C-4741-8826-E104F27650A3}"/>
+                <a16:creationId xmlns:a16="http://schemas.microsoft.com/office/drawing/2014/main" xmlns="" id="{CCC3A316-993C-4741-8826-E104F27650A3}"/>
               </a:ext>
             </a:extLst>
           </p:cNvPr>
@@ -16205,7 +16188,7 @@
           <a:blip r:embed="rId3" cstate="print">
             <a:extLst>
               <a:ext uri="{28A0092B-C50C-407E-A947-70E740481C1C}">
-                <a14:useLocalDpi xmlns="" xmlns:a14="http://schemas.microsoft.com/office/drawing/2010/main" val="0"/>
+                <a14:useLocalDpi xmlns:a14="http://schemas.microsoft.com/office/drawing/2010/main" xmlns="" val="0"/>
               </a:ext>
             </a:extLst>
           </a:blip>
@@ -16227,7 +16210,7 @@
           <p:cNvPr id="15" name="Content Placeholder 4">
             <a:extLst>
               <a:ext uri="{FF2B5EF4-FFF2-40B4-BE49-F238E27FC236}">
-                <a16:creationId xmlns="" xmlns:a16="http://schemas.microsoft.com/office/drawing/2014/main" id="{B96A0DF8-27E7-4DC8-BBE3-7238AAAEB845}"/>
+                <a16:creationId xmlns:a16="http://schemas.microsoft.com/office/drawing/2014/main" xmlns="" id="{B96A0DF8-27E7-4DC8-BBE3-7238AAAEB845}"/>
               </a:ext>
             </a:extLst>
           </p:cNvPr>
@@ -16739,7 +16722,7 @@
           <p:cNvPr id="16" name="Slide Number">
             <a:extLst>
               <a:ext uri="{FF2B5EF4-FFF2-40B4-BE49-F238E27FC236}">
-                <a16:creationId xmlns="" xmlns:a16="http://schemas.microsoft.com/office/drawing/2014/main" id="{49334D44-7518-4233-8A43-DB57B354A99C}"/>
+                <a16:creationId xmlns:a16="http://schemas.microsoft.com/office/drawing/2014/main" xmlns="" id="{49334D44-7518-4233-8A43-DB57B354A99C}"/>
               </a:ext>
             </a:extLst>
           </p:cNvPr>
@@ -16779,7 +16762,7 @@
     </p:spTree>
     <p:extLst>
       <p:ext uri="{BB962C8B-B14F-4D97-AF65-F5344CB8AC3E}">
-        <p14:creationId xmlns="" xmlns:p14="http://schemas.microsoft.com/office/powerpoint/2010/main" val="4124786151"/>
+        <p14:creationId xmlns:p14="http://schemas.microsoft.com/office/powerpoint/2010/main" xmlns="" val="4124786151"/>
       </p:ext>
     </p:extLst>
   </p:cSld>
@@ -16787,7 +16770,7 @@
     <a:masterClrMapping/>
   </p:clrMapOvr>
   <mc:AlternateContent xmlns:mc="http://schemas.openxmlformats.org/markup-compatibility/2006">
-    <mc:Choice xmlns="" xmlns:p14="http://schemas.microsoft.com/office/powerpoint/2010/main" Requires="p14">
+    <mc:Choice xmlns:p14="http://schemas.microsoft.com/office/powerpoint/2010/main" xmlns="" Requires="p14">
       <p:transition spd="slow" p14:dur="2000" advClick="0" advTm="5000"/>
     </mc:Choice>
     <mc:Fallback>
@@ -17094,7 +17077,7 @@
           <p:cNvPr id="5" name="Slide Title">
             <a:extLst>
               <a:ext uri="{FF2B5EF4-FFF2-40B4-BE49-F238E27FC236}">
-                <a16:creationId xmlns:a16="http://schemas.microsoft.com/office/drawing/2014/main" xmlns="" id="{FA0703FC-0F8F-4C80-A615-E4B381EC0E0C}"/>
+                <a16:creationId xmlns="" xmlns:a16="http://schemas.microsoft.com/office/drawing/2014/main" id="{FA0703FC-0F8F-4C80-A615-E4B381EC0E0C}"/>
               </a:ext>
             </a:extLst>
           </p:cNvPr>
@@ -17133,7 +17116,7 @@
     </p:spTree>
     <p:extLst>
       <p:ext uri="{BB962C8B-B14F-4D97-AF65-F5344CB8AC3E}">
-        <p14:creationId xmlns:p14="http://schemas.microsoft.com/office/powerpoint/2010/main" xmlns="" val="2715899688"/>
+        <p14:creationId xmlns="" xmlns:p14="http://schemas.microsoft.com/office/powerpoint/2010/main" val="2715899688"/>
       </p:ext>
     </p:extLst>
   </p:cSld>
@@ -17141,7 +17124,7 @@
     <a:masterClrMapping/>
   </p:clrMapOvr>
   <mc:AlternateContent xmlns:mc="http://schemas.openxmlformats.org/markup-compatibility/2006">
-    <mc:Choice xmlns:p14="http://schemas.microsoft.com/office/powerpoint/2010/main" xmlns="" Requires="p14">
+    <mc:Choice xmlns="" xmlns:p14="http://schemas.microsoft.com/office/powerpoint/2010/main" Requires="p14">
       <p:transition spd="slow" p14:dur="2000" advClick="0" advTm="5000"/>
     </mc:Choice>
     <mc:Fallback>
@@ -17180,7 +17163,7 @@
           <p:cNvPr id="5" name="Slide Number">
             <a:extLst>
               <a:ext uri="{FF2B5EF4-FFF2-40B4-BE49-F238E27FC236}">
-                <a16:creationId xmlns="" xmlns:a16="http://schemas.microsoft.com/office/drawing/2014/main" id="{F48C3C93-90A1-4D31-BEA6-B54D1106CE31}"/>
+                <a16:creationId xmlns:a16="http://schemas.microsoft.com/office/drawing/2014/main" xmlns="" id="{F48C3C93-90A1-4D31-BEA6-B54D1106CE31}"/>
               </a:ext>
             </a:extLst>
           </p:cNvPr>
@@ -17222,7 +17205,7 @@
           <p:cNvPr id="2" name="Slide Body">
             <a:extLst>
               <a:ext uri="{FF2B5EF4-FFF2-40B4-BE49-F238E27FC236}">
-                <a16:creationId xmlns="" xmlns:a16="http://schemas.microsoft.com/office/drawing/2014/main" id="{980F49B1-E4BE-4389-A747-7AB9B71AD920}"/>
+                <a16:creationId xmlns:a16="http://schemas.microsoft.com/office/drawing/2014/main" xmlns="" id="{980F49B1-E4BE-4389-A747-7AB9B71AD920}"/>
               </a:ext>
             </a:extLst>
           </p:cNvPr>
@@ -17356,7 +17339,7 @@
           <p:cNvPr id="6" name="Picture License" descr="License">
             <a:extLst>
               <a:ext uri="{FF2B5EF4-FFF2-40B4-BE49-F238E27FC236}">
-                <a16:creationId xmlns="" xmlns:a16="http://schemas.microsoft.com/office/drawing/2014/main" id="{A10A2585-858C-4B1E-8846-27CF1C15729E}"/>
+                <a16:creationId xmlns:a16="http://schemas.microsoft.com/office/drawing/2014/main" xmlns="" id="{A10A2585-858C-4B1E-8846-27CF1C15729E}"/>
               </a:ext>
             </a:extLst>
           </p:cNvPr>
@@ -17397,7 +17380,7 @@
           <p:cNvPr id="3" name="Slide Title">
             <a:extLst>
               <a:ext uri="{FF2B5EF4-FFF2-40B4-BE49-F238E27FC236}">
-                <a16:creationId xmlns="" xmlns:a16="http://schemas.microsoft.com/office/drawing/2014/main" id="{E5F1FB41-80C3-4816-BC47-CCC50632E6E8}"/>
+                <a16:creationId xmlns:a16="http://schemas.microsoft.com/office/drawing/2014/main" xmlns="" id="{E5F1FB41-80C3-4816-BC47-CCC50632E6E8}"/>
               </a:ext>
             </a:extLst>
           </p:cNvPr>
@@ -17423,7 +17406,7 @@
     </p:spTree>
     <p:extLst>
       <p:ext uri="{BB962C8B-B14F-4D97-AF65-F5344CB8AC3E}">
-        <p14:creationId xmlns="" xmlns:p14="http://schemas.microsoft.com/office/powerpoint/2010/main" val="3506533871"/>
+        <p14:creationId xmlns:p14="http://schemas.microsoft.com/office/powerpoint/2010/main" xmlns="" val="3506533871"/>
       </p:ext>
     </p:extLst>
   </p:cSld>
@@ -17431,7 +17414,7 @@
     <a:masterClrMapping/>
   </p:clrMapOvr>
   <mc:AlternateContent xmlns:mc="http://schemas.openxmlformats.org/markup-compatibility/2006">
-    <mc:Choice xmlns="" xmlns:p14="http://schemas.microsoft.com/office/powerpoint/2010/main" Requires="p14">
+    <mc:Choice xmlns:p14="http://schemas.microsoft.com/office/powerpoint/2010/main" xmlns="" Requires="p14">
       <p:transition spd="slow" p14:dur="2000" advClick="0" advTm="5000"/>
     </mc:Choice>
     <mc:Fallback>
@@ -17555,7 +17538,7 @@
     <a:masterClrMapping/>
   </p:clrMapOvr>
   <mc:AlternateContent xmlns:mc="http://schemas.openxmlformats.org/markup-compatibility/2006">
-    <mc:Choice xmlns="" xmlns:p14="http://schemas.microsoft.com/office/powerpoint/2010/main" Requires="p14">
+    <mc:Choice xmlns:p14="http://schemas.microsoft.com/office/powerpoint/2010/main" xmlns="" Requires="p14">
       <p:transition spd="slow" p14:dur="2000" advClick="0" advTm="5000"/>
     </mc:Choice>
     <mc:Fallback>
@@ -17921,7 +17904,7 @@
           <p:cNvPr id="7" name="Slide Number">
             <a:extLst>
               <a:ext uri="{FF2B5EF4-FFF2-40B4-BE49-F238E27FC236}">
-                <a16:creationId xmlns="" xmlns:a16="http://schemas.microsoft.com/office/drawing/2014/main" id="{D10A6F80-B742-4059-88FB-2CB7108E89B5}"/>
+                <a16:creationId xmlns:a16="http://schemas.microsoft.com/office/drawing/2014/main" xmlns="" id="{D10A6F80-B742-4059-88FB-2CB7108E89B5}"/>
               </a:ext>
             </a:extLst>
           </p:cNvPr>
@@ -17961,7 +17944,7 @@
     </p:spTree>
     <p:extLst>
       <p:ext uri="{BB962C8B-B14F-4D97-AF65-F5344CB8AC3E}">
-        <p14:creationId xmlns="" xmlns:p14="http://schemas.microsoft.com/office/powerpoint/2010/main" val="364305339"/>
+        <p14:creationId xmlns:p14="http://schemas.microsoft.com/office/powerpoint/2010/main" xmlns="" val="364305339"/>
       </p:ext>
     </p:extLst>
   </p:cSld>
@@ -18409,7 +18392,7 @@
           <p:cNvPr id="9" name="Slide Number">
             <a:extLst>
               <a:ext uri="{FF2B5EF4-FFF2-40B4-BE49-F238E27FC236}">
-                <a16:creationId xmlns="" xmlns:a16="http://schemas.microsoft.com/office/drawing/2014/main" id="{07901521-E17C-4BE7-B37A-E62F9A58F453}"/>
+                <a16:creationId xmlns:a16="http://schemas.microsoft.com/office/drawing/2014/main" xmlns="" id="{07901521-E17C-4BE7-B37A-E62F9A58F453}"/>
               </a:ext>
             </a:extLst>
           </p:cNvPr>
@@ -18449,7 +18432,7 @@
     </p:spTree>
     <p:extLst>
       <p:ext uri="{BB962C8B-B14F-4D97-AF65-F5344CB8AC3E}">
-        <p14:creationId xmlns="" xmlns:p14="http://schemas.microsoft.com/office/powerpoint/2010/main" val="3954003357"/>
+        <p14:creationId xmlns:p14="http://schemas.microsoft.com/office/powerpoint/2010/main" xmlns="" val="3954003357"/>
       </p:ext>
     </p:extLst>
   </p:cSld>
@@ -18457,7 +18440,7 @@
     <a:masterClrMapping/>
   </p:clrMapOvr>
   <mc:AlternateContent xmlns:mc="http://schemas.openxmlformats.org/markup-compatibility/2006">
-    <mc:Choice xmlns="" xmlns:p14="http://schemas.microsoft.com/office/powerpoint/2010/main" Requires="p14">
+    <mc:Choice xmlns:p14="http://schemas.microsoft.com/office/powerpoint/2010/main" xmlns="" Requires="p14">
       <p:transition spd="slow" p14:dur="2000" advClick="0" advTm="5000"/>
     </mc:Choice>
     <mc:Fallback>
@@ -18843,7 +18826,7 @@
     <a:masterClrMapping/>
   </p:clrMapOvr>
   <mc:AlternateContent xmlns:mc="http://schemas.openxmlformats.org/markup-compatibility/2006">
-    <mc:Choice xmlns="" xmlns:p14="http://schemas.microsoft.com/office/powerpoint/2010/main" Requires="p14">
+    <mc:Choice xmlns:p14="http://schemas.microsoft.com/office/powerpoint/2010/main" xmlns="" Requires="p14">
       <p:transition spd="slow" p14:dur="2000" advClick="0" advTm="5000"/>
     </mc:Choice>
     <mc:Fallback>
@@ -19326,7 +19309,7 @@
           <p:nvPr>
             <p:extLst>
               <p:ext uri="{D42A27DB-BD31-4B8C-83A1-F6EECF244321}">
-                <p14:modId xmlns:p14="http://schemas.microsoft.com/office/powerpoint/2010/main" xmlns="" val="2873921945"/>
+                <p14:modId xmlns="" xmlns:p14="http://schemas.microsoft.com/office/powerpoint/2010/main" val="2873921945"/>
               </p:ext>
             </p:extLst>
           </p:nvPr>
@@ -19343,21 +19326,21 @@
                 <a:gridCol w="1862138">
                   <a:extLst>
                     <a:ext uri="{9D8B030D-6E8A-4147-A177-3AD203B41FA5}">
-                      <a16:colId xmlns:a16="http://schemas.microsoft.com/office/drawing/2014/main" xmlns="" val="20000"/>
+                      <a16:colId xmlns="" xmlns:a16="http://schemas.microsoft.com/office/drawing/2014/main" val="20000"/>
                     </a:ext>
                   </a:extLst>
                 </a:gridCol>
                 <a:gridCol w="3959225">
                   <a:extLst>
                     <a:ext uri="{9D8B030D-6E8A-4147-A177-3AD203B41FA5}">
-                      <a16:colId xmlns:a16="http://schemas.microsoft.com/office/drawing/2014/main" xmlns="" val="20001"/>
+                      <a16:colId xmlns="" xmlns:a16="http://schemas.microsoft.com/office/drawing/2014/main" val="20001"/>
                     </a:ext>
                   </a:extLst>
                 </a:gridCol>
                 <a:gridCol w="1584325">
                   <a:extLst>
                     <a:ext uri="{9D8B030D-6E8A-4147-A177-3AD203B41FA5}">
-                      <a16:colId xmlns:a16="http://schemas.microsoft.com/office/drawing/2014/main" xmlns="" val="20002"/>
+                      <a16:colId xmlns="" xmlns:a16="http://schemas.microsoft.com/office/drawing/2014/main" val="20002"/>
                     </a:ext>
                   </a:extLst>
                 </a:gridCol>
@@ -19671,7 +19654,7 @@
                 </a:tc>
                 <a:extLst>
                   <a:ext uri="{0D108BD9-81ED-4DB2-BD59-A6C34878D82A}">
-                    <a16:rowId xmlns:a16="http://schemas.microsoft.com/office/drawing/2014/main" xmlns="" val="10000"/>
+                    <a16:rowId xmlns="" xmlns:a16="http://schemas.microsoft.com/office/drawing/2014/main" val="10000"/>
                   </a:ext>
                 </a:extLst>
               </a:tr>
@@ -19966,7 +19949,7 @@
                 </a:tc>
                 <a:extLst>
                   <a:ext uri="{0D108BD9-81ED-4DB2-BD59-A6C34878D82A}">
-                    <a16:rowId xmlns:a16="http://schemas.microsoft.com/office/drawing/2014/main" xmlns="" val="10001"/>
+                    <a16:rowId xmlns="" xmlns:a16="http://schemas.microsoft.com/office/drawing/2014/main" val="10001"/>
                   </a:ext>
                 </a:extLst>
               </a:tr>
@@ -20261,7 +20244,7 @@
                 </a:tc>
                 <a:extLst>
                   <a:ext uri="{0D108BD9-81ED-4DB2-BD59-A6C34878D82A}">
-                    <a16:rowId xmlns:a16="http://schemas.microsoft.com/office/drawing/2014/main" xmlns="" val="10002"/>
+                    <a16:rowId xmlns="" xmlns:a16="http://schemas.microsoft.com/office/drawing/2014/main" val="10002"/>
                   </a:ext>
                 </a:extLst>
               </a:tr>
@@ -20556,7 +20539,7 @@
                 </a:tc>
                 <a:extLst>
                   <a:ext uri="{0D108BD9-81ED-4DB2-BD59-A6C34878D82A}">
-                    <a16:rowId xmlns:a16="http://schemas.microsoft.com/office/drawing/2014/main" xmlns="" val="10003"/>
+                    <a16:rowId xmlns="" xmlns:a16="http://schemas.microsoft.com/office/drawing/2014/main" val="10003"/>
                   </a:ext>
                 </a:extLst>
               </a:tr>
@@ -20851,7 +20834,7 @@
                 </a:tc>
                 <a:extLst>
                   <a:ext uri="{0D108BD9-81ED-4DB2-BD59-A6C34878D82A}">
-                    <a16:rowId xmlns:a16="http://schemas.microsoft.com/office/drawing/2014/main" xmlns="" val="10004"/>
+                    <a16:rowId xmlns="" xmlns:a16="http://schemas.microsoft.com/office/drawing/2014/main" val="10004"/>
                   </a:ext>
                 </a:extLst>
               </a:tr>
@@ -20868,7 +20851,7 @@
           <p:nvPr>
             <p:extLst>
               <p:ext uri="{D42A27DB-BD31-4B8C-83A1-F6EECF244321}">
-                <p14:modId xmlns:p14="http://schemas.microsoft.com/office/powerpoint/2010/main" xmlns="" val="2471511480"/>
+                <p14:modId xmlns="" xmlns:p14="http://schemas.microsoft.com/office/powerpoint/2010/main" val="2471511480"/>
               </p:ext>
             </p:extLst>
           </p:nvPr>
@@ -20885,14 +20868,14 @@
                 <a:gridCol w="1817724">
                   <a:extLst>
                     <a:ext uri="{9D8B030D-6E8A-4147-A177-3AD203B41FA5}">
-                      <a16:colId xmlns:a16="http://schemas.microsoft.com/office/drawing/2014/main" xmlns="" val="20000"/>
+                      <a16:colId xmlns="" xmlns:a16="http://schemas.microsoft.com/office/drawing/2014/main" val="20000"/>
                     </a:ext>
                   </a:extLst>
                 </a:gridCol>
                 <a:gridCol w="1978428">
                   <a:extLst>
                     <a:ext uri="{9D8B030D-6E8A-4147-A177-3AD203B41FA5}">
-                      <a16:colId xmlns:a16="http://schemas.microsoft.com/office/drawing/2014/main" xmlns="" val="20001"/>
+                      <a16:colId xmlns="" xmlns:a16="http://schemas.microsoft.com/office/drawing/2014/main" val="20001"/>
                     </a:ext>
                   </a:extLst>
                 </a:gridCol>
@@ -21104,7 +21087,7 @@
                 </a:tc>
                 <a:extLst>
                   <a:ext uri="{0D108BD9-81ED-4DB2-BD59-A6C34878D82A}">
-                    <a16:rowId xmlns:a16="http://schemas.microsoft.com/office/drawing/2014/main" xmlns="" val="10000"/>
+                    <a16:rowId xmlns="" xmlns:a16="http://schemas.microsoft.com/office/drawing/2014/main" val="10000"/>
                   </a:ext>
                 </a:extLst>
               </a:tr>
@@ -21303,7 +21286,7 @@
                 </a:tc>
                 <a:extLst>
                   <a:ext uri="{0D108BD9-81ED-4DB2-BD59-A6C34878D82A}">
-                    <a16:rowId xmlns:a16="http://schemas.microsoft.com/office/drawing/2014/main" xmlns="" val="10001"/>
+                    <a16:rowId xmlns="" xmlns:a16="http://schemas.microsoft.com/office/drawing/2014/main" val="10001"/>
                   </a:ext>
                 </a:extLst>
               </a:tr>
@@ -21502,7 +21485,7 @@
                 </a:tc>
                 <a:extLst>
                   <a:ext uri="{0D108BD9-81ED-4DB2-BD59-A6C34878D82A}">
-                    <a16:rowId xmlns:a16="http://schemas.microsoft.com/office/drawing/2014/main" xmlns="" val="10002"/>
+                    <a16:rowId xmlns="" xmlns:a16="http://schemas.microsoft.com/office/drawing/2014/main" val="10002"/>
                   </a:ext>
                 </a:extLst>
               </a:tr>
@@ -21701,7 +21684,7 @@
                 </a:tc>
                 <a:extLst>
                   <a:ext uri="{0D108BD9-81ED-4DB2-BD59-A6C34878D82A}">
-                    <a16:rowId xmlns:a16="http://schemas.microsoft.com/office/drawing/2014/main" xmlns="" val="10003"/>
+                    <a16:rowId xmlns="" xmlns:a16="http://schemas.microsoft.com/office/drawing/2014/main" val="10003"/>
                   </a:ext>
                 </a:extLst>
               </a:tr>
@@ -21910,7 +21893,7 @@
                 </a:tc>
                 <a:extLst>
                   <a:ext uri="{0D108BD9-81ED-4DB2-BD59-A6C34878D82A}">
-                    <a16:rowId xmlns:a16="http://schemas.microsoft.com/office/drawing/2014/main" xmlns="" val="10004"/>
+                    <a16:rowId xmlns="" xmlns:a16="http://schemas.microsoft.com/office/drawing/2014/main" val="10004"/>
                   </a:ext>
                 </a:extLst>
               </a:tr>
@@ -21971,7 +21954,7 @@
           <p:cNvPr id="11" name="Slide Number">
             <a:extLst>
               <a:ext uri="{FF2B5EF4-FFF2-40B4-BE49-F238E27FC236}">
-                <a16:creationId xmlns:a16="http://schemas.microsoft.com/office/drawing/2014/main" xmlns="" id="{8449B4AA-96C8-46CA-B2A2-9FE3ED446778}"/>
+                <a16:creationId xmlns="" xmlns:a16="http://schemas.microsoft.com/office/drawing/2014/main" id="{8449B4AA-96C8-46CA-B2A2-9FE3ED446778}"/>
               </a:ext>
             </a:extLst>
           </p:cNvPr>
@@ -22011,7 +21994,7 @@
     </p:spTree>
     <p:extLst>
       <p:ext uri="{BB962C8B-B14F-4D97-AF65-F5344CB8AC3E}">
-        <p14:creationId xmlns:p14="http://schemas.microsoft.com/office/powerpoint/2010/main" xmlns="" val="946900582"/>
+        <p14:creationId xmlns="" xmlns:p14="http://schemas.microsoft.com/office/powerpoint/2010/main" val="946900582"/>
       </p:ext>
     </p:extLst>
   </p:cSld>
@@ -22019,7 +22002,7 @@
     <a:masterClrMapping/>
   </p:clrMapOvr>
   <mc:AlternateContent xmlns:mc="http://schemas.openxmlformats.org/markup-compatibility/2006">
-    <mc:Choice xmlns:p14="http://schemas.microsoft.com/office/powerpoint/2010/main" xmlns="" Requires="p14">
+    <mc:Choice xmlns="" xmlns:p14="http://schemas.microsoft.com/office/powerpoint/2010/main" Requires="p14">
       <p:transition spd="slow" p14:dur="2000" advClick="0" advTm="5000"/>
     </mc:Choice>
     <mc:Fallback>
@@ -22594,7 +22577,7 @@
     <a:masterClrMapping/>
   </p:clrMapOvr>
   <mc:AlternateContent xmlns:mc="http://schemas.openxmlformats.org/markup-compatibility/2006">
-    <mc:Choice xmlns="" xmlns:p14="http://schemas.microsoft.com/office/powerpoint/2010/main" Requires="p14">
+    <mc:Choice xmlns:p14="http://schemas.microsoft.com/office/powerpoint/2010/main" xmlns="" Requires="p14">
       <p:transition spd="slow" p14:dur="2000" advClick="0" advTm="5000"/>
     </mc:Choice>
     <mc:Fallback>
@@ -23049,7 +23032,7 @@
     <a:masterClrMapping/>
   </p:clrMapOvr>
   <mc:AlternateContent xmlns:mc="http://schemas.openxmlformats.org/markup-compatibility/2006">
-    <mc:Choice xmlns="" xmlns:p14="http://schemas.microsoft.com/office/powerpoint/2010/main" Requires="p14">
+    <mc:Choice xmlns:p14="http://schemas.microsoft.com/office/powerpoint/2010/main" xmlns="" Requires="p14">
       <p:transition spd="slow" p14:dur="2000" advClick="0" advTm="5000"/>
     </mc:Choice>
     <mc:Fallback>
@@ -23502,7 +23485,7 @@
   <a:extraClrSchemeLst/>
   <a:extLst>
     <a:ext uri="{05A4C25C-085E-4340-85A3-A5531E510DB2}">
-      <thm15:themeFamily xmlns="" xmlns:thm15="http://schemas.microsoft.com/office/thememl/2012/main" name="SoftUni" id="{D61FAD9B-6E74-4E03-BFE4-B363D484F1DA}" vid="{7089C1A3-635B-4B03-A017-DAF10A3A396B}"/>
+      <thm15:themeFamily xmlns:thm15="http://schemas.microsoft.com/office/thememl/2012/main" xmlns="" name="SoftUni" id="{D61FAD9B-6E74-4E03-BFE4-B363D484F1DA}" vid="{7089C1A3-635B-4B03-A017-DAF10A3A396B}"/>
     </a:ext>
   </a:extLst>
 </a:theme>
@@ -23797,7 +23780,7 @@
   <a:extraClrSchemeLst/>
   <a:extLst>
     <a:ext uri="{05A4C25C-085E-4340-85A3-A5531E510DB2}">
-      <thm15:themeFamily xmlns="" xmlns:thm15="http://schemas.microsoft.com/office/thememl/2012/main" name="Office Theme" id="{62F939B6-93AF-4DB8-9C6B-D6C7DFDC589F}" vid="{4A3C46E8-61CC-4603-A589-7422A47A8E4A}"/>
+      <thm15:themeFamily xmlns:thm15="http://schemas.microsoft.com/office/thememl/2012/main" xmlns="" name="Office Theme" id="{62F939B6-93AF-4DB8-9C6B-D6C7DFDC589F}" vid="{4A3C46E8-61CC-4603-A589-7422A47A8E4A}"/>
     </a:ext>
   </a:extLst>
 </a:theme>
@@ -24092,7 +24075,7 @@
   <a:extraClrSchemeLst/>
   <a:extLst>
     <a:ext uri="{05A4C25C-085E-4340-85A3-A5531E510DB2}">
-      <thm15:themeFamily xmlns="" xmlns:thm15="http://schemas.microsoft.com/office/thememl/2012/main" name="Office Theme" id="{62F939B6-93AF-4DB8-9C6B-D6C7DFDC589F}" vid="{4A3C46E8-61CC-4603-A589-7422A47A8E4A}"/>
+      <thm15:themeFamily xmlns:thm15="http://schemas.microsoft.com/office/thememl/2012/main" xmlns="" name="Office Theme" id="{62F939B6-93AF-4DB8-9C6B-D6C7DFDC589F}" vid="{4A3C46E8-61CC-4603-A589-7422A47A8E4A}"/>
     </a:ext>
   </a:extLst>
 </a:theme>

</xml_diff>

<commit_message>
Adding explanation for SQL Wildcard in Intro to SQL slides
</commit_message>
<xml_diff>
--- a/Courses/Software-Sciences/Module-3-Databases-New/04-Intro-to-SQL/04-Intro-to-SQL.pptx
+++ b/Courses/Software-Sciences/Module-3-Databases-New/04-Intro-to-SQL/04-Intro-to-SQL.pptx
@@ -541,7 +541,7 @@
           <a:p>
             <a:fld id="{4E087215-0C8F-4762-A664-737A353EC9A4}" type="datetimeFigureOut">
               <a:rPr lang="bg-BG" smtClean="0"/>
-              <a:t>6.10.2023 г.</a:t>
+              <a:t>13.10.2023 г.</a:t>
             </a:fld>
             <a:endParaRPr lang="bg-BG"/>
           </a:p>
@@ -737,7 +737,7 @@
           <a:p>
             <a:fld id="{72D84649-876A-46C9-8472-14CB09C070D8}" type="datetimeFigureOut">
               <a:rPr lang="en-US" smtClean="0"/>
-              <a:t>10/6/2023</a:t>
+              <a:t>10/13/2023</a:t>
             </a:fld>
             <a:endParaRPr lang="en-US"/>
           </a:p>
@@ -19617,6 +19617,76 @@
             </a:r>
             <a:endParaRPr lang="en-US" sz="3600" dirty="0"/>
           </a:p>
+          <a:p>
+            <a:endParaRPr lang="en-US" sz="3600" dirty="0"/>
+          </a:p>
+          <a:p>
+            <a:endParaRPr lang="en-US" sz="3600" dirty="0"/>
+          </a:p>
+          <a:p>
+            <a:pPr>
+              <a:buClr>
+                <a:schemeClr val="tx1"/>
+              </a:buClr>
+            </a:pPr>
+            <a:r>
+              <a:rPr lang="en-US" sz="3600" dirty="0"/>
+              <a:t>“</a:t>
+            </a:r>
+            <a:r>
+              <a:rPr lang="en-US" sz="3600" b="1" dirty="0">
+                <a:solidFill>
+                  <a:schemeClr val="bg1"/>
+                </a:solidFill>
+              </a:rPr>
+              <a:t>%</a:t>
+            </a:r>
+            <a:r>
+              <a:rPr lang="en-US" sz="3600" dirty="0"/>
+              <a:t>” </a:t>
+            </a:r>
+            <a:r>
+              <a:rPr lang="bg-BG" sz="3600" dirty="0"/>
+              <a:t>в </a:t>
+            </a:r>
+            <a:r>
+              <a:rPr lang="en-US" sz="3600" b="1" dirty="0">
+                <a:latin typeface="Consolas" panose="020B0609020204030204" pitchFamily="49" charset="0"/>
+              </a:rPr>
+              <a:t>WHERE</a:t>
+            </a:r>
+            <a:r>
+              <a:rPr lang="en-US" sz="3600" dirty="0"/>
+              <a:t> </a:t>
+            </a:r>
+            <a:r>
+              <a:rPr lang="bg-BG" sz="3600" dirty="0"/>
+              <a:t>клаузата е така нареченият </a:t>
+            </a:r>
+            <a:r>
+              <a:rPr lang="en-US" sz="3600" b="1" dirty="0">
+                <a:solidFill>
+                  <a:schemeClr val="bg1"/>
+                </a:solidFill>
+              </a:rPr>
+              <a:t>Wildcard</a:t>
+            </a:r>
+          </a:p>
+          <a:p>
+            <a:pPr>
+              <a:buClr>
+                <a:schemeClr val="tx1"/>
+              </a:buClr>
+            </a:pPr>
+            <a:r>
+              <a:rPr lang="bg-BG" sz="3600" dirty="0"/>
+              <a:t>Повече за тях можете да намерите тук: </a:t>
+            </a:r>
+            <a:r>
+              <a:rPr lang="en-US" sz="3600" dirty="0"/>
+              <a:t>https://www.w3schools.com/sql/sql_wildcards.asp</a:t>
+            </a:r>
+          </a:p>
         </p:txBody>
       </p:sp>
       <p:sp>
@@ -19655,7 +19725,7 @@
         </p:nvSpPr>
         <p:spPr bwMode="auto">
           <a:xfrm>
-            <a:off x="2406000" y="3879000"/>
+            <a:off x="2406000" y="3214005"/>
             <a:ext cx="7380000" cy="1384995"/>
           </a:xfrm>
           <a:prstGeom prst="rect">
@@ -19951,6 +20021,104 @@
                                         </p:cTn>
                                         <p:tgtEl>
                                           <p:spTgt spid="5"/>
+                                        </p:tgtEl>
+                                        <p:attrNameLst>
+                                          <p:attrName>style.visibility</p:attrName>
+                                        </p:attrNameLst>
+                                      </p:cBhvr>
+                                      <p:to>
+                                        <p:strVal val="visible"/>
+                                      </p:to>
+                                    </p:set>
+                                  </p:childTnLst>
+                                </p:cTn>
+                              </p:par>
+                            </p:childTnLst>
+                          </p:cTn>
+                        </p:par>
+                      </p:childTnLst>
+                    </p:cTn>
+                  </p:par>
+                  <p:par>
+                    <p:cTn id="11" fill="hold">
+                      <p:stCondLst>
+                        <p:cond delay="indefinite"/>
+                      </p:stCondLst>
+                      <p:childTnLst>
+                        <p:par>
+                          <p:cTn id="12" fill="hold">
+                            <p:stCondLst>
+                              <p:cond delay="0"/>
+                            </p:stCondLst>
+                            <p:childTnLst>
+                              <p:par>
+                                <p:cTn id="13" presetID="1" presetClass="entr" presetSubtype="0" fill="hold" nodeType="clickEffect">
+                                  <p:stCondLst>
+                                    <p:cond delay="0"/>
+                                  </p:stCondLst>
+                                  <p:childTnLst>
+                                    <p:set>
+                                      <p:cBhvr>
+                                        <p:cTn id="14" dur="1" fill="hold">
+                                          <p:stCondLst>
+                                            <p:cond delay="0"/>
+                                          </p:stCondLst>
+                                        </p:cTn>
+                                        <p:tgtEl>
+                                          <p:spTgt spid="3">
+                                            <p:txEl>
+                                              <p:pRg st="4" end="4"/>
+                                            </p:txEl>
+                                          </p:spTgt>
+                                        </p:tgtEl>
+                                        <p:attrNameLst>
+                                          <p:attrName>style.visibility</p:attrName>
+                                        </p:attrNameLst>
+                                      </p:cBhvr>
+                                      <p:to>
+                                        <p:strVal val="visible"/>
+                                      </p:to>
+                                    </p:set>
+                                  </p:childTnLst>
+                                </p:cTn>
+                              </p:par>
+                            </p:childTnLst>
+                          </p:cTn>
+                        </p:par>
+                      </p:childTnLst>
+                    </p:cTn>
+                  </p:par>
+                  <p:par>
+                    <p:cTn id="15" fill="hold">
+                      <p:stCondLst>
+                        <p:cond delay="indefinite"/>
+                      </p:stCondLst>
+                      <p:childTnLst>
+                        <p:par>
+                          <p:cTn id="16" fill="hold">
+                            <p:stCondLst>
+                              <p:cond delay="0"/>
+                            </p:stCondLst>
+                            <p:childTnLst>
+                              <p:par>
+                                <p:cTn id="17" presetID="1" presetClass="entr" presetSubtype="0" fill="hold" nodeType="clickEffect">
+                                  <p:stCondLst>
+                                    <p:cond delay="0"/>
+                                  </p:stCondLst>
+                                  <p:childTnLst>
+                                    <p:set>
+                                      <p:cBhvr>
+                                        <p:cTn id="18" dur="1" fill="hold">
+                                          <p:stCondLst>
+                                            <p:cond delay="0"/>
+                                          </p:stCondLst>
+                                        </p:cTn>
+                                        <p:tgtEl>
+                                          <p:spTgt spid="3">
+                                            <p:txEl>
+                                              <p:pRg st="5" end="5"/>
+                                            </p:txEl>
+                                          </p:spTgt>
                                         </p:tgtEl>
                                         <p:attrNameLst>
                                           <p:attrName>style.visibility</p:attrName>

</xml_diff>

<commit_message>
Updates on Intro to SQL slides
</commit_message>
<xml_diff>
--- a/Courses/Software-Sciences/Module-3-Databases-New/04-Intro-to-SQL/04-Intro-to-SQL.pptx
+++ b/Courses/Software-Sciences/Module-3-Databases-New/04-Intro-to-SQL/04-Intro-to-SQL.pptx
@@ -5,10 +5,10 @@
     <p:sldMasterId id="2147483675" r:id="rId1"/>
   </p:sldMasterIdLst>
   <p:notesMasterIdLst>
-    <p:notesMasterId r:id="rId24"/>
+    <p:notesMasterId r:id="rId25"/>
   </p:notesMasterIdLst>
   <p:handoutMasterIdLst>
-    <p:handoutMasterId r:id="rId25"/>
+    <p:handoutMasterId r:id="rId26"/>
   </p:handoutMasterIdLst>
   <p:sldIdLst>
     <p:sldId id="1176" r:id="rId2"/>
@@ -25,14 +25,15 @@
     <p:sldId id="1194" r:id="rId13"/>
     <p:sldId id="1195" r:id="rId14"/>
     <p:sldId id="1196" r:id="rId15"/>
-    <p:sldId id="1199" r:id="rId16"/>
-    <p:sldId id="1201" r:id="rId17"/>
-    <p:sldId id="1202" r:id="rId18"/>
-    <p:sldId id="1203" r:id="rId19"/>
-    <p:sldId id="1204" r:id="rId20"/>
-    <p:sldId id="1127" r:id="rId21"/>
-    <p:sldId id="504" r:id="rId22"/>
-    <p:sldId id="505" r:id="rId23"/>
+    <p:sldId id="1205" r:id="rId16"/>
+    <p:sldId id="1199" r:id="rId17"/>
+    <p:sldId id="1201" r:id="rId18"/>
+    <p:sldId id="1202" r:id="rId19"/>
+    <p:sldId id="1203" r:id="rId20"/>
+    <p:sldId id="1204" r:id="rId21"/>
+    <p:sldId id="1127" r:id="rId22"/>
+    <p:sldId id="504" r:id="rId23"/>
+    <p:sldId id="505" r:id="rId24"/>
   </p:sldIdLst>
   <p:sldSz cx="12192000" cy="6858000"/>
   <p:notesSz cx="6858000" cy="9144000"/>
@@ -154,6 +155,7 @@
             <p14:sldId id="1194"/>
             <p14:sldId id="1195"/>
             <p14:sldId id="1196"/>
+            <p14:sldId id="1205"/>
           </p14:sldIdLst>
         </p14:section>
         <p14:section name="Базови SQL функции" id="{C4E282F4-64AE-4CB3-8B4A-E8145DC5C868}">
@@ -541,7 +543,7 @@
           <a:p>
             <a:fld id="{4E087215-0C8F-4762-A664-737A353EC9A4}" type="datetimeFigureOut">
               <a:rPr lang="bg-BG" smtClean="0"/>
-              <a:t>25.2.2024 г.</a:t>
+              <a:t>26.2.2024 г.</a:t>
             </a:fld>
             <a:endParaRPr lang="bg-BG"/>
           </a:p>
@@ -737,7 +739,7 @@
           <a:p>
             <a:fld id="{72D84649-876A-46C9-8472-14CB09C070D8}" type="datetimeFigureOut">
               <a:rPr lang="en-US" smtClean="0"/>
-              <a:t>2/25/2024</a:t>
+              <a:t>2/26/2024</a:t>
             </a:fld>
             <a:endParaRPr lang="en-US"/>
           </a:p>
@@ -2326,7 +2328,7 @@
                 <a:tabLst/>
                 <a:defRPr/>
               </a:pPr>
-              <a:t>20</a:t>
+              <a:t>21</a:t>
             </a:fld>
             <a:endParaRPr kumimoji="0" lang="en-US" sz="1200" b="0" i="0" u="none" strike="noStrike" kern="1200" cap="none" spc="0" normalizeH="0" baseline="0" noProof="0" dirty="0">
               <a:ln>
@@ -2585,7 +2587,7 @@
             <a:fld id="{3EBA5BD7-F043-4D1B-AA17-CD412FC534DE}" type="slidenum">
               <a:rPr lang="en-US" smtClean="0"/>
               <a:pPr/>
-              <a:t>21</a:t>
+              <a:t>22</a:t>
             </a:fld>
             <a:endParaRPr lang="en-US" dirty="0"/>
           </a:p>
@@ -2831,7 +2833,7 @@
             <a:fld id="{3EBA5BD7-F043-4D1B-AA17-CD412FC534DE}" type="slidenum">
               <a:rPr lang="en-US" smtClean="0"/>
               <a:pPr/>
-              <a:t>22</a:t>
+              <a:t>23</a:t>
             </a:fld>
             <a:endParaRPr lang="en-US" dirty="0"/>
           </a:p>
@@ -10669,6 +10671,633 @@
           <a:chExt cx="0" cy="0"/>
         </a:xfrm>
       </p:grpSpPr>
+      <p:sp>
+        <p:nvSpPr>
+          <p:cNvPr id="2" name="Slide Number Placeholder 1">
+            <a:extLst>
+              <a:ext uri="{FF2B5EF4-FFF2-40B4-BE49-F238E27FC236}">
+                <a16:creationId xmlns:a16="http://schemas.microsoft.com/office/drawing/2014/main" id="{1C45D65B-A0AC-896E-3085-46981F66A833}"/>
+              </a:ext>
+            </a:extLst>
+          </p:cNvPr>
+          <p:cNvSpPr>
+            <a:spLocks noGrp="1"/>
+          </p:cNvSpPr>
+          <p:nvPr>
+            <p:ph type="sldNum" sz="quarter" idx="5"/>
+          </p:nvPr>
+        </p:nvSpPr>
+        <p:spPr/>
+        <p:txBody>
+          <a:bodyPr/>
+          <a:lstStyle/>
+          <a:p>
+            <a:fld id="{2BF067CD-8E6B-4360-9AA8-C5DF2A48A6D1}" type="slidenum">
+              <a:rPr lang="en-US" noProof="0" smtClean="0"/>
+              <a:pPr/>
+              <a:t>15</a:t>
+            </a:fld>
+            <a:endParaRPr lang="en-US" noProof="0" dirty="0"/>
+          </a:p>
+        </p:txBody>
+      </p:sp>
+      <p:sp>
+        <p:nvSpPr>
+          <p:cNvPr id="3" name="Text Placeholder 2">
+            <a:extLst>
+              <a:ext uri="{FF2B5EF4-FFF2-40B4-BE49-F238E27FC236}">
+                <a16:creationId xmlns:a16="http://schemas.microsoft.com/office/drawing/2014/main" id="{0C57DF58-E5CF-BF0A-C113-78FC54DC284E}"/>
+              </a:ext>
+            </a:extLst>
+          </p:cNvPr>
+          <p:cNvSpPr>
+            <a:spLocks noGrp="1"/>
+          </p:cNvSpPr>
+          <p:nvPr>
+            <p:ph type="body" sz="quarter" idx="10"/>
+          </p:nvPr>
+        </p:nvSpPr>
+        <p:spPr/>
+        <p:txBody>
+          <a:bodyPr>
+            <a:normAutofit fontScale="92500" lnSpcReduction="20000"/>
+          </a:bodyPr>
+          <a:lstStyle/>
+          <a:p>
+            <a:r>
+              <a:rPr lang="bg-BG" dirty="0"/>
+              <a:t>Поле, </a:t>
+            </a:r>
+            <a:r>
+              <a:rPr lang="ru-RU" dirty="0"/>
+              <a:t>чиято стойност се изчислява на базата на </a:t>
+            </a:r>
+            <a:r>
+              <a:rPr lang="ru-RU" b="1" dirty="0">
+                <a:solidFill>
+                  <a:schemeClr val="bg1"/>
+                </a:solidFill>
+              </a:rPr>
+              <a:t>верига</a:t>
+            </a:r>
+            <a:r>
+              <a:rPr lang="ru-RU" dirty="0"/>
+              <a:t> от </a:t>
+            </a:r>
+            <a:r>
+              <a:rPr lang="ru-RU" b="1" dirty="0">
+                <a:solidFill>
+                  <a:schemeClr val="bg1"/>
+                </a:solidFill>
+              </a:rPr>
+              <a:t>зависимости</a:t>
+            </a:r>
+          </a:p>
+          <a:p>
+            <a:pPr lvl="1">
+              <a:buClr>
+                <a:schemeClr val="tx1"/>
+              </a:buClr>
+            </a:pPr>
+            <a:r>
+              <a:rPr lang="ru-RU" b="1" dirty="0">
+                <a:solidFill>
+                  <a:schemeClr val="bg1"/>
+                </a:solidFill>
+              </a:rPr>
+              <a:t>Резултатът</a:t>
+            </a:r>
+            <a:r>
+              <a:rPr lang="ru-RU" dirty="0"/>
+              <a:t> от едно изчисление служи като </a:t>
+            </a:r>
+            <a:r>
+              <a:rPr lang="ru-RU" b="1" dirty="0">
+                <a:solidFill>
+                  <a:schemeClr val="bg1"/>
+                </a:solidFill>
+              </a:rPr>
+              <a:t>вход</a:t>
+            </a:r>
+            <a:r>
+              <a:rPr lang="ru-RU" dirty="0"/>
+              <a:t> за следващото</a:t>
+            </a:r>
+          </a:p>
+          <a:p>
+            <a:pPr lvl="1"/>
+            <a:r>
+              <a:rPr lang="ru-RU" dirty="0"/>
+              <a:t>Например, имате поле, което изчислява </a:t>
+            </a:r>
+            <a:r>
+              <a:rPr lang="ru-RU" b="1" dirty="0">
+                <a:solidFill>
+                  <a:schemeClr val="bg1"/>
+                </a:solidFill>
+              </a:rPr>
+              <a:t>данък</a:t>
+            </a:r>
+            <a:r>
+              <a:rPr lang="ru-RU" dirty="0"/>
+              <a:t> върху </a:t>
+            </a:r>
+            <a:r>
+              <a:rPr lang="ru-RU" b="1" dirty="0">
+                <a:solidFill>
+                  <a:schemeClr val="bg1"/>
+                </a:solidFill>
+              </a:rPr>
+              <a:t>продажбите</a:t>
+            </a:r>
+            <a:r>
+              <a:rPr lang="ru-RU" dirty="0"/>
+              <a:t> като </a:t>
+            </a:r>
+            <a:r>
+              <a:rPr lang="ru-RU" b="1" dirty="0">
+                <a:solidFill>
+                  <a:schemeClr val="bg1"/>
+                </a:solidFill>
+              </a:rPr>
+              <a:t>процент</a:t>
+            </a:r>
+            <a:r>
+              <a:rPr lang="ru-RU" dirty="0"/>
+              <a:t> от </a:t>
+            </a:r>
+            <a:r>
+              <a:rPr lang="ru-RU" b="1" dirty="0">
+                <a:solidFill>
+                  <a:schemeClr val="bg1"/>
+                </a:solidFill>
+              </a:rPr>
+              <a:t>общата</a:t>
+            </a:r>
+            <a:r>
+              <a:rPr lang="ru-RU" dirty="0"/>
+              <a:t> </a:t>
+            </a:r>
+            <a:r>
+              <a:rPr lang="ru-RU" b="1" dirty="0">
+                <a:solidFill>
+                  <a:schemeClr val="bg1"/>
+                </a:solidFill>
+              </a:rPr>
+              <a:t>цена</a:t>
+            </a:r>
+          </a:p>
+          <a:p>
+            <a:pPr lvl="1"/>
+            <a:r>
+              <a:rPr lang="ru-RU" dirty="0"/>
+              <a:t>Общата цена е също </a:t>
+            </a:r>
+            <a:r>
+              <a:rPr lang="ru-RU" b="1" dirty="0">
+                <a:solidFill>
+                  <a:schemeClr val="bg1"/>
+                </a:solidFill>
+              </a:rPr>
+              <a:t>изчислима</a:t>
+            </a:r>
+            <a:r>
+              <a:rPr lang="ru-RU" dirty="0"/>
+              <a:t> </a:t>
+            </a:r>
+            <a:r>
+              <a:rPr lang="ru-RU" b="1" dirty="0">
+                <a:solidFill>
+                  <a:schemeClr val="bg1"/>
+                </a:solidFill>
+              </a:rPr>
+              <a:t>колона</a:t>
+            </a:r>
+            <a:r>
+              <a:rPr lang="ru-RU" dirty="0"/>
+              <a:t>, която зависи от </a:t>
+            </a:r>
+            <a:r>
+              <a:rPr lang="ru-RU" b="1" dirty="0">
+                <a:solidFill>
+                  <a:schemeClr val="bg1"/>
+                </a:solidFill>
+              </a:rPr>
+              <a:t>количество</a:t>
+            </a:r>
+            <a:r>
+              <a:rPr lang="ru-RU" dirty="0"/>
+              <a:t> и </a:t>
+            </a:r>
+            <a:r>
+              <a:rPr lang="ru-RU" b="1" dirty="0">
+                <a:solidFill>
+                  <a:schemeClr val="bg1"/>
+                </a:solidFill>
+              </a:rPr>
+              <a:t>единична</a:t>
+            </a:r>
+            <a:r>
+              <a:rPr lang="ru-RU" dirty="0"/>
+              <a:t> </a:t>
+            </a:r>
+            <a:r>
+              <a:rPr lang="ru-RU" b="1" dirty="0">
+                <a:solidFill>
+                  <a:schemeClr val="bg1"/>
+                </a:solidFill>
+              </a:rPr>
+              <a:t>цена</a:t>
+            </a:r>
+          </a:p>
+          <a:p>
+            <a:pPr lvl="1"/>
+            <a:r>
+              <a:rPr lang="ru-RU" dirty="0"/>
+              <a:t>Данъкът върху продажбите може да се разглежда като </a:t>
+            </a:r>
+            <a:r>
+              <a:rPr lang="ru-RU" b="1" dirty="0">
+                <a:solidFill>
+                  <a:schemeClr val="bg1"/>
+                </a:solidFill>
+              </a:rPr>
+              <a:t>транзитивно</a:t>
+            </a:r>
+            <a:r>
+              <a:rPr lang="ru-RU" dirty="0"/>
+              <a:t> </a:t>
+            </a:r>
+            <a:r>
+              <a:rPr lang="ru-RU" b="1" dirty="0">
+                <a:solidFill>
+                  <a:schemeClr val="bg1"/>
+                </a:solidFill>
+              </a:rPr>
+              <a:t>изчислимо</a:t>
+            </a:r>
+            <a:r>
+              <a:rPr lang="ru-RU" dirty="0"/>
+              <a:t> </a:t>
+            </a:r>
+            <a:r>
+              <a:rPr lang="ru-RU" b="1" dirty="0">
+                <a:solidFill>
+                  <a:schemeClr val="bg1"/>
+                </a:solidFill>
+              </a:rPr>
+              <a:t>поле</a:t>
+            </a:r>
+          </a:p>
+          <a:p>
+            <a:pPr lvl="2"/>
+            <a:r>
+              <a:rPr lang="ru-RU" dirty="0"/>
+              <a:t>Неговата стойност </a:t>
+            </a:r>
+            <a:r>
+              <a:rPr lang="ru-RU" b="1" dirty="0">
+                <a:solidFill>
+                  <a:schemeClr val="bg1"/>
+                </a:solidFill>
+              </a:rPr>
+              <a:t>индиректно</a:t>
+            </a:r>
+            <a:r>
+              <a:rPr lang="ru-RU" dirty="0"/>
+              <a:t> зависи от </a:t>
+            </a:r>
+            <a:r>
+              <a:rPr lang="ru-RU" b="1" dirty="0">
+                <a:solidFill>
+                  <a:schemeClr val="bg1"/>
+                </a:solidFill>
+              </a:rPr>
+              <a:t>количеството</a:t>
+            </a:r>
+            <a:r>
+              <a:rPr lang="ru-RU" dirty="0"/>
+              <a:t> и </a:t>
+            </a:r>
+            <a:r>
+              <a:rPr lang="ru-RU" b="1" dirty="0">
+                <a:solidFill>
+                  <a:schemeClr val="bg1"/>
+                </a:solidFill>
+              </a:rPr>
+              <a:t>единичната цена</a:t>
+            </a:r>
+            <a:r>
+              <a:rPr lang="ru-RU" dirty="0">
+                <a:solidFill>
+                  <a:schemeClr val="bg1"/>
+                </a:solidFill>
+              </a:rPr>
+              <a:t> </a:t>
+            </a:r>
+            <a:r>
+              <a:rPr lang="ru-RU" dirty="0"/>
+              <a:t>чрез </a:t>
+            </a:r>
+            <a:r>
+              <a:rPr lang="ru-RU" b="1" dirty="0">
+                <a:solidFill>
+                  <a:schemeClr val="bg1"/>
+                </a:solidFill>
+              </a:rPr>
+              <a:t>общата</a:t>
+            </a:r>
+            <a:r>
+              <a:rPr lang="ru-RU" dirty="0"/>
+              <a:t> </a:t>
+            </a:r>
+            <a:r>
+              <a:rPr lang="ru-RU" b="1" dirty="0">
+                <a:solidFill>
+                  <a:schemeClr val="bg1"/>
+                </a:solidFill>
+              </a:rPr>
+              <a:t>цена</a:t>
+            </a:r>
+            <a:endParaRPr lang="en-US" dirty="0"/>
+          </a:p>
+        </p:txBody>
+      </p:sp>
+      <p:sp>
+        <p:nvSpPr>
+          <p:cNvPr id="4" name="Title 3">
+            <a:extLst>
+              <a:ext uri="{FF2B5EF4-FFF2-40B4-BE49-F238E27FC236}">
+                <a16:creationId xmlns:a16="http://schemas.microsoft.com/office/drawing/2014/main" id="{19DE214D-8666-C48A-9C8E-79B881420751}"/>
+              </a:ext>
+            </a:extLst>
+          </p:cNvPr>
+          <p:cNvSpPr>
+            <a:spLocks noGrp="1"/>
+          </p:cNvSpPr>
+          <p:nvPr>
+            <p:ph type="title"/>
+          </p:nvPr>
+        </p:nvSpPr>
+        <p:spPr/>
+        <p:txBody>
+          <a:bodyPr/>
+          <a:lstStyle/>
+          <a:p>
+            <a:r>
+              <a:rPr lang="ru-RU" dirty="0"/>
+              <a:t>Транзитивно изчислимо поле</a:t>
+            </a:r>
+            <a:endParaRPr lang="en-US" dirty="0"/>
+          </a:p>
+        </p:txBody>
+      </p:sp>
+    </p:spTree>
+    <p:extLst>
+      <p:ext uri="{BB962C8B-B14F-4D97-AF65-F5344CB8AC3E}">
+        <p14:creationId xmlns:p14="http://schemas.microsoft.com/office/powerpoint/2010/main" val="2743812822"/>
+      </p:ext>
+    </p:extLst>
+  </p:cSld>
+  <p:clrMapOvr>
+    <a:masterClrMapping/>
+  </p:clrMapOvr>
+  <mc:AlternateContent xmlns:mc="http://schemas.openxmlformats.org/markup-compatibility/2006" xmlns:p14="http://schemas.microsoft.com/office/powerpoint/2010/main">
+    <mc:Choice Requires="p14">
+      <p:transition spd="slow" p14:dur="2000" advClick="0" advTm="5000"/>
+    </mc:Choice>
+    <mc:Fallback xmlns="">
+      <p:transition spd="slow" advClick="0" advTm="5000"/>
+    </mc:Fallback>
+  </mc:AlternateContent>
+  <p:timing>
+    <p:tnLst>
+      <p:par>
+        <p:cTn id="1" dur="indefinite" restart="never" nodeType="tmRoot">
+          <p:childTnLst>
+            <p:seq concurrent="1" nextAc="seek">
+              <p:cTn id="2" dur="indefinite" nodeType="mainSeq">
+                <p:childTnLst>
+                  <p:par>
+                    <p:cTn id="3" fill="hold">
+                      <p:stCondLst>
+                        <p:cond delay="indefinite"/>
+                      </p:stCondLst>
+                      <p:childTnLst>
+                        <p:par>
+                          <p:cTn id="4" fill="hold">
+                            <p:stCondLst>
+                              <p:cond delay="0"/>
+                            </p:stCondLst>
+                            <p:childTnLst>
+                              <p:par>
+                                <p:cTn id="5" presetID="1" presetClass="entr" presetSubtype="0" fill="hold" nodeType="clickEffect">
+                                  <p:stCondLst>
+                                    <p:cond delay="0"/>
+                                  </p:stCondLst>
+                                  <p:childTnLst>
+                                    <p:set>
+                                      <p:cBhvr>
+                                        <p:cTn id="6" dur="1" fill="hold">
+                                          <p:stCondLst>
+                                            <p:cond delay="0"/>
+                                          </p:stCondLst>
+                                        </p:cTn>
+                                        <p:tgtEl>
+                                          <p:spTgt spid="3">
+                                            <p:txEl>
+                                              <p:pRg st="2" end="2"/>
+                                            </p:txEl>
+                                          </p:spTgt>
+                                        </p:tgtEl>
+                                        <p:attrNameLst>
+                                          <p:attrName>style.visibility</p:attrName>
+                                        </p:attrNameLst>
+                                      </p:cBhvr>
+                                      <p:to>
+                                        <p:strVal val="visible"/>
+                                      </p:to>
+                                    </p:set>
+                                  </p:childTnLst>
+                                </p:cTn>
+                              </p:par>
+                            </p:childTnLst>
+                          </p:cTn>
+                        </p:par>
+                      </p:childTnLst>
+                    </p:cTn>
+                  </p:par>
+                  <p:par>
+                    <p:cTn id="7" fill="hold">
+                      <p:stCondLst>
+                        <p:cond delay="indefinite"/>
+                      </p:stCondLst>
+                      <p:childTnLst>
+                        <p:par>
+                          <p:cTn id="8" fill="hold">
+                            <p:stCondLst>
+                              <p:cond delay="0"/>
+                            </p:stCondLst>
+                            <p:childTnLst>
+                              <p:par>
+                                <p:cTn id="9" presetID="1" presetClass="entr" presetSubtype="0" fill="hold" nodeType="clickEffect">
+                                  <p:stCondLst>
+                                    <p:cond delay="0"/>
+                                  </p:stCondLst>
+                                  <p:childTnLst>
+                                    <p:set>
+                                      <p:cBhvr>
+                                        <p:cTn id="10" dur="1" fill="hold">
+                                          <p:stCondLst>
+                                            <p:cond delay="0"/>
+                                          </p:stCondLst>
+                                        </p:cTn>
+                                        <p:tgtEl>
+                                          <p:spTgt spid="3">
+                                            <p:txEl>
+                                              <p:pRg st="3" end="3"/>
+                                            </p:txEl>
+                                          </p:spTgt>
+                                        </p:tgtEl>
+                                        <p:attrNameLst>
+                                          <p:attrName>style.visibility</p:attrName>
+                                        </p:attrNameLst>
+                                      </p:cBhvr>
+                                      <p:to>
+                                        <p:strVal val="visible"/>
+                                      </p:to>
+                                    </p:set>
+                                  </p:childTnLst>
+                                </p:cTn>
+                              </p:par>
+                            </p:childTnLst>
+                          </p:cTn>
+                        </p:par>
+                      </p:childTnLst>
+                    </p:cTn>
+                  </p:par>
+                  <p:par>
+                    <p:cTn id="11" fill="hold">
+                      <p:stCondLst>
+                        <p:cond delay="indefinite"/>
+                      </p:stCondLst>
+                      <p:childTnLst>
+                        <p:par>
+                          <p:cTn id="12" fill="hold">
+                            <p:stCondLst>
+                              <p:cond delay="0"/>
+                            </p:stCondLst>
+                            <p:childTnLst>
+                              <p:par>
+                                <p:cTn id="13" presetID="1" presetClass="entr" presetSubtype="0" fill="hold" nodeType="clickEffect">
+                                  <p:stCondLst>
+                                    <p:cond delay="0"/>
+                                  </p:stCondLst>
+                                  <p:childTnLst>
+                                    <p:set>
+                                      <p:cBhvr>
+                                        <p:cTn id="14" dur="1" fill="hold">
+                                          <p:stCondLst>
+                                            <p:cond delay="0"/>
+                                          </p:stCondLst>
+                                        </p:cTn>
+                                        <p:tgtEl>
+                                          <p:spTgt spid="3">
+                                            <p:txEl>
+                                              <p:pRg st="4" end="4"/>
+                                            </p:txEl>
+                                          </p:spTgt>
+                                        </p:tgtEl>
+                                        <p:attrNameLst>
+                                          <p:attrName>style.visibility</p:attrName>
+                                        </p:attrNameLst>
+                                      </p:cBhvr>
+                                      <p:to>
+                                        <p:strVal val="visible"/>
+                                      </p:to>
+                                    </p:set>
+                                  </p:childTnLst>
+                                </p:cTn>
+                              </p:par>
+                              <p:par>
+                                <p:cTn id="15" presetID="1" presetClass="entr" presetSubtype="0" fill="hold" nodeType="withEffect">
+                                  <p:stCondLst>
+                                    <p:cond delay="0"/>
+                                  </p:stCondLst>
+                                  <p:childTnLst>
+                                    <p:set>
+                                      <p:cBhvr>
+                                        <p:cTn id="16" dur="1" fill="hold">
+                                          <p:stCondLst>
+                                            <p:cond delay="0"/>
+                                          </p:stCondLst>
+                                        </p:cTn>
+                                        <p:tgtEl>
+                                          <p:spTgt spid="3">
+                                            <p:txEl>
+                                              <p:pRg st="5" end="5"/>
+                                            </p:txEl>
+                                          </p:spTgt>
+                                        </p:tgtEl>
+                                        <p:attrNameLst>
+                                          <p:attrName>style.visibility</p:attrName>
+                                        </p:attrNameLst>
+                                      </p:cBhvr>
+                                      <p:to>
+                                        <p:strVal val="visible"/>
+                                      </p:to>
+                                    </p:set>
+                                  </p:childTnLst>
+                                </p:cTn>
+                              </p:par>
+                            </p:childTnLst>
+                          </p:cTn>
+                        </p:par>
+                      </p:childTnLst>
+                    </p:cTn>
+                  </p:par>
+                </p:childTnLst>
+              </p:cTn>
+              <p:prevCondLst>
+                <p:cond evt="onPrev" delay="0">
+                  <p:tgtEl>
+                    <p:sldTgt/>
+                  </p:tgtEl>
+                </p:cond>
+              </p:prevCondLst>
+              <p:nextCondLst>
+                <p:cond evt="onNext" delay="0">
+                  <p:tgtEl>
+                    <p:sldTgt/>
+                  </p:tgtEl>
+                </p:cond>
+              </p:nextCondLst>
+            </p:seq>
+          </p:childTnLst>
+        </p:cTn>
+      </p:par>
+    </p:tnLst>
+  </p:timing>
+</p:sld>
+</file>
+
+<file path=ppt/slides/slide16.xml><?xml version="1.0" encoding="utf-8"?>
+<p:sld xmlns:a="http://schemas.openxmlformats.org/drawingml/2006/main" xmlns:r="http://schemas.openxmlformats.org/officeDocument/2006/relationships" xmlns:p="http://schemas.openxmlformats.org/presentationml/2006/main">
+  <p:cSld>
+    <p:spTree>
+      <p:nvGrpSpPr>
+        <p:cNvPr id="1" name=""/>
+        <p:cNvGrpSpPr/>
+        <p:nvPr/>
+      </p:nvGrpSpPr>
+      <p:grpSpPr>
+        <a:xfrm>
+          <a:off x="0" y="0"/>
+          <a:ext cx="0" cy="0"/>
+          <a:chOff x="0" y="0"/>
+          <a:chExt cx="0" cy="0"/>
+        </a:xfrm>
+      </p:grpSpPr>
       <p:pic>
         <p:nvPicPr>
           <p:cNvPr id="1026" name="Picture 2" descr="Sql File Format Symbol Svg Png Icon Free Download (#5361 ..."/>
@@ -10781,7 +11410,7 @@
 </p:sld>
 </file>
 
-<file path=ppt/slides/slide16.xml><?xml version="1.0" encoding="utf-8"?>
+<file path=ppt/slides/slide17.xml><?xml version="1.0" encoding="utf-8"?>
 <p:sld xmlns:a="http://schemas.openxmlformats.org/drawingml/2006/main" xmlns:r="http://schemas.openxmlformats.org/officeDocument/2006/relationships" xmlns:p="http://schemas.openxmlformats.org/presentationml/2006/main">
   <p:cSld>
     <p:spTree>
@@ -10928,7 +11557,7 @@
             <a:fld id="{2BF067CD-8E6B-4360-9AA8-C5DF2A48A6D1}" type="slidenum">
               <a:rPr lang="en-US" noProof="0" smtClean="0"/>
               <a:pPr/>
-              <a:t>16</a:t>
+              <a:t>17</a:t>
             </a:fld>
             <a:endParaRPr lang="en-US" noProof="0" dirty="0"/>
           </a:p>
@@ -11034,7 +11663,7 @@
 </p:sld>
 </file>
 
-<file path=ppt/slides/slide17.xml><?xml version="1.0" encoding="utf-8"?>
+<file path=ppt/slides/slide18.xml><?xml version="1.0" encoding="utf-8"?>
 <p:sld xmlns:a="http://schemas.openxmlformats.org/drawingml/2006/main" xmlns:r="http://schemas.openxmlformats.org/officeDocument/2006/relationships" xmlns:p="http://schemas.openxmlformats.org/presentationml/2006/main">
   <p:cSld>
     <p:spTree>
@@ -11272,7 +11901,7 @@
             <a:fld id="{2BF067CD-8E6B-4360-9AA8-C5DF2A48A6D1}" type="slidenum">
               <a:rPr lang="en-US" noProof="0" smtClean="0"/>
               <a:pPr/>
-              <a:t>17</a:t>
+              <a:t>18</a:t>
             </a:fld>
             <a:endParaRPr lang="en-US" noProof="0" dirty="0"/>
           </a:p>
@@ -11377,7 +12006,7 @@
 </p:sld>
 </file>
 
-<file path=ppt/slides/slide18.xml><?xml version="1.0" encoding="utf-8"?>
+<file path=ppt/slides/slide19.xml><?xml version="1.0" encoding="utf-8"?>
 <p:sld xmlns:a="http://schemas.openxmlformats.org/drawingml/2006/main" xmlns:r="http://schemas.openxmlformats.org/officeDocument/2006/relationships" xmlns:p="http://schemas.openxmlformats.org/presentationml/2006/main">
   <p:cSld>
     <p:spTree>
@@ -11529,7 +12158,7 @@
             <a:fld id="{2BF067CD-8E6B-4360-9AA8-C5DF2A48A6D1}" type="slidenum">
               <a:rPr lang="en-US" noProof="0" smtClean="0"/>
               <a:pPr/>
-              <a:t>18</a:t>
+              <a:t>19</a:t>
             </a:fld>
             <a:endParaRPr lang="en-US" noProof="0" dirty="0"/>
           </a:p>
@@ -11553,426 +12182,6 @@
       <p:transition spd="slow" advClick="0" advTm="5000"/>
     </mc:Fallback>
   </mc:AlternateContent>
-</p:sld>
-</file>
-
-<file path=ppt/slides/slide19.xml><?xml version="1.0" encoding="utf-8"?>
-<p:sld xmlns:a="http://schemas.openxmlformats.org/drawingml/2006/main" xmlns:r="http://schemas.openxmlformats.org/officeDocument/2006/relationships" xmlns:p="http://schemas.openxmlformats.org/presentationml/2006/main">
-  <p:cSld>
-    <p:spTree>
-      <p:nvGrpSpPr>
-        <p:cNvPr id="1" name=""/>
-        <p:cNvGrpSpPr/>
-        <p:nvPr/>
-      </p:nvGrpSpPr>
-      <p:grpSpPr>
-        <a:xfrm>
-          <a:off x="0" y="0"/>
-          <a:ext cx="0" cy="0"/>
-          <a:chOff x="0" y="0"/>
-          <a:chExt cx="0" cy="0"/>
-        </a:xfrm>
-      </p:grpSpPr>
-      <p:sp>
-        <p:nvSpPr>
-          <p:cNvPr id="3" name="Text Placeholder 2"/>
-          <p:cNvSpPr>
-            <a:spLocks noGrp="1"/>
-          </p:cNvSpPr>
-          <p:nvPr>
-            <p:ph type="body" sz="quarter" idx="10"/>
-          </p:nvPr>
-        </p:nvSpPr>
-        <p:spPr/>
-        <p:txBody>
-          <a:bodyPr>
-            <a:normAutofit/>
-          </a:bodyPr>
-          <a:lstStyle/>
-          <a:p>
-            <a:r>
-              <a:rPr lang="ru-RU" sz="3600" dirty="0"/>
-              <a:t>За да съединим</a:t>
-            </a:r>
-            <a:r>
-              <a:rPr lang="en-US" sz="3600" b="1" dirty="0">
-                <a:solidFill>
-                  <a:schemeClr val="bg1"/>
-                </a:solidFill>
-              </a:rPr>
-              <a:t> FirstName</a:t>
-            </a:r>
-            <a:r>
-              <a:rPr lang="ru-RU" sz="3600" dirty="0"/>
-              <a:t> и </a:t>
-            </a:r>
-            <a:r>
-              <a:rPr lang="en-US" sz="3600" b="1" dirty="0">
-                <a:solidFill>
-                  <a:schemeClr val="bg1"/>
-                </a:solidFill>
-              </a:rPr>
-              <a:t>LastName </a:t>
-            </a:r>
-            <a:r>
-              <a:rPr lang="ru-RU" sz="3600" dirty="0"/>
-              <a:t>, можем да използваме функцията </a:t>
-            </a:r>
-            <a:r>
-              <a:rPr lang="en-US" sz="3600" b="1" dirty="0">
-                <a:solidFill>
-                  <a:schemeClr val="bg1"/>
-                </a:solidFill>
-              </a:rPr>
-              <a:t>CONCAT</a:t>
-            </a:r>
-            <a:endParaRPr lang="en-US" sz="3600" dirty="0"/>
-          </a:p>
-        </p:txBody>
-      </p:sp>
-      <p:sp>
-        <p:nvSpPr>
-          <p:cNvPr id="4" name="Title 3"/>
-          <p:cNvSpPr>
-            <a:spLocks noGrp="1"/>
-          </p:cNvSpPr>
-          <p:nvPr>
-            <p:ph type="title"/>
-          </p:nvPr>
-        </p:nvSpPr>
-        <p:spPr>
-          <a:xfrm>
-            <a:off x="190406" y="100750"/>
-            <a:ext cx="10450594" cy="882654"/>
-          </a:xfrm>
-        </p:spPr>
-        <p:txBody>
-          <a:bodyPr>
-            <a:noAutofit/>
-          </a:bodyPr>
-          <a:lstStyle/>
-          <a:p>
-            <a:r>
-              <a:rPr lang="bg-BG" sz="4000" dirty="0"/>
-              <a:t>Решение – Съединение на имена на колони  </a:t>
-            </a:r>
-            <a:endParaRPr lang="en-US" sz="4000" dirty="0"/>
-          </a:p>
-        </p:txBody>
-      </p:sp>
-      <p:sp>
-        <p:nvSpPr>
-          <p:cNvPr id="5" name="Rectangle 3"/>
-          <p:cNvSpPr>
-            <a:spLocks noChangeArrowheads="1"/>
-          </p:cNvSpPr>
-          <p:nvPr/>
-        </p:nvSpPr>
-        <p:spPr bwMode="auto">
-          <a:xfrm>
-            <a:off x="1281000" y="3519000"/>
-            <a:ext cx="10012500" cy="954107"/>
-          </a:xfrm>
-          <a:prstGeom prst="rect">
-            <a:avLst/>
-          </a:prstGeom>
-          <a:solidFill>
-            <a:schemeClr val="accent5">
-              <a:lumMod val="40000"/>
-              <a:lumOff val="60000"/>
-              <a:alpha val="15000"/>
-            </a:schemeClr>
-          </a:solidFill>
-          <a:ln w="12700">
-            <a:solidFill>
-              <a:schemeClr val="accent5">
-                <a:lumMod val="60000"/>
-                <a:lumOff val="40000"/>
-              </a:schemeClr>
-            </a:solidFill>
-          </a:ln>
-        </p:spPr>
-        <p:txBody>
-          <a:bodyPr wrap="square">
-            <a:spAutoFit/>
-          </a:bodyPr>
-          <a:lstStyle/>
-          <a:p>
-            <a:pPr eaLnBrk="0" hangingPunct="0">
-              <a:buClr>
-                <a:schemeClr val="accent5">
-                  <a:lumMod val="40000"/>
-                  <a:lumOff val="60000"/>
-                </a:schemeClr>
-              </a:buClr>
-              <a:buSzPct val="70000"/>
-            </a:pPr>
-            <a:r>
-              <a:rPr lang="en-US" sz="2800" b="1" noProof="1">
-                <a:solidFill>
-                  <a:schemeClr val="bg1"/>
-                </a:solidFill>
-                <a:latin typeface="Consolas" pitchFamily="49" charset="0"/>
-                <a:cs typeface="Consolas" pitchFamily="49" charset="0"/>
-              </a:rPr>
-              <a:t>SELECT CONCAT</a:t>
-            </a:r>
-            <a:r>
-              <a:rPr lang="en-US" sz="2800" b="1" noProof="1">
-                <a:latin typeface="Consolas" pitchFamily="49" charset="0"/>
-                <a:cs typeface="Consolas" pitchFamily="49" charset="0"/>
-              </a:rPr>
-              <a:t>(FirstName</a:t>
-            </a:r>
-            <a:r>
-              <a:rPr lang="en-US" sz="2800" b="1" dirty="0"/>
-              <a:t>,</a:t>
-            </a:r>
-            <a:r>
-              <a:rPr lang="en-US" sz="2800" b="1" noProof="1">
-                <a:solidFill>
-                  <a:schemeClr val="bg1"/>
-                </a:solidFill>
-                <a:latin typeface="Consolas" pitchFamily="49" charset="0"/>
-                <a:cs typeface="Consolas" pitchFamily="49" charset="0"/>
-              </a:rPr>
-              <a:t> </a:t>
-            </a:r>
-            <a:r>
-              <a:rPr lang="en-US" sz="2800" b="1" dirty="0"/>
-              <a:t>'</a:t>
-            </a:r>
-            <a:r>
-              <a:rPr lang="en-US" sz="2800" b="1" noProof="1">
-                <a:solidFill>
-                  <a:schemeClr val="bg1"/>
-                </a:solidFill>
-                <a:latin typeface="Consolas" pitchFamily="49" charset="0"/>
-                <a:cs typeface="Consolas" pitchFamily="49" charset="0"/>
-              </a:rPr>
-              <a:t> </a:t>
-            </a:r>
-            <a:r>
-              <a:rPr lang="en-US" sz="2800" b="1" dirty="0"/>
-              <a:t>',</a:t>
-            </a:r>
-            <a:r>
-              <a:rPr lang="en-US" sz="2800" b="1" noProof="1">
-                <a:solidFill>
-                  <a:schemeClr val="bg1"/>
-                </a:solidFill>
-                <a:latin typeface="Consolas" pitchFamily="49" charset="0"/>
-                <a:cs typeface="Consolas" pitchFamily="49" charset="0"/>
-              </a:rPr>
-              <a:t> </a:t>
-            </a:r>
-            <a:r>
-              <a:rPr lang="en-US" sz="2800" b="1" noProof="1">
-                <a:latin typeface="Consolas" pitchFamily="49" charset="0"/>
-                <a:cs typeface="Consolas" pitchFamily="49" charset="0"/>
-              </a:rPr>
-              <a:t>LastName)</a:t>
-            </a:r>
-            <a:r>
-              <a:rPr lang="en-US" sz="2800" b="1" noProof="1">
-                <a:solidFill>
-                  <a:schemeClr val="bg1"/>
-                </a:solidFill>
-                <a:latin typeface="Consolas" pitchFamily="49" charset="0"/>
-                <a:cs typeface="Consolas" pitchFamily="49" charset="0"/>
-              </a:rPr>
-              <a:t> </a:t>
-            </a:r>
-            <a:r>
-              <a:rPr lang="en-US" sz="2800" b="1" noProof="1">
-                <a:latin typeface="Consolas" pitchFamily="49" charset="0"/>
-                <a:cs typeface="Consolas" pitchFamily="49" charset="0"/>
-              </a:rPr>
-              <a:t>AS </a:t>
-            </a:r>
-            <a:r>
-              <a:rPr lang="en-US" sz="2800" b="1" noProof="1">
-                <a:solidFill>
-                  <a:schemeClr val="bg1"/>
-                </a:solidFill>
-                <a:latin typeface="Consolas" pitchFamily="49" charset="0"/>
-                <a:cs typeface="Consolas" pitchFamily="49" charset="0"/>
-              </a:rPr>
-              <a:t>FullName</a:t>
-            </a:r>
-            <a:endParaRPr lang="en-US" sz="2800" b="1" noProof="1">
-              <a:latin typeface="Consolas" pitchFamily="49" charset="0"/>
-              <a:cs typeface="Consolas" pitchFamily="49" charset="0"/>
-            </a:endParaRPr>
-          </a:p>
-          <a:p>
-            <a:pPr eaLnBrk="0" hangingPunct="0">
-              <a:buClr>
-                <a:schemeClr val="accent5">
-                  <a:lumMod val="40000"/>
-                  <a:lumOff val="60000"/>
-                </a:schemeClr>
-              </a:buClr>
-              <a:buSzPct val="70000"/>
-            </a:pPr>
-            <a:r>
-              <a:rPr lang="en-US" sz="2800" b="1" noProof="1">
-                <a:solidFill>
-                  <a:schemeClr val="bg1"/>
-                </a:solidFill>
-                <a:latin typeface="Consolas" pitchFamily="49" charset="0"/>
-                <a:cs typeface="Consolas" pitchFamily="49" charset="0"/>
-              </a:rPr>
-              <a:t>FROM</a:t>
-            </a:r>
-            <a:r>
-              <a:rPr lang="en-US" sz="2800" b="1" noProof="1">
-                <a:latin typeface="Consolas" pitchFamily="49" charset="0"/>
-                <a:cs typeface="Consolas" pitchFamily="49" charset="0"/>
-              </a:rPr>
-              <a:t> Employees</a:t>
-            </a:r>
-          </a:p>
-        </p:txBody>
-      </p:sp>
-      <p:sp>
-        <p:nvSpPr>
-          <p:cNvPr id="6" name="Slide Number">
-            <a:extLst>
-              <a:ext uri="{FF2B5EF4-FFF2-40B4-BE49-F238E27FC236}">
-                <a16:creationId xmlns:a16="http://schemas.microsoft.com/office/drawing/2014/main" id="{752606FA-BBC1-67D2-D42D-D814C147F140}"/>
-              </a:ext>
-            </a:extLst>
-          </p:cNvPr>
-          <p:cNvSpPr>
-            <a:spLocks noGrp="1"/>
-          </p:cNvSpPr>
-          <p:nvPr>
-            <p:ph type="sldNum" sz="quarter" idx="5"/>
-          </p:nvPr>
-        </p:nvSpPr>
-        <p:spPr>
-          <a:xfrm>
-            <a:off x="11753030" y="6507000"/>
-            <a:ext cx="367414" cy="297000"/>
-          </a:xfrm>
-          <a:prstGeom prst="rect">
-            <a:avLst/>
-          </a:prstGeom>
-        </p:spPr>
-        <p:txBody>
-          <a:bodyPr vert="horz" lIns="91440" tIns="45720" rIns="91440" bIns="45720" rtlCol="0" anchor="b"/>
-          <a:lstStyle>
-            <a:lvl1pPr algn="r">
-              <a:defRPr sz="1000"/>
-            </a:lvl1pPr>
-          </a:lstStyle>
-          <a:p>
-            <a:fld id="{2BF067CD-8E6B-4360-9AA8-C5DF2A48A6D1}" type="slidenum">
-              <a:rPr lang="en-US" noProof="0" smtClean="0"/>
-              <a:pPr/>
-              <a:t>19</a:t>
-            </a:fld>
-            <a:endParaRPr lang="en-US" noProof="0" dirty="0"/>
-          </a:p>
-        </p:txBody>
-      </p:sp>
-    </p:spTree>
-    <p:extLst>
-      <p:ext uri="{BB962C8B-B14F-4D97-AF65-F5344CB8AC3E}">
-        <p14:creationId xmlns:p14="http://schemas.microsoft.com/office/powerpoint/2010/main" val="1518246643"/>
-      </p:ext>
-    </p:extLst>
-  </p:cSld>
-  <p:clrMapOvr>
-    <a:masterClrMapping/>
-  </p:clrMapOvr>
-  <mc:AlternateContent xmlns:mc="http://schemas.openxmlformats.org/markup-compatibility/2006" xmlns:p14="http://schemas.microsoft.com/office/powerpoint/2010/main">
-    <mc:Choice Requires="p14">
-      <p:transition spd="slow" p14:dur="2000" advClick="0" advTm="5000"/>
-    </mc:Choice>
-    <mc:Fallback xmlns="">
-      <p:transition spd="slow" advClick="0" advTm="5000"/>
-    </mc:Fallback>
-  </mc:AlternateContent>
-  <p:timing>
-    <p:tnLst>
-      <p:par>
-        <p:cTn id="1" dur="indefinite" restart="never" nodeType="tmRoot">
-          <p:childTnLst>
-            <p:seq concurrent="1" nextAc="seek">
-              <p:cTn id="2" dur="indefinite" nodeType="mainSeq">
-                <p:childTnLst>
-                  <p:par>
-                    <p:cTn id="3" fill="hold">
-                      <p:stCondLst>
-                        <p:cond delay="indefinite"/>
-                      </p:stCondLst>
-                      <p:childTnLst>
-                        <p:par>
-                          <p:cTn id="4" fill="hold">
-                            <p:stCondLst>
-                              <p:cond delay="0"/>
-                            </p:stCondLst>
-                            <p:childTnLst>
-                              <p:par>
-                                <p:cTn id="5" presetID="1" presetClass="entr" presetSubtype="0" fill="hold" grpId="0" nodeType="clickEffect">
-                                  <p:stCondLst>
-                                    <p:cond delay="0"/>
-                                  </p:stCondLst>
-                                  <p:childTnLst>
-                                    <p:set>
-                                      <p:cBhvr>
-                                        <p:cTn id="6" dur="1" fill="hold">
-                                          <p:stCondLst>
-                                            <p:cond delay="0"/>
-                                          </p:stCondLst>
-                                        </p:cTn>
-                                        <p:tgtEl>
-                                          <p:spTgt spid="5"/>
-                                        </p:tgtEl>
-                                        <p:attrNameLst>
-                                          <p:attrName>style.visibility</p:attrName>
-                                        </p:attrNameLst>
-                                      </p:cBhvr>
-                                      <p:to>
-                                        <p:strVal val="visible"/>
-                                      </p:to>
-                                    </p:set>
-                                  </p:childTnLst>
-                                </p:cTn>
-                              </p:par>
-                            </p:childTnLst>
-                          </p:cTn>
-                        </p:par>
-                      </p:childTnLst>
-                    </p:cTn>
-                  </p:par>
-                </p:childTnLst>
-              </p:cTn>
-              <p:prevCondLst>
-                <p:cond evt="onPrev" delay="0">
-                  <p:tgtEl>
-                    <p:sldTgt/>
-                  </p:tgtEl>
-                </p:cond>
-              </p:prevCondLst>
-              <p:nextCondLst>
-                <p:cond evt="onNext" delay="0">
-                  <p:tgtEl>
-                    <p:sldTgt/>
-                  </p:tgtEl>
-                </p:cond>
-              </p:nextCondLst>
-            </p:seq>
-          </p:childTnLst>
-        </p:cTn>
-      </p:par>
-    </p:tnLst>
-    <p:bldLst>
-      <p:bldP spid="5" grpId="0" animBg="1"/>
-    </p:bldLst>
-  </p:timing>
 </p:sld>
 </file>
 
@@ -12365,6 +12574,426 @@
       </p:grpSpPr>
       <p:sp>
         <p:nvSpPr>
+          <p:cNvPr id="3" name="Text Placeholder 2"/>
+          <p:cNvSpPr>
+            <a:spLocks noGrp="1"/>
+          </p:cNvSpPr>
+          <p:nvPr>
+            <p:ph type="body" sz="quarter" idx="10"/>
+          </p:nvPr>
+        </p:nvSpPr>
+        <p:spPr/>
+        <p:txBody>
+          <a:bodyPr>
+            <a:normAutofit/>
+          </a:bodyPr>
+          <a:lstStyle/>
+          <a:p>
+            <a:r>
+              <a:rPr lang="ru-RU" sz="3600" dirty="0"/>
+              <a:t>За да съединим</a:t>
+            </a:r>
+            <a:r>
+              <a:rPr lang="en-US" sz="3600" b="1" dirty="0">
+                <a:solidFill>
+                  <a:schemeClr val="bg1"/>
+                </a:solidFill>
+              </a:rPr>
+              <a:t> FirstName</a:t>
+            </a:r>
+            <a:r>
+              <a:rPr lang="ru-RU" sz="3600" dirty="0"/>
+              <a:t> и </a:t>
+            </a:r>
+            <a:r>
+              <a:rPr lang="en-US" sz="3600" b="1" dirty="0">
+                <a:solidFill>
+                  <a:schemeClr val="bg1"/>
+                </a:solidFill>
+              </a:rPr>
+              <a:t>LastName </a:t>
+            </a:r>
+            <a:r>
+              <a:rPr lang="ru-RU" sz="3600" dirty="0"/>
+              <a:t>, можем да използваме функцията </a:t>
+            </a:r>
+            <a:r>
+              <a:rPr lang="en-US" sz="3600" b="1" dirty="0">
+                <a:solidFill>
+                  <a:schemeClr val="bg1"/>
+                </a:solidFill>
+              </a:rPr>
+              <a:t>CONCAT</a:t>
+            </a:r>
+            <a:endParaRPr lang="en-US" sz="3600" dirty="0"/>
+          </a:p>
+        </p:txBody>
+      </p:sp>
+      <p:sp>
+        <p:nvSpPr>
+          <p:cNvPr id="4" name="Title 3"/>
+          <p:cNvSpPr>
+            <a:spLocks noGrp="1"/>
+          </p:cNvSpPr>
+          <p:nvPr>
+            <p:ph type="title"/>
+          </p:nvPr>
+        </p:nvSpPr>
+        <p:spPr>
+          <a:xfrm>
+            <a:off x="190406" y="100750"/>
+            <a:ext cx="10450594" cy="882654"/>
+          </a:xfrm>
+        </p:spPr>
+        <p:txBody>
+          <a:bodyPr>
+            <a:noAutofit/>
+          </a:bodyPr>
+          <a:lstStyle/>
+          <a:p>
+            <a:r>
+              <a:rPr lang="bg-BG" sz="4000" dirty="0"/>
+              <a:t>Решение – Съединение на имена на колони  </a:t>
+            </a:r>
+            <a:endParaRPr lang="en-US" sz="4000" dirty="0"/>
+          </a:p>
+        </p:txBody>
+      </p:sp>
+      <p:sp>
+        <p:nvSpPr>
+          <p:cNvPr id="5" name="Rectangle 3"/>
+          <p:cNvSpPr>
+            <a:spLocks noChangeArrowheads="1"/>
+          </p:cNvSpPr>
+          <p:nvPr/>
+        </p:nvSpPr>
+        <p:spPr bwMode="auto">
+          <a:xfrm>
+            <a:off x="1281000" y="3519000"/>
+            <a:ext cx="10012500" cy="954107"/>
+          </a:xfrm>
+          <a:prstGeom prst="rect">
+            <a:avLst/>
+          </a:prstGeom>
+          <a:solidFill>
+            <a:schemeClr val="accent5">
+              <a:lumMod val="40000"/>
+              <a:lumOff val="60000"/>
+              <a:alpha val="15000"/>
+            </a:schemeClr>
+          </a:solidFill>
+          <a:ln w="12700">
+            <a:solidFill>
+              <a:schemeClr val="accent5">
+                <a:lumMod val="60000"/>
+                <a:lumOff val="40000"/>
+              </a:schemeClr>
+            </a:solidFill>
+          </a:ln>
+        </p:spPr>
+        <p:txBody>
+          <a:bodyPr wrap="square">
+            <a:spAutoFit/>
+          </a:bodyPr>
+          <a:lstStyle/>
+          <a:p>
+            <a:pPr eaLnBrk="0" hangingPunct="0">
+              <a:buClr>
+                <a:schemeClr val="accent5">
+                  <a:lumMod val="40000"/>
+                  <a:lumOff val="60000"/>
+                </a:schemeClr>
+              </a:buClr>
+              <a:buSzPct val="70000"/>
+            </a:pPr>
+            <a:r>
+              <a:rPr lang="en-US" sz="2800" b="1" noProof="1">
+                <a:solidFill>
+                  <a:schemeClr val="bg1"/>
+                </a:solidFill>
+                <a:latin typeface="Consolas" pitchFamily="49" charset="0"/>
+                <a:cs typeface="Consolas" pitchFamily="49" charset="0"/>
+              </a:rPr>
+              <a:t>SELECT CONCAT</a:t>
+            </a:r>
+            <a:r>
+              <a:rPr lang="en-US" sz="2800" b="1" noProof="1">
+                <a:latin typeface="Consolas" pitchFamily="49" charset="0"/>
+                <a:cs typeface="Consolas" pitchFamily="49" charset="0"/>
+              </a:rPr>
+              <a:t>(FirstName</a:t>
+            </a:r>
+            <a:r>
+              <a:rPr lang="en-US" sz="2800" b="1" dirty="0"/>
+              <a:t>,</a:t>
+            </a:r>
+            <a:r>
+              <a:rPr lang="en-US" sz="2800" b="1" noProof="1">
+                <a:solidFill>
+                  <a:schemeClr val="bg1"/>
+                </a:solidFill>
+                <a:latin typeface="Consolas" pitchFamily="49" charset="0"/>
+                <a:cs typeface="Consolas" pitchFamily="49" charset="0"/>
+              </a:rPr>
+              <a:t> </a:t>
+            </a:r>
+            <a:r>
+              <a:rPr lang="en-US" sz="2800" b="1" dirty="0"/>
+              <a:t>'</a:t>
+            </a:r>
+            <a:r>
+              <a:rPr lang="en-US" sz="2800" b="1" noProof="1">
+                <a:solidFill>
+                  <a:schemeClr val="bg1"/>
+                </a:solidFill>
+                <a:latin typeface="Consolas" pitchFamily="49" charset="0"/>
+                <a:cs typeface="Consolas" pitchFamily="49" charset="0"/>
+              </a:rPr>
+              <a:t> </a:t>
+            </a:r>
+            <a:r>
+              <a:rPr lang="en-US" sz="2800" b="1" dirty="0"/>
+              <a:t>',</a:t>
+            </a:r>
+            <a:r>
+              <a:rPr lang="en-US" sz="2800" b="1" noProof="1">
+                <a:solidFill>
+                  <a:schemeClr val="bg1"/>
+                </a:solidFill>
+                <a:latin typeface="Consolas" pitchFamily="49" charset="0"/>
+                <a:cs typeface="Consolas" pitchFamily="49" charset="0"/>
+              </a:rPr>
+              <a:t> </a:t>
+            </a:r>
+            <a:r>
+              <a:rPr lang="en-US" sz="2800" b="1" noProof="1">
+                <a:latin typeface="Consolas" pitchFamily="49" charset="0"/>
+                <a:cs typeface="Consolas" pitchFamily="49" charset="0"/>
+              </a:rPr>
+              <a:t>LastName)</a:t>
+            </a:r>
+            <a:r>
+              <a:rPr lang="en-US" sz="2800" b="1" noProof="1">
+                <a:solidFill>
+                  <a:schemeClr val="bg1"/>
+                </a:solidFill>
+                <a:latin typeface="Consolas" pitchFamily="49" charset="0"/>
+                <a:cs typeface="Consolas" pitchFamily="49" charset="0"/>
+              </a:rPr>
+              <a:t> </a:t>
+            </a:r>
+            <a:r>
+              <a:rPr lang="en-US" sz="2800" b="1" noProof="1">
+                <a:latin typeface="Consolas" pitchFamily="49" charset="0"/>
+                <a:cs typeface="Consolas" pitchFamily="49" charset="0"/>
+              </a:rPr>
+              <a:t>AS </a:t>
+            </a:r>
+            <a:r>
+              <a:rPr lang="en-US" sz="2800" b="1" noProof="1">
+                <a:solidFill>
+                  <a:schemeClr val="bg1"/>
+                </a:solidFill>
+                <a:latin typeface="Consolas" pitchFamily="49" charset="0"/>
+                <a:cs typeface="Consolas" pitchFamily="49" charset="0"/>
+              </a:rPr>
+              <a:t>FullName</a:t>
+            </a:r>
+            <a:endParaRPr lang="en-US" sz="2800" b="1" noProof="1">
+              <a:latin typeface="Consolas" pitchFamily="49" charset="0"/>
+              <a:cs typeface="Consolas" pitchFamily="49" charset="0"/>
+            </a:endParaRPr>
+          </a:p>
+          <a:p>
+            <a:pPr eaLnBrk="0" hangingPunct="0">
+              <a:buClr>
+                <a:schemeClr val="accent5">
+                  <a:lumMod val="40000"/>
+                  <a:lumOff val="60000"/>
+                </a:schemeClr>
+              </a:buClr>
+              <a:buSzPct val="70000"/>
+            </a:pPr>
+            <a:r>
+              <a:rPr lang="en-US" sz="2800" b="1" noProof="1">
+                <a:solidFill>
+                  <a:schemeClr val="bg1"/>
+                </a:solidFill>
+                <a:latin typeface="Consolas" pitchFamily="49" charset="0"/>
+                <a:cs typeface="Consolas" pitchFamily="49" charset="0"/>
+              </a:rPr>
+              <a:t>FROM</a:t>
+            </a:r>
+            <a:r>
+              <a:rPr lang="en-US" sz="2800" b="1" noProof="1">
+                <a:latin typeface="Consolas" pitchFamily="49" charset="0"/>
+                <a:cs typeface="Consolas" pitchFamily="49" charset="0"/>
+              </a:rPr>
+              <a:t> Employees</a:t>
+            </a:r>
+          </a:p>
+        </p:txBody>
+      </p:sp>
+      <p:sp>
+        <p:nvSpPr>
+          <p:cNvPr id="6" name="Slide Number">
+            <a:extLst>
+              <a:ext uri="{FF2B5EF4-FFF2-40B4-BE49-F238E27FC236}">
+                <a16:creationId xmlns:a16="http://schemas.microsoft.com/office/drawing/2014/main" id="{752606FA-BBC1-67D2-D42D-D814C147F140}"/>
+              </a:ext>
+            </a:extLst>
+          </p:cNvPr>
+          <p:cNvSpPr>
+            <a:spLocks noGrp="1"/>
+          </p:cNvSpPr>
+          <p:nvPr>
+            <p:ph type="sldNum" sz="quarter" idx="5"/>
+          </p:nvPr>
+        </p:nvSpPr>
+        <p:spPr>
+          <a:xfrm>
+            <a:off x="11753030" y="6507000"/>
+            <a:ext cx="367414" cy="297000"/>
+          </a:xfrm>
+          <a:prstGeom prst="rect">
+            <a:avLst/>
+          </a:prstGeom>
+        </p:spPr>
+        <p:txBody>
+          <a:bodyPr vert="horz" lIns="91440" tIns="45720" rIns="91440" bIns="45720" rtlCol="0" anchor="b"/>
+          <a:lstStyle>
+            <a:lvl1pPr algn="r">
+              <a:defRPr sz="1000"/>
+            </a:lvl1pPr>
+          </a:lstStyle>
+          <a:p>
+            <a:fld id="{2BF067CD-8E6B-4360-9AA8-C5DF2A48A6D1}" type="slidenum">
+              <a:rPr lang="en-US" noProof="0" smtClean="0"/>
+              <a:pPr/>
+              <a:t>20</a:t>
+            </a:fld>
+            <a:endParaRPr lang="en-US" noProof="0" dirty="0"/>
+          </a:p>
+        </p:txBody>
+      </p:sp>
+    </p:spTree>
+    <p:extLst>
+      <p:ext uri="{BB962C8B-B14F-4D97-AF65-F5344CB8AC3E}">
+        <p14:creationId xmlns:p14="http://schemas.microsoft.com/office/powerpoint/2010/main" val="1518246643"/>
+      </p:ext>
+    </p:extLst>
+  </p:cSld>
+  <p:clrMapOvr>
+    <a:masterClrMapping/>
+  </p:clrMapOvr>
+  <mc:AlternateContent xmlns:mc="http://schemas.openxmlformats.org/markup-compatibility/2006" xmlns:p14="http://schemas.microsoft.com/office/powerpoint/2010/main">
+    <mc:Choice Requires="p14">
+      <p:transition spd="slow" p14:dur="2000" advClick="0" advTm="5000"/>
+    </mc:Choice>
+    <mc:Fallback xmlns="">
+      <p:transition spd="slow" advClick="0" advTm="5000"/>
+    </mc:Fallback>
+  </mc:AlternateContent>
+  <p:timing>
+    <p:tnLst>
+      <p:par>
+        <p:cTn id="1" dur="indefinite" restart="never" nodeType="tmRoot">
+          <p:childTnLst>
+            <p:seq concurrent="1" nextAc="seek">
+              <p:cTn id="2" dur="indefinite" nodeType="mainSeq">
+                <p:childTnLst>
+                  <p:par>
+                    <p:cTn id="3" fill="hold">
+                      <p:stCondLst>
+                        <p:cond delay="indefinite"/>
+                      </p:stCondLst>
+                      <p:childTnLst>
+                        <p:par>
+                          <p:cTn id="4" fill="hold">
+                            <p:stCondLst>
+                              <p:cond delay="0"/>
+                            </p:stCondLst>
+                            <p:childTnLst>
+                              <p:par>
+                                <p:cTn id="5" presetID="1" presetClass="entr" presetSubtype="0" fill="hold" grpId="0" nodeType="clickEffect">
+                                  <p:stCondLst>
+                                    <p:cond delay="0"/>
+                                  </p:stCondLst>
+                                  <p:childTnLst>
+                                    <p:set>
+                                      <p:cBhvr>
+                                        <p:cTn id="6" dur="1" fill="hold">
+                                          <p:stCondLst>
+                                            <p:cond delay="0"/>
+                                          </p:stCondLst>
+                                        </p:cTn>
+                                        <p:tgtEl>
+                                          <p:spTgt spid="5"/>
+                                        </p:tgtEl>
+                                        <p:attrNameLst>
+                                          <p:attrName>style.visibility</p:attrName>
+                                        </p:attrNameLst>
+                                      </p:cBhvr>
+                                      <p:to>
+                                        <p:strVal val="visible"/>
+                                      </p:to>
+                                    </p:set>
+                                  </p:childTnLst>
+                                </p:cTn>
+                              </p:par>
+                            </p:childTnLst>
+                          </p:cTn>
+                        </p:par>
+                      </p:childTnLst>
+                    </p:cTn>
+                  </p:par>
+                </p:childTnLst>
+              </p:cTn>
+              <p:prevCondLst>
+                <p:cond evt="onPrev" delay="0">
+                  <p:tgtEl>
+                    <p:sldTgt/>
+                  </p:tgtEl>
+                </p:cond>
+              </p:prevCondLst>
+              <p:nextCondLst>
+                <p:cond evt="onNext" delay="0">
+                  <p:tgtEl>
+                    <p:sldTgt/>
+                  </p:tgtEl>
+                </p:cond>
+              </p:nextCondLst>
+            </p:seq>
+          </p:childTnLst>
+        </p:cTn>
+      </p:par>
+    </p:tnLst>
+    <p:bldLst>
+      <p:bldP spid="5" grpId="0" animBg="1"/>
+    </p:bldLst>
+  </p:timing>
+</p:sld>
+</file>
+
+<file path=ppt/slides/slide21.xml><?xml version="1.0" encoding="utf-8"?>
+<p:sld xmlns:a="http://schemas.openxmlformats.org/drawingml/2006/main" xmlns:r="http://schemas.openxmlformats.org/officeDocument/2006/relationships" xmlns:p="http://schemas.openxmlformats.org/presentationml/2006/main">
+  <p:cSld>
+    <p:spTree>
+      <p:nvGrpSpPr>
+        <p:cNvPr id="1" name=""/>
+        <p:cNvGrpSpPr/>
+        <p:nvPr/>
+      </p:nvGrpSpPr>
+      <p:grpSpPr>
+        <a:xfrm>
+          <a:off x="0" y="0"/>
+          <a:ext cx="0" cy="0"/>
+          <a:chOff x="0" y="0"/>
+          <a:chExt cx="0" cy="0"/>
+        </a:xfrm>
+      </p:grpSpPr>
+      <p:sp>
+        <p:nvSpPr>
           <p:cNvPr id="14" name="Text Placeholder 4">
             <a:extLst>
               <a:ext uri="{FF2B5EF4-FFF2-40B4-BE49-F238E27FC236}">
@@ -13414,7 +14043,7 @@
             <a:fld id="{2BF067CD-8E6B-4360-9AA8-C5DF2A48A6D1}" type="slidenum">
               <a:rPr lang="en-US" noProof="0" smtClean="0"/>
               <a:pPr/>
-              <a:t>20</a:t>
+              <a:t>21</a:t>
             </a:fld>
             <a:endParaRPr lang="en-US" noProof="0" dirty="0"/>
           </a:p>
@@ -13716,7 +14345,7 @@
 </p:sld>
 </file>
 
-<file path=ppt/slides/slide21.xml><?xml version="1.0" encoding="utf-8"?>
+<file path=ppt/slides/slide22.xml><?xml version="1.0" encoding="utf-8"?>
 <p:sld xmlns:a="http://schemas.openxmlformats.org/drawingml/2006/main" xmlns:r="http://schemas.openxmlformats.org/officeDocument/2006/relationships" xmlns:p="http://schemas.openxmlformats.org/presentationml/2006/main">
   <p:cSld>
     <p:spTree>
@@ -13906,7 +14535,7 @@
 </p:sld>
 </file>
 
-<file path=ppt/slides/slide22.xml><?xml version="1.0" encoding="utf-8"?>
+<file path=ppt/slides/slide23.xml><?xml version="1.0" encoding="utf-8"?>
 <p:sld xmlns:a="http://schemas.openxmlformats.org/drawingml/2006/main" xmlns:r="http://schemas.openxmlformats.org/officeDocument/2006/relationships" xmlns:p="http://schemas.openxmlformats.org/presentationml/2006/main">
   <p:cSld>
     <p:spTree>
@@ -14262,7 +14891,7 @@
             <a:fld id="{2BF067CD-8E6B-4360-9AA8-C5DF2A48A6D1}" type="slidenum">
               <a:rPr lang="en-US" noProof="0" smtClean="0"/>
               <a:pPr/>
-              <a:t>22</a:t>
+              <a:t>23</a:t>
             </a:fld>
             <a:endParaRPr lang="en-US" noProof="0" dirty="0"/>
           </a:p>

</xml_diff>

<commit_message>
Fixes on scripts and screenshots/results in the slides for Intro to SQL
</commit_message>
<xml_diff>
--- a/Courses/Software-Sciences/Module-3-Databases-New/04-Intro-to-SQL/04-Intro-to-SQL.pptx
+++ b/Courses/Software-Sciences/Module-3-Databases-New/04-Intro-to-SQL/04-Intro-to-SQL.pptx
@@ -543,7 +543,7 @@
           <a:p>
             <a:fld id="{4E087215-0C8F-4762-A664-737A353EC9A4}" type="datetimeFigureOut">
               <a:rPr lang="bg-BG" smtClean="0"/>
-              <a:t>26.2.2024 г.</a:t>
+              <a:t>15.3.2024 г.</a:t>
             </a:fld>
             <a:endParaRPr lang="bg-BG"/>
           </a:p>
@@ -739,7 +739,7 @@
           <a:p>
             <a:fld id="{72D84649-876A-46C9-8472-14CB09C070D8}" type="datetimeFigureOut">
               <a:rPr lang="en-US" smtClean="0"/>
-              <a:t>2/26/2024</a:t>
+              <a:t>3/15/2024</a:t>
             </a:fld>
             <a:endParaRPr lang="en-US"/>
           </a:p>
@@ -11563,6 +11563,43 @@
           </a:p>
         </p:txBody>
       </p:sp>
+      <p:pic>
+        <p:nvPicPr>
+          <p:cNvPr id="6" name="Picture 5">
+            <a:extLst>
+              <a:ext uri="{FF2B5EF4-FFF2-40B4-BE49-F238E27FC236}">
+                <a16:creationId xmlns:a16="http://schemas.microsoft.com/office/drawing/2014/main" id="{30138BA1-9653-192D-82A0-C08AB337C867}"/>
+              </a:ext>
+            </a:extLst>
+          </p:cNvPr>
+          <p:cNvPicPr>
+            <a:picLocks noChangeAspect="1"/>
+          </p:cNvPicPr>
+          <p:nvPr/>
+        </p:nvPicPr>
+        <p:blipFill>
+          <a:blip r:embed="rId2"/>
+          <a:stretch>
+            <a:fillRect/>
+          </a:stretch>
+        </p:blipFill>
+        <p:spPr>
+          <a:xfrm>
+            <a:off x="4858500" y="3564000"/>
+            <a:ext cx="2475000" cy="2358984"/>
+          </a:xfrm>
+          <a:prstGeom prst="rect">
+            <a:avLst/>
+          </a:prstGeom>
+          <a:ln>
+            <a:solidFill>
+              <a:schemeClr val="bg2">
+                <a:lumMod val="75000"/>
+              </a:schemeClr>
+            </a:solidFill>
+          </a:ln>
+        </p:spPr>
+      </p:pic>
     </p:spTree>
     <p:extLst>
       <p:ext uri="{BB962C8B-B14F-4D97-AF65-F5344CB8AC3E}">
@@ -11766,7 +11803,7 @@
         </p:nvSpPr>
         <p:spPr bwMode="auto">
           <a:xfrm>
-            <a:off x="2518500" y="3924000"/>
+            <a:off x="2518500" y="4059000"/>
             <a:ext cx="7155000" cy="1384995"/>
           </a:xfrm>
           <a:prstGeom prst="rect">
@@ -11804,36 +11841,73 @@
               <a:buSzPct val="70000"/>
             </a:pPr>
             <a:r>
-              <a:rPr lang="en-US" sz="2800" b="1" noProof="1">
+              <a:rPr lang="en-US" sz="2800" b="1" dirty="0">
                 <a:solidFill>
                   <a:schemeClr val="bg1"/>
                 </a:solidFill>
                 <a:latin typeface="Consolas" pitchFamily="49" charset="0"/>
                 <a:cs typeface="Consolas" pitchFamily="49" charset="0"/>
               </a:rPr>
-              <a:t>SELECT MONTHNAME</a:t>
-            </a:r>
-            <a:r>
-              <a:rPr lang="en-US" sz="2800" b="1" noProof="1">
+              <a:t>SELECT</a:t>
+            </a:r>
+            <a:r>
+              <a:rPr lang="en-US" sz="2800" b="1" dirty="0">
                 <a:latin typeface="Consolas" pitchFamily="49" charset="0"/>
                 <a:cs typeface="Consolas" pitchFamily="49" charset="0"/>
               </a:rPr>
-              <a:t>(OrderDate) AS Month</a:t>
-            </a:r>
-            <a:r>
-              <a:rPr lang="en-US" sz="2800" b="1" noProof="1">
+              <a:t> </a:t>
+            </a:r>
+            <a:r>
+              <a:rPr lang="en-US" sz="2800" b="1" dirty="0">
                 <a:solidFill>
                   <a:schemeClr val="bg1"/>
                 </a:solidFill>
                 <a:latin typeface="Consolas" pitchFamily="49" charset="0"/>
                 <a:cs typeface="Consolas" pitchFamily="49" charset="0"/>
               </a:rPr>
-              <a:t>  </a:t>
-            </a:r>
-            <a:endParaRPr lang="en-US" sz="2800" b="1" noProof="1">
-              <a:latin typeface="Consolas" pitchFamily="49" charset="0"/>
-              <a:cs typeface="Consolas" pitchFamily="49" charset="0"/>
-            </a:endParaRPr>
+              <a:t>FORMAT</a:t>
+            </a:r>
+            <a:r>
+              <a:rPr lang="en-US" sz="2800" b="1" dirty="0">
+                <a:latin typeface="Consolas" pitchFamily="49" charset="0"/>
+                <a:cs typeface="Consolas" pitchFamily="49" charset="0"/>
+              </a:rPr>
+              <a:t>(</a:t>
+            </a:r>
+            <a:r>
+              <a:rPr lang="en-US" sz="2800" b="1" dirty="0">
+                <a:solidFill>
+                  <a:schemeClr val="bg1"/>
+                </a:solidFill>
+                <a:latin typeface="Consolas" pitchFamily="49" charset="0"/>
+                <a:cs typeface="Consolas" pitchFamily="49" charset="0"/>
+              </a:rPr>
+              <a:t>OrderDate</a:t>
+            </a:r>
+            <a:r>
+              <a:rPr lang="en-US" sz="2800" b="1" dirty="0">
+                <a:latin typeface="Consolas" pitchFamily="49" charset="0"/>
+                <a:cs typeface="Consolas" pitchFamily="49" charset="0"/>
+              </a:rPr>
+              <a:t>, </a:t>
+            </a:r>
+            <a:r>
+              <a:rPr lang="en-US" sz="2800" b="1" dirty="0">
+                <a:solidFill>
+                  <a:schemeClr val="bg1"/>
+                </a:solidFill>
+                <a:latin typeface="Consolas" pitchFamily="49" charset="0"/>
+                <a:cs typeface="Consolas" pitchFamily="49" charset="0"/>
+              </a:rPr>
+              <a:t>'MMMM</a:t>
+            </a:r>
+            <a:r>
+              <a:rPr lang="en-US" sz="2800" b="1" dirty="0">
+                <a:latin typeface="Consolas" pitchFamily="49" charset="0"/>
+                <a:cs typeface="Consolas" pitchFamily="49" charset="0"/>
+              </a:rPr>
+              <a:t>') AS MonthName</a:t>
+            </a:r>
           </a:p>
           <a:p>
             <a:pPr eaLnBrk="0" hangingPunct="0">
@@ -11846,7 +11920,7 @@
               <a:buSzPct val="70000"/>
             </a:pPr>
             <a:r>
-              <a:rPr lang="en-US" sz="2800" b="1" noProof="1">
+              <a:rPr lang="en-US" sz="2800" b="1" dirty="0">
                 <a:solidFill>
                   <a:schemeClr val="bg1"/>
                 </a:solidFill>
@@ -11856,12 +11930,16 @@
               <a:t>FROM</a:t>
             </a:r>
             <a:r>
-              <a:rPr lang="en-US" sz="2800" b="1" noProof="1">
+              <a:rPr lang="en-US" sz="2800" b="1" dirty="0">
                 <a:latin typeface="Consolas" pitchFamily="49" charset="0"/>
                 <a:cs typeface="Consolas" pitchFamily="49" charset="0"/>
               </a:rPr>
               <a:t> Orders</a:t>
             </a:r>
+            <a:endParaRPr lang="en-US" sz="2800" b="1" noProof="1">
+              <a:latin typeface="Consolas" pitchFamily="49" charset="0"/>
+              <a:cs typeface="Consolas" pitchFamily="49" charset="0"/>
+            </a:endParaRPr>
           </a:p>
         </p:txBody>
       </p:sp>

</xml_diff>

<commit_message>
Fixes on Intro to SQL slides
</commit_message>
<xml_diff>
--- a/Courses/Software-Sciences/Module-3-Databases-New/04-Intro-to-SQL/04-Intro-to-SQL.pptx
+++ b/Courses/Software-Sciences/Module-3-Databases-New/04-Intro-to-SQL/04-Intro-to-SQL.pptx
@@ -543,7 +543,7 @@
           <a:p>
             <a:fld id="{4E087215-0C8F-4762-A664-737A353EC9A4}" type="datetimeFigureOut">
               <a:rPr lang="bg-BG" smtClean="0"/>
-              <a:t>15.3.2024 г.</a:t>
+              <a:t>19.4.2024 г.</a:t>
             </a:fld>
             <a:endParaRPr lang="bg-BG"/>
           </a:p>
@@ -739,7 +739,7 @@
           <a:p>
             <a:fld id="{72D84649-876A-46C9-8472-14CB09C070D8}" type="datetimeFigureOut">
               <a:rPr lang="en-US" smtClean="0"/>
-              <a:t>3/15/2024</a:t>
+              <a:t>4/19/2024</a:t>
             </a:fld>
             <a:endParaRPr lang="en-US"/>
           </a:p>
@@ -12747,7 +12747,7 @@
         </p:nvSpPr>
         <p:spPr bwMode="auto">
           <a:xfrm>
-            <a:off x="1281000" y="3519000"/>
+            <a:off x="1281000" y="3554893"/>
             <a:ext cx="10012500" cy="954107"/>
           </a:xfrm>
           <a:prstGeom prst="rect">

</xml_diff>